<commit_message>
Update roadmap with latest changes v0.1.3
</commit_message>
<xml_diff>
--- a/docs/roadmap.pptx
+++ b/docs/roadmap.pptx
@@ -104,7 +104,20 @@
       </a:defRPr>
     </a:lvl9pPr>
   </p:defaultTextStyle>
+  <p:extLst>
+    <p:ext uri="{EFAFB233-063F-42B5-8137-9DF3F51BA10A}">
+      <p15:sldGuideLst xmlns:p15="http://schemas.microsoft.com/office/powerpoint/2012/main"/>
+    </p:ext>
+  </p:extLst>
 </p:presentation>
+</file>
+
+<file path=ppt/revisionInfo.xml><?xml version="1.0" encoding="utf-8"?>
+<p1510:revInfo xmlns:a="http://schemas.openxmlformats.org/drawingml/2006/main" xmlns:r="http://schemas.openxmlformats.org/officeDocument/2006/relationships" xmlns:p1510="http://schemas.microsoft.com/office/powerpoint/2015/10/main">
+  <p1510:revLst>
+    <p1510:client id="{E10D3731-EFCA-45B7-8039-2282C7B7AC93}" v="8" dt="2021-09-18T11:14:27.993"/>
+  </p1510:revLst>
+</p1510:revInfo>
 </file>
 
 <file path=ppt/changesInfos/changesInfo1.xml><?xml version="1.0" encoding="utf-8"?>
@@ -112,18 +125,18 @@
   <pc:docChgLst>
     <pc:chgData name="Alonso Guerrero Llorente" userId="451d9a1c5f7013d1" providerId="LiveId" clId="{E10D3731-EFCA-45B7-8039-2282C7B7AC93}"/>
     <pc:docChg chg="custSel modSld">
-      <pc:chgData name="Alonso Guerrero Llorente" userId="451d9a1c5f7013d1" providerId="LiveId" clId="{E10D3731-EFCA-45B7-8039-2282C7B7AC93}" dt="2021-09-15T19:22:45.763" v="77" actId="20577"/>
+      <pc:chgData name="Alonso Guerrero Llorente" userId="451d9a1c5f7013d1" providerId="LiveId" clId="{E10D3731-EFCA-45B7-8039-2282C7B7AC93}" dt="2021-09-18T11:14:56.153" v="205" actId="122"/>
       <pc:docMkLst>
         <pc:docMk/>
       </pc:docMkLst>
-      <pc:sldChg chg="modSp mod">
-        <pc:chgData name="Alonso Guerrero Llorente" userId="451d9a1c5f7013d1" providerId="LiveId" clId="{E10D3731-EFCA-45B7-8039-2282C7B7AC93}" dt="2021-09-15T19:22:45.763" v="77" actId="20577"/>
+      <pc:sldChg chg="addSp delSp modSp mod">
+        <pc:chgData name="Alonso Guerrero Llorente" userId="451d9a1c5f7013d1" providerId="LiveId" clId="{E10D3731-EFCA-45B7-8039-2282C7B7AC93}" dt="2021-09-18T11:14:56.153" v="205" actId="122"/>
         <pc:sldMkLst>
           <pc:docMk/>
           <pc:sldMk cId="1813519119" sldId="256"/>
         </pc:sldMkLst>
         <pc:spChg chg="mod">
-          <ac:chgData name="Alonso Guerrero Llorente" userId="451d9a1c5f7013d1" providerId="LiveId" clId="{E10D3731-EFCA-45B7-8039-2282C7B7AC93}" dt="2021-09-15T19:21:43.419" v="1" actId="1036"/>
+          <ac:chgData name="Alonso Guerrero Llorente" userId="451d9a1c5f7013d1" providerId="LiveId" clId="{E10D3731-EFCA-45B7-8039-2282C7B7AC93}" dt="2021-09-18T11:11:59.788" v="126" actId="1036"/>
           <ac:spMkLst>
             <pc:docMk/>
             <pc:sldMk cId="1813519119" sldId="256"/>
@@ -131,7 +144,79 @@
           </ac:spMkLst>
         </pc:spChg>
         <pc:spChg chg="mod">
-          <ac:chgData name="Alonso Guerrero Llorente" userId="451d9a1c5f7013d1" providerId="LiveId" clId="{E10D3731-EFCA-45B7-8039-2282C7B7AC93}" dt="2021-09-15T19:22:45.763" v="77" actId="20577"/>
+          <ac:chgData name="Alonso Guerrero Llorente" userId="451d9a1c5f7013d1" providerId="LiveId" clId="{E10D3731-EFCA-45B7-8039-2282C7B7AC93}" dt="2021-09-18T11:10:57.698" v="106" actId="1076"/>
+          <ac:spMkLst>
+            <pc:docMk/>
+            <pc:sldMk cId="1813519119" sldId="256"/>
+            <ac:spMk id="5" creationId="{004FC861-F578-4E3A-BAB7-6E41A9787251}"/>
+          </ac:spMkLst>
+        </pc:spChg>
+        <pc:spChg chg="mod">
+          <ac:chgData name="Alonso Guerrero Llorente" userId="451d9a1c5f7013d1" providerId="LiveId" clId="{E10D3731-EFCA-45B7-8039-2282C7B7AC93}" dt="2021-09-18T11:10:57.698" v="106" actId="1076"/>
+          <ac:spMkLst>
+            <pc:docMk/>
+            <pc:sldMk cId="1813519119" sldId="256"/>
+            <ac:spMk id="16" creationId="{4F5B63C4-3817-477E-AD72-D5A5821B2FE0}"/>
+          </ac:spMkLst>
+        </pc:spChg>
+        <pc:spChg chg="mod">
+          <ac:chgData name="Alonso Guerrero Llorente" userId="451d9a1c5f7013d1" providerId="LiveId" clId="{E10D3731-EFCA-45B7-8039-2282C7B7AC93}" dt="2021-09-18T11:13:53.613" v="162" actId="208"/>
+          <ac:spMkLst>
+            <pc:docMk/>
+            <pc:sldMk cId="1813519119" sldId="256"/>
+            <ac:spMk id="18" creationId="{992C45F1-4FF1-4043-8166-C3A44B81CB78}"/>
+          </ac:spMkLst>
+        </pc:spChg>
+        <pc:spChg chg="mod">
+          <ac:chgData name="Alonso Guerrero Llorente" userId="451d9a1c5f7013d1" providerId="LiveId" clId="{E10D3731-EFCA-45B7-8039-2282C7B7AC93}" dt="2021-09-18T11:10:57.698" v="106" actId="1076"/>
+          <ac:spMkLst>
+            <pc:docMk/>
+            <pc:sldMk cId="1813519119" sldId="256"/>
+            <ac:spMk id="20" creationId="{DD379C62-317F-43DF-8242-16F1BAC5D63D}"/>
+          </ac:spMkLst>
+        </pc:spChg>
+        <pc:spChg chg="mod">
+          <ac:chgData name="Alonso Guerrero Llorente" userId="451d9a1c5f7013d1" providerId="LiveId" clId="{E10D3731-EFCA-45B7-8039-2282C7B7AC93}" dt="2021-09-18T11:14:06.423" v="164" actId="208"/>
+          <ac:spMkLst>
+            <pc:docMk/>
+            <pc:sldMk cId="1813519119" sldId="256"/>
+            <ac:spMk id="21" creationId="{A43C41FD-0579-464D-95CF-A88C9555CB9F}"/>
+          </ac:spMkLst>
+        </pc:spChg>
+        <pc:spChg chg="add mod ord">
+          <ac:chgData name="Alonso Guerrero Llorente" userId="451d9a1c5f7013d1" providerId="LiveId" clId="{E10D3731-EFCA-45B7-8039-2282C7B7AC93}" dt="2021-09-18T11:10:57.698" v="106" actId="1076"/>
+          <ac:spMkLst>
+            <pc:docMk/>
+            <pc:sldMk cId="1813519119" sldId="256"/>
+            <ac:spMk id="22" creationId="{BD5C765A-7DF9-404F-90DE-22BDC093305A}"/>
+          </ac:spMkLst>
+        </pc:spChg>
+        <pc:spChg chg="mod">
+          <ac:chgData name="Alonso Guerrero Llorente" userId="451d9a1c5f7013d1" providerId="LiveId" clId="{E10D3731-EFCA-45B7-8039-2282C7B7AC93}" dt="2021-09-18T11:10:57.698" v="106" actId="1076"/>
+          <ac:spMkLst>
+            <pc:docMk/>
+            <pc:sldMk cId="1813519119" sldId="256"/>
+            <ac:spMk id="23" creationId="{784FA247-F3F1-4A4E-84F4-857554EB6A4A}"/>
+          </ac:spMkLst>
+        </pc:spChg>
+        <pc:spChg chg="mod">
+          <ac:chgData name="Alonso Guerrero Llorente" userId="451d9a1c5f7013d1" providerId="LiveId" clId="{E10D3731-EFCA-45B7-8039-2282C7B7AC93}" dt="2021-09-18T11:10:57.698" v="106" actId="1076"/>
+          <ac:spMkLst>
+            <pc:docMk/>
+            <pc:sldMk cId="1813519119" sldId="256"/>
+            <ac:spMk id="24" creationId="{D4474C89-548E-418F-8F62-425288D15D3C}"/>
+          </ac:spMkLst>
+        </pc:spChg>
+        <pc:spChg chg="mod">
+          <ac:chgData name="Alonso Guerrero Llorente" userId="451d9a1c5f7013d1" providerId="LiveId" clId="{E10D3731-EFCA-45B7-8039-2282C7B7AC93}" dt="2021-09-18T11:10:57.698" v="106" actId="1076"/>
+          <ac:spMkLst>
+            <pc:docMk/>
+            <pc:sldMk cId="1813519119" sldId="256"/>
+            <ac:spMk id="26" creationId="{5BAC19D2-7853-4F74-817F-9CECCC40C603}"/>
+          </ac:spMkLst>
+        </pc:spChg>
+        <pc:spChg chg="mod">
+          <ac:chgData name="Alonso Guerrero Llorente" userId="451d9a1c5f7013d1" providerId="LiveId" clId="{E10D3731-EFCA-45B7-8039-2282C7B7AC93}" dt="2021-09-18T11:12:34.998" v="131" actId="1076"/>
           <ac:spMkLst>
             <pc:docMk/>
             <pc:sldMk cId="1813519119" sldId="256"/>
@@ -139,13 +224,293 @@
           </ac:spMkLst>
         </pc:spChg>
         <pc:spChg chg="mod">
-          <ac:chgData name="Alonso Guerrero Llorente" userId="451d9a1c5f7013d1" providerId="LiveId" clId="{E10D3731-EFCA-45B7-8039-2282C7B7AC93}" dt="2021-09-15T19:22:15.356" v="3" actId="1076"/>
+          <ac:chgData name="Alonso Guerrero Llorente" userId="451d9a1c5f7013d1" providerId="LiveId" clId="{E10D3731-EFCA-45B7-8039-2282C7B7AC93}" dt="2021-09-18T11:10:57.698" v="106" actId="1076"/>
+          <ac:spMkLst>
+            <pc:docMk/>
+            <pc:sldMk cId="1813519119" sldId="256"/>
+            <ac:spMk id="28" creationId="{02F1A2ED-1ABF-4324-AD01-4A33874597B1}"/>
+          </ac:spMkLst>
+        </pc:spChg>
+        <pc:spChg chg="mod">
+          <ac:chgData name="Alonso Guerrero Llorente" userId="451d9a1c5f7013d1" providerId="LiveId" clId="{E10D3731-EFCA-45B7-8039-2282C7B7AC93}" dt="2021-09-18T11:10:57.698" v="106" actId="1076"/>
+          <ac:spMkLst>
+            <pc:docMk/>
+            <pc:sldMk cId="1813519119" sldId="256"/>
+            <ac:spMk id="30" creationId="{DFC128DF-9D6C-4D7F-8E1F-3A15D6355E7A}"/>
+          </ac:spMkLst>
+        </pc:spChg>
+        <pc:spChg chg="mod">
+          <ac:chgData name="Alonso Guerrero Llorente" userId="451d9a1c5f7013d1" providerId="LiveId" clId="{E10D3731-EFCA-45B7-8039-2282C7B7AC93}" dt="2021-09-18T11:12:32.768" v="130" actId="1076"/>
           <ac:spMkLst>
             <pc:docMk/>
             <pc:sldMk cId="1813519119" sldId="256"/>
             <ac:spMk id="31" creationId="{DA013763-AE25-43D1-8FC4-C2A05AD9203C}"/>
           </ac:spMkLst>
         </pc:spChg>
+        <pc:spChg chg="add mod">
+          <ac:chgData name="Alonso Guerrero Llorente" userId="451d9a1c5f7013d1" providerId="LiveId" clId="{E10D3731-EFCA-45B7-8039-2282C7B7AC93}" dt="2021-09-18T11:10:57.698" v="106" actId="1076"/>
+          <ac:spMkLst>
+            <pc:docMk/>
+            <pc:sldMk cId="1813519119" sldId="256"/>
+            <ac:spMk id="33" creationId="{E86F2568-1CFF-452F-AD77-CADF6C45CAA0}"/>
+          </ac:spMkLst>
+        </pc:spChg>
+        <pc:spChg chg="add mod">
+          <ac:chgData name="Alonso Guerrero Llorente" userId="451d9a1c5f7013d1" providerId="LiveId" clId="{E10D3731-EFCA-45B7-8039-2282C7B7AC93}" dt="2021-09-18T11:12:28.545" v="129" actId="1076"/>
+          <ac:spMkLst>
+            <pc:docMk/>
+            <pc:sldMk cId="1813519119" sldId="256"/>
+            <ac:spMk id="34" creationId="{8346D467-61BC-4738-9085-D0C1296A1B5D}"/>
+          </ac:spMkLst>
+        </pc:spChg>
+        <pc:spChg chg="add mod">
+          <ac:chgData name="Alonso Guerrero Llorente" userId="451d9a1c5f7013d1" providerId="LiveId" clId="{E10D3731-EFCA-45B7-8039-2282C7B7AC93}" dt="2021-09-18T11:11:04.794" v="108" actId="1076"/>
+          <ac:spMkLst>
+            <pc:docMk/>
+            <pc:sldMk cId="1813519119" sldId="256"/>
+            <ac:spMk id="35" creationId="{494CEAFC-A87B-4B7E-990D-12F5109F547C}"/>
+          </ac:spMkLst>
+        </pc:spChg>
+        <pc:spChg chg="add mod">
+          <ac:chgData name="Alonso Guerrero Llorente" userId="451d9a1c5f7013d1" providerId="LiveId" clId="{E10D3731-EFCA-45B7-8039-2282C7B7AC93}" dt="2021-09-18T11:12:08.366" v="128" actId="1036"/>
+          <ac:spMkLst>
+            <pc:docMk/>
+            <pc:sldMk cId="1813519119" sldId="256"/>
+            <ac:spMk id="36" creationId="{B66920C0-5D30-4285-A97C-53F2A7440D2B}"/>
+          </ac:spMkLst>
+        </pc:spChg>
+        <pc:spChg chg="add mod">
+          <ac:chgData name="Alonso Guerrero Llorente" userId="451d9a1c5f7013d1" providerId="LiveId" clId="{E10D3731-EFCA-45B7-8039-2282C7B7AC93}" dt="2021-09-18T11:11:04.794" v="108" actId="1076"/>
+          <ac:spMkLst>
+            <pc:docMk/>
+            <pc:sldMk cId="1813519119" sldId="256"/>
+            <ac:spMk id="37" creationId="{43B149ED-2CA3-4547-AFF9-B37380C17270}"/>
+          </ac:spMkLst>
+        </pc:spChg>
+        <pc:spChg chg="add mod">
+          <ac:chgData name="Alonso Guerrero Llorente" userId="451d9a1c5f7013d1" providerId="LiveId" clId="{E10D3731-EFCA-45B7-8039-2282C7B7AC93}" dt="2021-09-18T11:11:04.794" v="108" actId="1076"/>
+          <ac:spMkLst>
+            <pc:docMk/>
+            <pc:sldMk cId="1813519119" sldId="256"/>
+            <ac:spMk id="38" creationId="{8B147247-3BF7-4730-B43F-0C8EE53F75C1}"/>
+          </ac:spMkLst>
+        </pc:spChg>
+        <pc:spChg chg="add mod">
+          <ac:chgData name="Alonso Guerrero Llorente" userId="451d9a1c5f7013d1" providerId="LiveId" clId="{E10D3731-EFCA-45B7-8039-2282C7B7AC93}" dt="2021-09-18T11:11:04.794" v="108" actId="1076"/>
+          <ac:spMkLst>
+            <pc:docMk/>
+            <pc:sldMk cId="1813519119" sldId="256"/>
+            <ac:spMk id="39" creationId="{6CFE131A-964B-4143-A5B1-72A19AC46C0E}"/>
+          </ac:spMkLst>
+        </pc:spChg>
+        <pc:spChg chg="add del mod">
+          <ac:chgData name="Alonso Guerrero Llorente" userId="451d9a1c5f7013d1" providerId="LiveId" clId="{E10D3731-EFCA-45B7-8039-2282C7B7AC93}" dt="2021-09-18T11:11:17.634" v="117" actId="478"/>
+          <ac:spMkLst>
+            <pc:docMk/>
+            <pc:sldMk cId="1813519119" sldId="256"/>
+            <ac:spMk id="40" creationId="{DAFD052E-4B2C-4A67-B398-67983114506E}"/>
+          </ac:spMkLst>
+        </pc:spChg>
+        <pc:spChg chg="add mod">
+          <ac:chgData name="Alonso Guerrero Llorente" userId="451d9a1c5f7013d1" providerId="LiveId" clId="{E10D3731-EFCA-45B7-8039-2282C7B7AC93}" dt="2021-09-18T11:11:24.102" v="121" actId="20577"/>
+          <ac:spMkLst>
+            <pc:docMk/>
+            <pc:sldMk cId="1813519119" sldId="256"/>
+            <ac:spMk id="42" creationId="{1ABD6C16-AA33-41CD-9BB4-E3399CAFACA5}"/>
+          </ac:spMkLst>
+        </pc:spChg>
+        <pc:spChg chg="add del mod">
+          <ac:chgData name="Alonso Guerrero Llorente" userId="451d9a1c5f7013d1" providerId="LiveId" clId="{E10D3731-EFCA-45B7-8039-2282C7B7AC93}" dt="2021-09-18T11:11:09.698" v="110" actId="478"/>
+          <ac:spMkLst>
+            <pc:docMk/>
+            <pc:sldMk cId="1813519119" sldId="256"/>
+            <ac:spMk id="44" creationId="{0BA83074-5F7C-4B8E-8C65-32EA7BE16D59}"/>
+          </ac:spMkLst>
+        </pc:spChg>
+        <pc:spChg chg="add del mod">
+          <ac:chgData name="Alonso Guerrero Llorente" userId="451d9a1c5f7013d1" providerId="LiveId" clId="{E10D3731-EFCA-45B7-8039-2282C7B7AC93}" dt="2021-09-18T11:11:11.521" v="112" actId="478"/>
+          <ac:spMkLst>
+            <pc:docMk/>
+            <pc:sldMk cId="1813519119" sldId="256"/>
+            <ac:spMk id="45" creationId="{ED4C82EE-942E-41C6-91A4-74733C964625}"/>
+          </ac:spMkLst>
+        </pc:spChg>
+        <pc:spChg chg="add del mod">
+          <ac:chgData name="Alonso Guerrero Llorente" userId="451d9a1c5f7013d1" providerId="LiveId" clId="{E10D3731-EFCA-45B7-8039-2282C7B7AC93}" dt="2021-09-18T11:11:10.878" v="111" actId="478"/>
+          <ac:spMkLst>
+            <pc:docMk/>
+            <pc:sldMk cId="1813519119" sldId="256"/>
+            <ac:spMk id="46" creationId="{BF6D68FB-6E12-40CE-9AB4-DCB6367B15C6}"/>
+          </ac:spMkLst>
+        </pc:spChg>
+        <pc:spChg chg="add del mod">
+          <ac:chgData name="Alonso Guerrero Llorente" userId="451d9a1c5f7013d1" providerId="LiveId" clId="{E10D3731-EFCA-45B7-8039-2282C7B7AC93}" dt="2021-09-18T11:11:12.800" v="113" actId="478"/>
+          <ac:spMkLst>
+            <pc:docMk/>
+            <pc:sldMk cId="1813519119" sldId="256"/>
+            <ac:spMk id="49" creationId="{8C56E9A9-1F03-4C3E-A256-DC13B97EC3F8}"/>
+          </ac:spMkLst>
+        </pc:spChg>
+        <pc:spChg chg="add del mod">
+          <ac:chgData name="Alonso Guerrero Llorente" userId="451d9a1c5f7013d1" providerId="LiveId" clId="{E10D3731-EFCA-45B7-8039-2282C7B7AC93}" dt="2021-09-18T11:11:09.062" v="109" actId="478"/>
+          <ac:spMkLst>
+            <pc:docMk/>
+            <pc:sldMk cId="1813519119" sldId="256"/>
+            <ac:spMk id="50" creationId="{3851EC61-E027-4A6B-85E7-7F6623CB6810}"/>
+          </ac:spMkLst>
+        </pc:spChg>
+        <pc:spChg chg="add del mod">
+          <ac:chgData name="Alonso Guerrero Llorente" userId="451d9a1c5f7013d1" providerId="LiveId" clId="{E10D3731-EFCA-45B7-8039-2282C7B7AC93}" dt="2021-09-18T11:11:26.090" v="122" actId="478"/>
+          <ac:spMkLst>
+            <pc:docMk/>
+            <pc:sldMk cId="1813519119" sldId="256"/>
+            <ac:spMk id="52" creationId="{083139EF-6B04-4CCB-9508-8C4EAC8AE1E4}"/>
+          </ac:spMkLst>
+        </pc:spChg>
+        <pc:spChg chg="add del mod">
+          <ac:chgData name="Alonso Guerrero Llorente" userId="451d9a1c5f7013d1" providerId="LiveId" clId="{E10D3731-EFCA-45B7-8039-2282C7B7AC93}" dt="2021-09-18T11:11:26.757" v="123" actId="478"/>
+          <ac:spMkLst>
+            <pc:docMk/>
+            <pc:sldMk cId="1813519119" sldId="256"/>
+            <ac:spMk id="53" creationId="{406ED434-80A6-4B37-8D84-A1F8E0A0D320}"/>
+          </ac:spMkLst>
+        </pc:spChg>
+        <pc:spChg chg="add del mod">
+          <ac:chgData name="Alonso Guerrero Llorente" userId="451d9a1c5f7013d1" providerId="LiveId" clId="{E10D3731-EFCA-45B7-8039-2282C7B7AC93}" dt="2021-09-18T11:11:14.839" v="115" actId="478"/>
+          <ac:spMkLst>
+            <pc:docMk/>
+            <pc:sldMk cId="1813519119" sldId="256"/>
+            <ac:spMk id="55" creationId="{993909DE-DBD2-41F3-B718-88A54073F745}"/>
+          </ac:spMkLst>
+        </pc:spChg>
+        <pc:spChg chg="add del mod">
+          <ac:chgData name="Alonso Guerrero Llorente" userId="451d9a1c5f7013d1" providerId="LiveId" clId="{E10D3731-EFCA-45B7-8039-2282C7B7AC93}" dt="2021-09-18T11:11:13.806" v="114" actId="478"/>
+          <ac:spMkLst>
+            <pc:docMk/>
+            <pc:sldMk cId="1813519119" sldId="256"/>
+            <ac:spMk id="56" creationId="{C2CD63C2-FA56-4B00-8C6C-47786A07546A}"/>
+          </ac:spMkLst>
+        </pc:spChg>
+        <pc:spChg chg="add mod">
+          <ac:chgData name="Alonso Guerrero Llorente" userId="451d9a1c5f7013d1" providerId="LiveId" clId="{E10D3731-EFCA-45B7-8039-2282C7B7AC93}" dt="2021-09-18T11:14:00.242" v="163" actId="208"/>
+          <ac:spMkLst>
+            <pc:docMk/>
+            <pc:sldMk cId="1813519119" sldId="256"/>
+            <ac:spMk id="57" creationId="{51DCCDF9-3046-4212-8E50-E5E8272F4C4C}"/>
+          </ac:spMkLst>
+        </pc:spChg>
+        <pc:spChg chg="add mod">
+          <ac:chgData name="Alonso Guerrero Llorente" userId="451d9a1c5f7013d1" providerId="LiveId" clId="{E10D3731-EFCA-45B7-8039-2282C7B7AC93}" dt="2021-09-18T11:14:56.153" v="205" actId="122"/>
+          <ac:spMkLst>
+            <pc:docMk/>
+            <pc:sldMk cId="1813519119" sldId="256"/>
+            <ac:spMk id="58" creationId="{E14DE0E9-6875-4F26-9B9C-2A694560EFCE}"/>
+          </ac:spMkLst>
+        </pc:spChg>
+        <pc:spChg chg="add mod">
+          <ac:chgData name="Alonso Guerrero Llorente" userId="451d9a1c5f7013d1" providerId="LiveId" clId="{E10D3731-EFCA-45B7-8039-2282C7B7AC93}" dt="2021-09-18T11:14:54.253" v="204" actId="122"/>
+          <ac:spMkLst>
+            <pc:docMk/>
+            <pc:sldMk cId="1813519119" sldId="256"/>
+            <ac:spMk id="59" creationId="{CFB0600F-AF7A-46C1-BA36-0EC4575B2C75}"/>
+          </ac:spMkLst>
+        </pc:spChg>
+        <pc:cxnChg chg="mod">
+          <ac:chgData name="Alonso Guerrero Llorente" userId="451d9a1c5f7013d1" providerId="LiveId" clId="{E10D3731-EFCA-45B7-8039-2282C7B7AC93}" dt="2021-09-18T11:10:57.698" v="106" actId="1076"/>
+          <ac:cxnSpMkLst>
+            <pc:docMk/>
+            <pc:sldMk cId="1813519119" sldId="256"/>
+            <ac:cxnSpMk id="7" creationId="{0D95E9A5-118F-4262-BE32-F4FCD4122D84}"/>
+          </ac:cxnSpMkLst>
+        </pc:cxnChg>
+        <pc:cxnChg chg="mod">
+          <ac:chgData name="Alonso Guerrero Llorente" userId="451d9a1c5f7013d1" providerId="LiveId" clId="{E10D3731-EFCA-45B7-8039-2282C7B7AC93}" dt="2021-09-18T11:10:57.698" v="106" actId="1076"/>
+          <ac:cxnSpMkLst>
+            <pc:docMk/>
+            <pc:sldMk cId="1813519119" sldId="256"/>
+            <ac:cxnSpMk id="17" creationId="{85146D0B-9EE1-4D51-ACCD-DA9D90F6ABBE}"/>
+          </ac:cxnSpMkLst>
+        </pc:cxnChg>
+        <pc:cxnChg chg="mod">
+          <ac:chgData name="Alonso Guerrero Llorente" userId="451d9a1c5f7013d1" providerId="LiveId" clId="{E10D3731-EFCA-45B7-8039-2282C7B7AC93}" dt="2021-09-18T11:10:57.698" v="106" actId="1076"/>
+          <ac:cxnSpMkLst>
+            <pc:docMk/>
+            <pc:sldMk cId="1813519119" sldId="256"/>
+            <ac:cxnSpMk id="19" creationId="{4C30FEA1-C10B-4634-93B4-04F98B8DBB6F}"/>
+          </ac:cxnSpMkLst>
+        </pc:cxnChg>
+        <pc:cxnChg chg="mod">
+          <ac:chgData name="Alonso Guerrero Llorente" userId="451d9a1c5f7013d1" providerId="LiveId" clId="{E10D3731-EFCA-45B7-8039-2282C7B7AC93}" dt="2021-09-18T11:10:57.698" v="106" actId="1076"/>
+          <ac:cxnSpMkLst>
+            <pc:docMk/>
+            <pc:sldMk cId="1813519119" sldId="256"/>
+            <ac:cxnSpMk id="25" creationId="{408B12A5-CF50-4DB7-84EE-A94A4ECB4B75}"/>
+          </ac:cxnSpMkLst>
+        </pc:cxnChg>
+        <pc:cxnChg chg="mod">
+          <ac:chgData name="Alonso Guerrero Llorente" userId="451d9a1c5f7013d1" providerId="LiveId" clId="{E10D3731-EFCA-45B7-8039-2282C7B7AC93}" dt="2021-09-18T11:10:57.698" v="106" actId="1076"/>
+          <ac:cxnSpMkLst>
+            <pc:docMk/>
+            <pc:sldMk cId="1813519119" sldId="256"/>
+            <ac:cxnSpMk id="29" creationId="{2E6C991F-2F72-4934-ABEE-EC27DF075225}"/>
+          </ac:cxnSpMkLst>
+        </pc:cxnChg>
+        <pc:cxnChg chg="add mod">
+          <ac:chgData name="Alonso Guerrero Llorente" userId="451d9a1c5f7013d1" providerId="LiveId" clId="{E10D3731-EFCA-45B7-8039-2282C7B7AC93}" dt="2021-09-18T11:10:57.698" v="106" actId="1076"/>
+          <ac:cxnSpMkLst>
+            <pc:docMk/>
+            <pc:sldMk cId="1813519119" sldId="256"/>
+            <ac:cxnSpMk id="32" creationId="{62111C3B-744F-4550-A82B-36FAC9888420}"/>
+          </ac:cxnSpMkLst>
+        </pc:cxnChg>
+        <pc:cxnChg chg="add del mod">
+          <ac:chgData name="Alonso Guerrero Llorente" userId="451d9a1c5f7013d1" providerId="LiveId" clId="{E10D3731-EFCA-45B7-8039-2282C7B7AC93}" dt="2021-09-18T11:11:17.298" v="116" actId="478"/>
+          <ac:cxnSpMkLst>
+            <pc:docMk/>
+            <pc:sldMk cId="1813519119" sldId="256"/>
+            <ac:cxnSpMk id="41" creationId="{FAD51C7F-C6D2-40FA-B48C-7FC9D66FC894}"/>
+          </ac:cxnSpMkLst>
+        </pc:cxnChg>
+        <pc:cxnChg chg="add mod">
+          <ac:chgData name="Alonso Guerrero Llorente" userId="451d9a1c5f7013d1" providerId="LiveId" clId="{E10D3731-EFCA-45B7-8039-2282C7B7AC93}" dt="2021-09-18T11:11:19.791" v="118" actId="1076"/>
+          <ac:cxnSpMkLst>
+            <pc:docMk/>
+            <pc:sldMk cId="1813519119" sldId="256"/>
+            <ac:cxnSpMk id="43" creationId="{F6599189-C264-4D42-8BD6-ED20B3104F95}"/>
+          </ac:cxnSpMkLst>
+        </pc:cxnChg>
+        <pc:cxnChg chg="add mod">
+          <ac:chgData name="Alonso Guerrero Llorente" userId="451d9a1c5f7013d1" providerId="LiveId" clId="{E10D3731-EFCA-45B7-8039-2282C7B7AC93}" dt="2021-09-18T11:11:04.794" v="108" actId="1076"/>
+          <ac:cxnSpMkLst>
+            <pc:docMk/>
+            <pc:sldMk cId="1813519119" sldId="256"/>
+            <ac:cxnSpMk id="47" creationId="{D476AB6E-1C83-40A6-BE9B-2C9B3821514D}"/>
+          </ac:cxnSpMkLst>
+        </pc:cxnChg>
+        <pc:cxnChg chg="add mod">
+          <ac:chgData name="Alonso Guerrero Llorente" userId="451d9a1c5f7013d1" providerId="LiveId" clId="{E10D3731-EFCA-45B7-8039-2282C7B7AC93}" dt="2021-09-18T11:11:04.794" v="108" actId="1076"/>
+          <ac:cxnSpMkLst>
+            <pc:docMk/>
+            <pc:sldMk cId="1813519119" sldId="256"/>
+            <ac:cxnSpMk id="48" creationId="{45074E4F-B162-4AFD-90CA-BAEB5B6B4BE6}"/>
+          </ac:cxnSpMkLst>
+        </pc:cxnChg>
+        <pc:cxnChg chg="add mod">
+          <ac:chgData name="Alonso Guerrero Llorente" userId="451d9a1c5f7013d1" providerId="LiveId" clId="{E10D3731-EFCA-45B7-8039-2282C7B7AC93}" dt="2021-09-18T11:11:04.794" v="108" actId="1076"/>
+          <ac:cxnSpMkLst>
+            <pc:docMk/>
+            <pc:sldMk cId="1813519119" sldId="256"/>
+            <ac:cxnSpMk id="51" creationId="{36C54D4C-5F97-41AD-99CC-953283692C37}"/>
+          </ac:cxnSpMkLst>
+        </pc:cxnChg>
+        <pc:cxnChg chg="add mod">
+          <ac:chgData name="Alonso Guerrero Llorente" userId="451d9a1c5f7013d1" providerId="LiveId" clId="{E10D3731-EFCA-45B7-8039-2282C7B7AC93}" dt="2021-09-18T11:11:04.794" v="108" actId="1076"/>
+          <ac:cxnSpMkLst>
+            <pc:docMk/>
+            <pc:sldMk cId="1813519119" sldId="256"/>
+            <ac:cxnSpMk id="54" creationId="{D520950A-3B30-47F0-B44B-6A765974E1E4}"/>
+          </ac:cxnSpMkLst>
+        </pc:cxnChg>
       </pc:sldChg>
     </pc:docChg>
   </pc:docChgLst>
@@ -299,7 +664,7 @@
           <a:p>
             <a:fld id="{02CD1CC9-5596-4E27-B1CC-DEB413C482D2}" type="datetimeFigureOut">
               <a:rPr lang="es-ES" smtClean="0"/>
-              <a:t>15/09/2021</a:t>
+              <a:t>18/09/2021</a:t>
             </a:fld>
             <a:endParaRPr lang="es-ES"/>
           </a:p>
@@ -497,7 +862,7 @@
           <a:p>
             <a:fld id="{02CD1CC9-5596-4E27-B1CC-DEB413C482D2}" type="datetimeFigureOut">
               <a:rPr lang="es-ES" smtClean="0"/>
-              <a:t>15/09/2021</a:t>
+              <a:t>18/09/2021</a:t>
             </a:fld>
             <a:endParaRPr lang="es-ES"/>
           </a:p>
@@ -705,7 +1070,7 @@
           <a:p>
             <a:fld id="{02CD1CC9-5596-4E27-B1CC-DEB413C482D2}" type="datetimeFigureOut">
               <a:rPr lang="es-ES" smtClean="0"/>
-              <a:t>15/09/2021</a:t>
+              <a:t>18/09/2021</a:t>
             </a:fld>
             <a:endParaRPr lang="es-ES"/>
           </a:p>
@@ -903,7 +1268,7 @@
           <a:p>
             <a:fld id="{02CD1CC9-5596-4E27-B1CC-DEB413C482D2}" type="datetimeFigureOut">
               <a:rPr lang="es-ES" smtClean="0"/>
-              <a:t>15/09/2021</a:t>
+              <a:t>18/09/2021</a:t>
             </a:fld>
             <a:endParaRPr lang="es-ES"/>
           </a:p>
@@ -1178,7 +1543,7 @@
           <a:p>
             <a:fld id="{02CD1CC9-5596-4E27-B1CC-DEB413C482D2}" type="datetimeFigureOut">
               <a:rPr lang="es-ES" smtClean="0"/>
-              <a:t>15/09/2021</a:t>
+              <a:t>18/09/2021</a:t>
             </a:fld>
             <a:endParaRPr lang="es-ES"/>
           </a:p>
@@ -1443,7 +1808,7 @@
           <a:p>
             <a:fld id="{02CD1CC9-5596-4E27-B1CC-DEB413C482D2}" type="datetimeFigureOut">
               <a:rPr lang="es-ES" smtClean="0"/>
-              <a:t>15/09/2021</a:t>
+              <a:t>18/09/2021</a:t>
             </a:fld>
             <a:endParaRPr lang="es-ES"/>
           </a:p>
@@ -1855,7 +2220,7 @@
           <a:p>
             <a:fld id="{02CD1CC9-5596-4E27-B1CC-DEB413C482D2}" type="datetimeFigureOut">
               <a:rPr lang="es-ES" smtClean="0"/>
-              <a:t>15/09/2021</a:t>
+              <a:t>18/09/2021</a:t>
             </a:fld>
             <a:endParaRPr lang="es-ES"/>
           </a:p>
@@ -1996,7 +2361,7 @@
           <a:p>
             <a:fld id="{02CD1CC9-5596-4E27-B1CC-DEB413C482D2}" type="datetimeFigureOut">
               <a:rPr lang="es-ES" smtClean="0"/>
-              <a:t>15/09/2021</a:t>
+              <a:t>18/09/2021</a:t>
             </a:fld>
             <a:endParaRPr lang="es-ES"/>
           </a:p>
@@ -2109,7 +2474,7 @@
           <a:p>
             <a:fld id="{02CD1CC9-5596-4E27-B1CC-DEB413C482D2}" type="datetimeFigureOut">
               <a:rPr lang="es-ES" smtClean="0"/>
-              <a:t>15/09/2021</a:t>
+              <a:t>18/09/2021</a:t>
             </a:fld>
             <a:endParaRPr lang="es-ES"/>
           </a:p>
@@ -2420,7 +2785,7 @@
           <a:p>
             <a:fld id="{02CD1CC9-5596-4E27-B1CC-DEB413C482D2}" type="datetimeFigureOut">
               <a:rPr lang="es-ES" smtClean="0"/>
-              <a:t>15/09/2021</a:t>
+              <a:t>18/09/2021</a:t>
             </a:fld>
             <a:endParaRPr lang="es-ES"/>
           </a:p>
@@ -2708,7 +3073,7 @@
           <a:p>
             <a:fld id="{02CD1CC9-5596-4E27-B1CC-DEB413C482D2}" type="datetimeFigureOut">
               <a:rPr lang="es-ES" smtClean="0"/>
-              <a:t>15/09/2021</a:t>
+              <a:t>18/09/2021</a:t>
             </a:fld>
             <a:endParaRPr lang="es-ES"/>
           </a:p>
@@ -2949,7 +3314,7 @@
           <a:p>
             <a:fld id="{02CD1CC9-5596-4E27-B1CC-DEB413C482D2}" type="datetimeFigureOut">
               <a:rPr lang="es-ES" smtClean="0"/>
-              <a:t>15/09/2021</a:t>
+              <a:t>18/09/2021</a:t>
             </a:fld>
             <a:endParaRPr lang="es-ES"/>
           </a:p>
@@ -3368,10 +3733,10 @@
       </p:grpSpPr>
       <p:sp>
         <p:nvSpPr>
-          <p:cNvPr id="28" name="Flecha: a la derecha 27">
-            <a:extLst>
-              <a:ext uri="{FF2B5EF4-FFF2-40B4-BE49-F238E27FC236}">
-                <a16:creationId xmlns:a16="http://schemas.microsoft.com/office/drawing/2014/main" id="{02F1A2ED-1ABF-4324-AD01-4A33874597B1}"/>
+          <p:cNvPr id="22" name="Flecha: a la derecha 21">
+            <a:extLst>
+              <a:ext uri="{FF2B5EF4-FFF2-40B4-BE49-F238E27FC236}">
+                <a16:creationId xmlns:a16="http://schemas.microsoft.com/office/drawing/2014/main" id="{BD5C765A-7DF9-404F-90DE-22BDC093305A}"/>
               </a:ext>
             </a:extLst>
           </p:cNvPr>
@@ -3380,7 +3745,7 @@
         </p:nvSpPr>
         <p:spPr>
           <a:xfrm>
-            <a:off x="5550707" y="2718333"/>
+            <a:off x="7476801" y="1453510"/>
             <a:ext cx="3124796" cy="788432"/>
           </a:xfrm>
           <a:prstGeom prst="rightArrow">
@@ -3424,10 +3789,10 @@
       </p:sp>
       <p:sp>
         <p:nvSpPr>
-          <p:cNvPr id="24" name="Flecha: a la derecha 23">
-            <a:extLst>
-              <a:ext uri="{FF2B5EF4-FFF2-40B4-BE49-F238E27FC236}">
-                <a16:creationId xmlns:a16="http://schemas.microsoft.com/office/drawing/2014/main" id="{D4474C89-548E-418F-8F62-425288D15D3C}"/>
+          <p:cNvPr id="28" name="Flecha: a la derecha 27">
+            <a:extLst>
+              <a:ext uri="{FF2B5EF4-FFF2-40B4-BE49-F238E27FC236}">
+                <a16:creationId xmlns:a16="http://schemas.microsoft.com/office/drawing/2014/main" id="{02F1A2ED-1ABF-4324-AD01-4A33874597B1}"/>
               </a:ext>
             </a:extLst>
           </p:cNvPr>
@@ -3436,7 +3801,7 @@
         </p:nvSpPr>
         <p:spPr>
           <a:xfrm>
-            <a:off x="3816693" y="2720804"/>
+            <a:off x="5542318" y="1451596"/>
             <a:ext cx="3124796" cy="788432"/>
           </a:xfrm>
           <a:prstGeom prst="rightArrow">
@@ -3480,10 +3845,10 @@
       </p:sp>
       <p:sp>
         <p:nvSpPr>
-          <p:cNvPr id="23" name="Flecha: a la derecha 22">
-            <a:extLst>
-              <a:ext uri="{FF2B5EF4-FFF2-40B4-BE49-F238E27FC236}">
-                <a16:creationId xmlns:a16="http://schemas.microsoft.com/office/drawing/2014/main" id="{784FA247-F3F1-4A4E-84F4-857554EB6A4A}"/>
+          <p:cNvPr id="24" name="Flecha: a la derecha 23">
+            <a:extLst>
+              <a:ext uri="{FF2B5EF4-FFF2-40B4-BE49-F238E27FC236}">
+                <a16:creationId xmlns:a16="http://schemas.microsoft.com/office/drawing/2014/main" id="{D4474C89-548E-418F-8F62-425288D15D3C}"/>
               </a:ext>
             </a:extLst>
           </p:cNvPr>
@@ -3492,8 +3857,8 @@
         </p:nvSpPr>
         <p:spPr>
           <a:xfrm>
-            <a:off x="2499601" y="2720804"/>
-            <a:ext cx="2382646" cy="788432"/>
+            <a:off x="3808304" y="1454067"/>
+            <a:ext cx="3124796" cy="788432"/>
           </a:xfrm>
           <a:prstGeom prst="rightArrow">
             <a:avLst/>
@@ -3536,10 +3901,10 @@
       </p:sp>
       <p:sp>
         <p:nvSpPr>
-          <p:cNvPr id="4" name="Flecha: a la derecha 3">
-            <a:extLst>
-              <a:ext uri="{FF2B5EF4-FFF2-40B4-BE49-F238E27FC236}">
-                <a16:creationId xmlns:a16="http://schemas.microsoft.com/office/drawing/2014/main" id="{2DDE1D69-81DA-4653-8463-2420EE0FB26A}"/>
+          <p:cNvPr id="23" name="Flecha: a la derecha 22">
+            <a:extLst>
+              <a:ext uri="{FF2B5EF4-FFF2-40B4-BE49-F238E27FC236}">
+                <a16:creationId xmlns:a16="http://schemas.microsoft.com/office/drawing/2014/main" id="{784FA247-F3F1-4A4E-84F4-857554EB6A4A}"/>
               </a:ext>
             </a:extLst>
           </p:cNvPr>
@@ -3548,7 +3913,7 @@
         </p:nvSpPr>
         <p:spPr>
           <a:xfrm>
-            <a:off x="890346" y="2723118"/>
+            <a:off x="2491212" y="1454067"/>
             <a:ext cx="2382646" cy="788432"/>
           </a:xfrm>
           <a:prstGeom prst="rightArrow">
@@ -3592,6 +3957,62 @@
       </p:sp>
       <p:sp>
         <p:nvSpPr>
+          <p:cNvPr id="4" name="Flecha: a la derecha 3">
+            <a:extLst>
+              <a:ext uri="{FF2B5EF4-FFF2-40B4-BE49-F238E27FC236}">
+                <a16:creationId xmlns:a16="http://schemas.microsoft.com/office/drawing/2014/main" id="{2DDE1D69-81DA-4653-8463-2420EE0FB26A}"/>
+              </a:ext>
+            </a:extLst>
+          </p:cNvPr>
+          <p:cNvSpPr/>
+          <p:nvPr/>
+        </p:nvSpPr>
+        <p:spPr>
+          <a:xfrm>
+            <a:off x="881957" y="1447992"/>
+            <a:ext cx="2382646" cy="788432"/>
+          </a:xfrm>
+          <a:prstGeom prst="rightArrow">
+            <a:avLst/>
+          </a:prstGeom>
+          <a:solidFill>
+            <a:srgbClr val="00B0F0"/>
+          </a:solidFill>
+          <a:ln>
+            <a:solidFill>
+              <a:schemeClr val="accent1">
+                <a:lumMod val="75000"/>
+              </a:schemeClr>
+            </a:solidFill>
+          </a:ln>
+        </p:spPr>
+        <p:style>
+          <a:lnRef idx="2">
+            <a:schemeClr val="accent1">
+              <a:shade val="50000"/>
+            </a:schemeClr>
+          </a:lnRef>
+          <a:fillRef idx="1">
+            <a:schemeClr val="accent1"/>
+          </a:fillRef>
+          <a:effectRef idx="0">
+            <a:schemeClr val="accent1"/>
+          </a:effectRef>
+          <a:fontRef idx="minor">
+            <a:schemeClr val="lt1"/>
+          </a:fontRef>
+        </p:style>
+        <p:txBody>
+          <a:bodyPr rtlCol="0" anchor="ctr"/>
+          <a:lstStyle/>
+          <a:p>
+            <a:pPr algn="ctr"/>
+            <a:endParaRPr lang="es-ES"/>
+          </a:p>
+        </p:txBody>
+      </p:sp>
+      <p:sp>
+        <p:nvSpPr>
           <p:cNvPr id="5" name="CuadroTexto 4">
             <a:extLst>
               <a:ext uri="{FF2B5EF4-FFF2-40B4-BE49-F238E27FC236}">
@@ -3604,7 +4025,7 @@
         </p:nvSpPr>
         <p:spPr>
           <a:xfrm>
-            <a:off x="554786" y="2415856"/>
+            <a:off x="546397" y="1149119"/>
             <a:ext cx="671119" cy="369332"/>
           </a:xfrm>
           <a:prstGeom prst="rect">
@@ -3648,7 +4069,7 @@
         </p:nvCxnSpPr>
         <p:spPr>
           <a:xfrm>
-            <a:off x="973123" y="2908300"/>
+            <a:off x="964734" y="1641563"/>
             <a:ext cx="0" cy="412750"/>
           </a:xfrm>
           <a:prstGeom prst="line">
@@ -3691,7 +4112,7 @@
         </p:nvSpPr>
         <p:spPr>
           <a:xfrm>
-            <a:off x="1926386" y="3449480"/>
+            <a:off x="1917997" y="2182743"/>
             <a:ext cx="835864" cy="369332"/>
           </a:xfrm>
           <a:prstGeom prst="rect">
@@ -3735,7 +4156,7 @@
         </p:nvCxnSpPr>
         <p:spPr>
           <a:xfrm>
-            <a:off x="2281223" y="2908300"/>
+            <a:off x="2272834" y="1641563"/>
             <a:ext cx="0" cy="412750"/>
           </a:xfrm>
           <a:prstGeom prst="line">
@@ -3778,16 +4199,21 @@
         </p:nvSpPr>
         <p:spPr>
           <a:xfrm>
-            <a:off x="1561464" y="1707455"/>
+            <a:off x="1501901" y="330896"/>
             <a:ext cx="1465683" cy="1015663"/>
           </a:xfrm>
           <a:prstGeom prst="rect">
             <a:avLst/>
           </a:prstGeom>
-          <a:noFill/>
+          <a:solidFill>
+            <a:schemeClr val="accent6">
+              <a:lumMod val="20000"/>
+              <a:lumOff val="80000"/>
+            </a:schemeClr>
+          </a:solidFill>
           <a:ln w="28575">
             <a:solidFill>
-              <a:schemeClr val="accent4">
+              <a:schemeClr val="accent6">
                 <a:lumMod val="60000"/>
                 <a:lumOff val="40000"/>
               </a:schemeClr>
@@ -3857,7 +4283,7 @@
         </p:nvSpPr>
         <p:spPr>
           <a:xfrm>
-            <a:off x="3385874" y="2465723"/>
+            <a:off x="3377485" y="1198986"/>
             <a:ext cx="835864" cy="369332"/>
           </a:xfrm>
           <a:prstGeom prst="rect">
@@ -3899,16 +4325,21 @@
         </p:nvSpPr>
         <p:spPr>
           <a:xfrm>
-            <a:off x="3284650" y="3467541"/>
+            <a:off x="4995918" y="1132317"/>
             <a:ext cx="1017571" cy="276999"/>
           </a:xfrm>
           <a:prstGeom prst="rect">
             <a:avLst/>
           </a:prstGeom>
-          <a:noFill/>
+          <a:solidFill>
+            <a:schemeClr val="accent6">
+              <a:lumMod val="20000"/>
+              <a:lumOff val="80000"/>
+            </a:schemeClr>
+          </a:solidFill>
           <a:ln w="28575">
             <a:solidFill>
-              <a:schemeClr val="accent4">
+              <a:schemeClr val="accent6">
                 <a:lumMod val="60000"/>
                 <a:lumOff val="40000"/>
               </a:schemeClr>
@@ -3949,7 +4380,7 @@
         </p:nvCxnSpPr>
         <p:spPr>
           <a:xfrm>
-            <a:off x="3810188" y="2908300"/>
+            <a:off x="3801799" y="1641563"/>
             <a:ext cx="0" cy="412750"/>
           </a:xfrm>
           <a:prstGeom prst="line">
@@ -3994,7 +4425,7 @@
         </p:nvCxnSpPr>
         <p:spPr>
           <a:xfrm>
-            <a:off x="5513093" y="2908300"/>
+            <a:off x="5504704" y="1641563"/>
             <a:ext cx="0" cy="412750"/>
           </a:xfrm>
           <a:prstGeom prst="line">
@@ -4037,7 +4468,7 @@
         </p:nvSpPr>
         <p:spPr>
           <a:xfrm>
-            <a:off x="5159143" y="3465783"/>
+            <a:off x="5150754" y="2199046"/>
             <a:ext cx="835864" cy="369332"/>
           </a:xfrm>
           <a:prstGeom prst="rect">
@@ -4079,8 +4510,8 @@
         </p:nvSpPr>
         <p:spPr>
           <a:xfrm>
-            <a:off x="6740690" y="3587979"/>
-            <a:ext cx="1465683" cy="830997"/>
+            <a:off x="6843540" y="2383712"/>
+            <a:ext cx="1465683" cy="461665"/>
           </a:xfrm>
           <a:prstGeom prst="rect">
             <a:avLst/>
@@ -4109,10 +4540,7 @@
               <a:rPr lang="es-ES" sz="1200" dirty="0" err="1"/>
               <a:t>refactor</a:t>
             </a:r>
-            <a:r>
-              <a:rPr lang="es-ES" sz="1200" dirty="0"/>
-              <a:t>?</a:t>
-            </a:r>
+            <a:endParaRPr lang="es-ES" sz="1200" dirty="0"/>
           </a:p>
           <a:p>
             <a:r>
@@ -4121,41 +4549,7 @@
             </a:r>
             <a:r>
               <a:rPr lang="es-ES" sz="1200" dirty="0"/>
-              <a:t> links?</a:t>
-            </a:r>
-          </a:p>
-          <a:p>
-            <a:r>
-              <a:rPr lang="es-ES" sz="1200" dirty="0" err="1"/>
-              <a:t>Fix</a:t>
-            </a:r>
-            <a:r>
-              <a:rPr lang="es-ES" sz="1200" dirty="0"/>
-              <a:t> </a:t>
-            </a:r>
-            <a:r>
-              <a:rPr lang="es-ES" sz="1200" dirty="0" err="1"/>
-              <a:t>distance</a:t>
-            </a:r>
-            <a:r>
-              <a:rPr lang="es-ES" sz="1200" dirty="0"/>
-              <a:t> after </a:t>
-            </a:r>
-            <a:r>
-              <a:rPr lang="es-ES" sz="1200" dirty="0" err="1"/>
-              <a:t>segment</a:t>
-            </a:r>
-            <a:r>
-              <a:rPr lang="es-ES" sz="1200" dirty="0"/>
-              <a:t> </a:t>
-            </a:r>
-            <a:r>
-              <a:rPr lang="es-ES" sz="1200" dirty="0" err="1"/>
-              <a:t>removal</a:t>
-            </a:r>
-            <a:r>
-              <a:rPr lang="es-ES" sz="1200" dirty="0"/>
-              <a:t>?</a:t>
+              <a:t> links</a:t>
             </a:r>
           </a:p>
         </p:txBody>
@@ -4176,7 +4570,7 @@
         </p:nvCxnSpPr>
         <p:spPr>
           <a:xfrm>
-            <a:off x="7430683" y="2908300"/>
+            <a:off x="7422294" y="1641563"/>
             <a:ext cx="0" cy="412750"/>
           </a:xfrm>
           <a:prstGeom prst="line">
@@ -4219,7 +4613,7 @@
         </p:nvSpPr>
         <p:spPr>
           <a:xfrm>
-            <a:off x="7055600" y="2415856"/>
+            <a:off x="7047211" y="1149119"/>
             <a:ext cx="835864" cy="369332"/>
           </a:xfrm>
           <a:prstGeom prst="rect">
@@ -4261,7 +4655,7 @@
         </p:nvSpPr>
         <p:spPr>
           <a:xfrm>
-            <a:off x="4962508" y="2503760"/>
+            <a:off x="8815795" y="1189219"/>
             <a:ext cx="1144346" cy="276999"/>
           </a:xfrm>
           <a:prstGeom prst="rect">
@@ -4296,6 +4690,858 @@
               <a:t>segment</a:t>
             </a:r>
             <a:endParaRPr lang="es-ES" sz="1200" dirty="0"/>
+          </a:p>
+        </p:txBody>
+      </p:sp>
+      <p:cxnSp>
+        <p:nvCxnSpPr>
+          <p:cNvPr id="32" name="Conector recto 31">
+            <a:extLst>
+              <a:ext uri="{FF2B5EF4-FFF2-40B4-BE49-F238E27FC236}">
+                <a16:creationId xmlns:a16="http://schemas.microsoft.com/office/drawing/2014/main" id="{62111C3B-744F-4550-A82B-36FAC9888420}"/>
+              </a:ext>
+            </a:extLst>
+          </p:cNvPr>
+          <p:cNvCxnSpPr>
+            <a:cxnSpLocks/>
+          </p:cNvCxnSpPr>
+          <p:nvPr/>
+        </p:nvCxnSpPr>
+        <p:spPr>
+          <a:xfrm>
+            <a:off x="9378327" y="1641563"/>
+            <a:ext cx="0" cy="412750"/>
+          </a:xfrm>
+          <a:prstGeom prst="line">
+            <a:avLst/>
+          </a:prstGeom>
+          <a:ln w="38100">
+            <a:solidFill>
+              <a:schemeClr val="accent4">
+                <a:lumMod val="75000"/>
+              </a:schemeClr>
+            </a:solidFill>
+          </a:ln>
+        </p:spPr>
+        <p:style>
+          <a:lnRef idx="1">
+            <a:schemeClr val="accent1"/>
+          </a:lnRef>
+          <a:fillRef idx="0">
+            <a:schemeClr val="accent1"/>
+          </a:fillRef>
+          <a:effectRef idx="0">
+            <a:schemeClr val="accent1"/>
+          </a:effectRef>
+          <a:fontRef idx="minor">
+            <a:schemeClr val="tx1"/>
+          </a:fontRef>
+        </p:style>
+      </p:cxnSp>
+      <p:sp>
+        <p:nvSpPr>
+          <p:cNvPr id="33" name="CuadroTexto 32">
+            <a:extLst>
+              <a:ext uri="{FF2B5EF4-FFF2-40B4-BE49-F238E27FC236}">
+                <a16:creationId xmlns:a16="http://schemas.microsoft.com/office/drawing/2014/main" id="{E86F2568-1CFF-452F-AD77-CADF6C45CAA0}"/>
+              </a:ext>
+            </a:extLst>
+          </p:cNvPr>
+          <p:cNvSpPr txBox="1"/>
+          <p:nvPr/>
+        </p:nvSpPr>
+        <p:spPr>
+          <a:xfrm>
+            <a:off x="8960395" y="2240028"/>
+            <a:ext cx="835864" cy="369332"/>
+          </a:xfrm>
+          <a:prstGeom prst="rect">
+            <a:avLst/>
+          </a:prstGeom>
+          <a:noFill/>
+          <a:ln w="38100">
+            <a:solidFill>
+              <a:schemeClr val="accent4">
+                <a:lumMod val="75000"/>
+              </a:schemeClr>
+            </a:solidFill>
+          </a:ln>
+        </p:spPr>
+        <p:txBody>
+          <a:bodyPr wrap="square" rtlCol="0">
+            <a:spAutoFit/>
+          </a:bodyPr>
+          <a:lstStyle/>
+          <a:p>
+            <a:r>
+              <a:rPr lang="es-ES" dirty="0"/>
+              <a:t>V0.1.5</a:t>
+            </a:r>
+          </a:p>
+        </p:txBody>
+      </p:sp>
+      <p:sp>
+        <p:nvSpPr>
+          <p:cNvPr id="34" name="CuadroTexto 33">
+            <a:extLst>
+              <a:ext uri="{FF2B5EF4-FFF2-40B4-BE49-F238E27FC236}">
+                <a16:creationId xmlns:a16="http://schemas.microsoft.com/office/drawing/2014/main" id="{8346D467-61BC-4738-9085-D0C1296A1B5D}"/>
+              </a:ext>
+            </a:extLst>
+          </p:cNvPr>
+          <p:cNvSpPr txBox="1"/>
+          <p:nvPr/>
+        </p:nvSpPr>
+        <p:spPr>
+          <a:xfrm>
+            <a:off x="1112153" y="3757307"/>
+            <a:ext cx="1465683" cy="461665"/>
+          </a:xfrm>
+          <a:prstGeom prst="rect">
+            <a:avLst/>
+          </a:prstGeom>
+          <a:noFill/>
+          <a:ln w="28575">
+            <a:solidFill>
+              <a:schemeClr val="accent4">
+                <a:lumMod val="60000"/>
+                <a:lumOff val="40000"/>
+              </a:schemeClr>
+            </a:solidFill>
+          </a:ln>
+        </p:spPr>
+        <p:txBody>
+          <a:bodyPr wrap="square" rtlCol="0">
+            <a:spAutoFit/>
+          </a:bodyPr>
+          <a:lstStyle/>
+          <a:p>
+            <a:r>
+              <a:rPr lang="es-ES" sz="1200" dirty="0" err="1"/>
+              <a:t>Fix</a:t>
+            </a:r>
+            <a:r>
+              <a:rPr lang="es-ES" sz="1200" dirty="0"/>
+              <a:t> </a:t>
+            </a:r>
+            <a:r>
+              <a:rPr lang="es-ES" sz="1200" dirty="0" err="1"/>
+              <a:t>distance</a:t>
+            </a:r>
+            <a:r>
+              <a:rPr lang="es-ES" sz="1200" dirty="0"/>
+              <a:t> after </a:t>
+            </a:r>
+            <a:r>
+              <a:rPr lang="es-ES" sz="1200" dirty="0" err="1"/>
+              <a:t>segment</a:t>
+            </a:r>
+            <a:r>
+              <a:rPr lang="es-ES" sz="1200" dirty="0"/>
+              <a:t> </a:t>
+            </a:r>
+            <a:r>
+              <a:rPr lang="es-ES" sz="1200" dirty="0" err="1"/>
+              <a:t>removal</a:t>
+            </a:r>
+            <a:endParaRPr lang="es-ES" sz="1200" dirty="0"/>
+          </a:p>
+        </p:txBody>
+      </p:sp>
+      <p:sp>
+        <p:nvSpPr>
+          <p:cNvPr id="35" name="Flecha: a la derecha 34">
+            <a:extLst>
+              <a:ext uri="{FF2B5EF4-FFF2-40B4-BE49-F238E27FC236}">
+                <a16:creationId xmlns:a16="http://schemas.microsoft.com/office/drawing/2014/main" id="{494CEAFC-A87B-4B7E-990D-12F5109F547C}"/>
+              </a:ext>
+            </a:extLst>
+          </p:cNvPr>
+          <p:cNvSpPr/>
+          <p:nvPr/>
+        </p:nvSpPr>
+        <p:spPr>
+          <a:xfrm>
+            <a:off x="7476801" y="4216101"/>
+            <a:ext cx="3124796" cy="788432"/>
+          </a:xfrm>
+          <a:prstGeom prst="rightArrow">
+            <a:avLst/>
+          </a:prstGeom>
+          <a:solidFill>
+            <a:srgbClr val="00B0F0"/>
+          </a:solidFill>
+          <a:ln>
+            <a:solidFill>
+              <a:schemeClr val="accent1">
+                <a:lumMod val="75000"/>
+              </a:schemeClr>
+            </a:solidFill>
+          </a:ln>
+        </p:spPr>
+        <p:style>
+          <a:lnRef idx="2">
+            <a:schemeClr val="accent1">
+              <a:shade val="50000"/>
+            </a:schemeClr>
+          </a:lnRef>
+          <a:fillRef idx="1">
+            <a:schemeClr val="accent1"/>
+          </a:fillRef>
+          <a:effectRef idx="0">
+            <a:schemeClr val="accent1"/>
+          </a:effectRef>
+          <a:fontRef idx="minor">
+            <a:schemeClr val="lt1"/>
+          </a:fontRef>
+        </p:style>
+        <p:txBody>
+          <a:bodyPr rtlCol="0" anchor="ctr"/>
+          <a:lstStyle/>
+          <a:p>
+            <a:pPr algn="ctr"/>
+            <a:endParaRPr lang="es-ES"/>
+          </a:p>
+        </p:txBody>
+      </p:sp>
+      <p:sp>
+        <p:nvSpPr>
+          <p:cNvPr id="36" name="Flecha: a la derecha 35">
+            <a:extLst>
+              <a:ext uri="{FF2B5EF4-FFF2-40B4-BE49-F238E27FC236}">
+                <a16:creationId xmlns:a16="http://schemas.microsoft.com/office/drawing/2014/main" id="{B66920C0-5D30-4285-A97C-53F2A7440D2B}"/>
+              </a:ext>
+            </a:extLst>
+          </p:cNvPr>
+          <p:cNvSpPr/>
+          <p:nvPr/>
+        </p:nvSpPr>
+        <p:spPr>
+          <a:xfrm>
+            <a:off x="5542318" y="4222576"/>
+            <a:ext cx="3124796" cy="788432"/>
+          </a:xfrm>
+          <a:prstGeom prst="rightArrow">
+            <a:avLst/>
+          </a:prstGeom>
+          <a:solidFill>
+            <a:srgbClr val="00B0F0"/>
+          </a:solidFill>
+          <a:ln>
+            <a:solidFill>
+              <a:schemeClr val="accent1">
+                <a:lumMod val="75000"/>
+              </a:schemeClr>
+            </a:solidFill>
+          </a:ln>
+        </p:spPr>
+        <p:style>
+          <a:lnRef idx="2">
+            <a:schemeClr val="accent1">
+              <a:shade val="50000"/>
+            </a:schemeClr>
+          </a:lnRef>
+          <a:fillRef idx="1">
+            <a:schemeClr val="accent1"/>
+          </a:fillRef>
+          <a:effectRef idx="0">
+            <a:schemeClr val="accent1"/>
+          </a:effectRef>
+          <a:fontRef idx="minor">
+            <a:schemeClr val="lt1"/>
+          </a:fontRef>
+        </p:style>
+        <p:txBody>
+          <a:bodyPr rtlCol="0" anchor="ctr"/>
+          <a:lstStyle/>
+          <a:p>
+            <a:pPr algn="ctr"/>
+            <a:endParaRPr lang="es-ES"/>
+          </a:p>
+        </p:txBody>
+      </p:sp>
+      <p:sp>
+        <p:nvSpPr>
+          <p:cNvPr id="37" name="Flecha: a la derecha 36">
+            <a:extLst>
+              <a:ext uri="{FF2B5EF4-FFF2-40B4-BE49-F238E27FC236}">
+                <a16:creationId xmlns:a16="http://schemas.microsoft.com/office/drawing/2014/main" id="{43B149ED-2CA3-4547-AFF9-B37380C17270}"/>
+              </a:ext>
+            </a:extLst>
+          </p:cNvPr>
+          <p:cNvSpPr/>
+          <p:nvPr/>
+        </p:nvSpPr>
+        <p:spPr>
+          <a:xfrm>
+            <a:off x="3808304" y="4216658"/>
+            <a:ext cx="3124796" cy="788432"/>
+          </a:xfrm>
+          <a:prstGeom prst="rightArrow">
+            <a:avLst/>
+          </a:prstGeom>
+          <a:solidFill>
+            <a:srgbClr val="00B0F0"/>
+          </a:solidFill>
+          <a:ln>
+            <a:solidFill>
+              <a:schemeClr val="accent1">
+                <a:lumMod val="75000"/>
+              </a:schemeClr>
+            </a:solidFill>
+          </a:ln>
+        </p:spPr>
+        <p:style>
+          <a:lnRef idx="2">
+            <a:schemeClr val="accent1">
+              <a:shade val="50000"/>
+            </a:schemeClr>
+          </a:lnRef>
+          <a:fillRef idx="1">
+            <a:schemeClr val="accent1"/>
+          </a:fillRef>
+          <a:effectRef idx="0">
+            <a:schemeClr val="accent1"/>
+          </a:effectRef>
+          <a:fontRef idx="minor">
+            <a:schemeClr val="lt1"/>
+          </a:fontRef>
+        </p:style>
+        <p:txBody>
+          <a:bodyPr rtlCol="0" anchor="ctr"/>
+          <a:lstStyle/>
+          <a:p>
+            <a:pPr algn="ctr"/>
+            <a:endParaRPr lang="es-ES"/>
+          </a:p>
+        </p:txBody>
+      </p:sp>
+      <p:sp>
+        <p:nvSpPr>
+          <p:cNvPr id="38" name="Flecha: a la derecha 37">
+            <a:extLst>
+              <a:ext uri="{FF2B5EF4-FFF2-40B4-BE49-F238E27FC236}">
+                <a16:creationId xmlns:a16="http://schemas.microsoft.com/office/drawing/2014/main" id="{8B147247-3BF7-4730-B43F-0C8EE53F75C1}"/>
+              </a:ext>
+            </a:extLst>
+          </p:cNvPr>
+          <p:cNvSpPr/>
+          <p:nvPr/>
+        </p:nvSpPr>
+        <p:spPr>
+          <a:xfrm>
+            <a:off x="2491212" y="4216658"/>
+            <a:ext cx="2382646" cy="788432"/>
+          </a:xfrm>
+          <a:prstGeom prst="rightArrow">
+            <a:avLst/>
+          </a:prstGeom>
+          <a:solidFill>
+            <a:srgbClr val="00B0F0"/>
+          </a:solidFill>
+          <a:ln>
+            <a:solidFill>
+              <a:schemeClr val="accent1">
+                <a:lumMod val="75000"/>
+              </a:schemeClr>
+            </a:solidFill>
+          </a:ln>
+        </p:spPr>
+        <p:style>
+          <a:lnRef idx="2">
+            <a:schemeClr val="accent1">
+              <a:shade val="50000"/>
+            </a:schemeClr>
+          </a:lnRef>
+          <a:fillRef idx="1">
+            <a:schemeClr val="accent1"/>
+          </a:fillRef>
+          <a:effectRef idx="0">
+            <a:schemeClr val="accent1"/>
+          </a:effectRef>
+          <a:fontRef idx="minor">
+            <a:schemeClr val="lt1"/>
+          </a:fontRef>
+        </p:style>
+        <p:txBody>
+          <a:bodyPr rtlCol="0" anchor="ctr"/>
+          <a:lstStyle/>
+          <a:p>
+            <a:pPr algn="ctr"/>
+            <a:endParaRPr lang="es-ES"/>
+          </a:p>
+        </p:txBody>
+      </p:sp>
+      <p:sp>
+        <p:nvSpPr>
+          <p:cNvPr id="39" name="Flecha: a la derecha 38">
+            <a:extLst>
+              <a:ext uri="{FF2B5EF4-FFF2-40B4-BE49-F238E27FC236}">
+                <a16:creationId xmlns:a16="http://schemas.microsoft.com/office/drawing/2014/main" id="{6CFE131A-964B-4143-A5B1-72A19AC46C0E}"/>
+              </a:ext>
+            </a:extLst>
+          </p:cNvPr>
+          <p:cNvSpPr/>
+          <p:nvPr/>
+        </p:nvSpPr>
+        <p:spPr>
+          <a:xfrm>
+            <a:off x="881957" y="4218972"/>
+            <a:ext cx="2382646" cy="788432"/>
+          </a:xfrm>
+          <a:prstGeom prst="rightArrow">
+            <a:avLst/>
+          </a:prstGeom>
+          <a:solidFill>
+            <a:srgbClr val="00B0F0"/>
+          </a:solidFill>
+          <a:ln>
+            <a:solidFill>
+              <a:schemeClr val="accent1">
+                <a:lumMod val="75000"/>
+              </a:schemeClr>
+            </a:solidFill>
+          </a:ln>
+        </p:spPr>
+        <p:style>
+          <a:lnRef idx="2">
+            <a:schemeClr val="accent1">
+              <a:shade val="50000"/>
+            </a:schemeClr>
+          </a:lnRef>
+          <a:fillRef idx="1">
+            <a:schemeClr val="accent1"/>
+          </a:fillRef>
+          <a:effectRef idx="0">
+            <a:schemeClr val="accent1"/>
+          </a:effectRef>
+          <a:fontRef idx="minor">
+            <a:schemeClr val="lt1"/>
+          </a:fontRef>
+        </p:style>
+        <p:txBody>
+          <a:bodyPr rtlCol="0" anchor="ctr"/>
+          <a:lstStyle/>
+          <a:p>
+            <a:pPr algn="ctr"/>
+            <a:endParaRPr lang="es-ES"/>
+          </a:p>
+        </p:txBody>
+      </p:sp>
+      <p:sp>
+        <p:nvSpPr>
+          <p:cNvPr id="42" name="CuadroTexto 41">
+            <a:extLst>
+              <a:ext uri="{FF2B5EF4-FFF2-40B4-BE49-F238E27FC236}">
+                <a16:creationId xmlns:a16="http://schemas.microsoft.com/office/drawing/2014/main" id="{1ABD6C16-AA33-41CD-9BB4-E3399CAFACA5}"/>
+              </a:ext>
+            </a:extLst>
+          </p:cNvPr>
+          <p:cNvSpPr txBox="1"/>
+          <p:nvPr/>
+        </p:nvSpPr>
+        <p:spPr>
+          <a:xfrm>
+            <a:off x="1362067" y="4939605"/>
+            <a:ext cx="835864" cy="369332"/>
+          </a:xfrm>
+          <a:prstGeom prst="rect">
+            <a:avLst/>
+          </a:prstGeom>
+          <a:noFill/>
+          <a:ln w="38100">
+            <a:solidFill>
+              <a:schemeClr val="accent4">
+                <a:lumMod val="75000"/>
+              </a:schemeClr>
+            </a:solidFill>
+          </a:ln>
+        </p:spPr>
+        <p:txBody>
+          <a:bodyPr wrap="square" rtlCol="0">
+            <a:spAutoFit/>
+          </a:bodyPr>
+          <a:lstStyle/>
+          <a:p>
+            <a:r>
+              <a:rPr lang="es-ES" dirty="0"/>
+              <a:t>V0.1.6</a:t>
+            </a:r>
+          </a:p>
+        </p:txBody>
+      </p:sp>
+      <p:cxnSp>
+        <p:nvCxnSpPr>
+          <p:cNvPr id="43" name="Conector recto 42">
+            <a:extLst>
+              <a:ext uri="{FF2B5EF4-FFF2-40B4-BE49-F238E27FC236}">
+                <a16:creationId xmlns:a16="http://schemas.microsoft.com/office/drawing/2014/main" id="{F6599189-C264-4D42-8BD6-ED20B3104F95}"/>
+              </a:ext>
+            </a:extLst>
+          </p:cNvPr>
+          <p:cNvCxnSpPr>
+            <a:cxnSpLocks/>
+          </p:cNvCxnSpPr>
+          <p:nvPr/>
+        </p:nvCxnSpPr>
+        <p:spPr>
+          <a:xfrm>
+            <a:off x="1844995" y="4404154"/>
+            <a:ext cx="0" cy="412750"/>
+          </a:xfrm>
+          <a:prstGeom prst="line">
+            <a:avLst/>
+          </a:prstGeom>
+          <a:ln w="38100">
+            <a:solidFill>
+              <a:schemeClr val="accent4">
+                <a:lumMod val="75000"/>
+              </a:schemeClr>
+            </a:solidFill>
+          </a:ln>
+        </p:spPr>
+        <p:style>
+          <a:lnRef idx="1">
+            <a:schemeClr val="accent1"/>
+          </a:lnRef>
+          <a:fillRef idx="0">
+            <a:schemeClr val="accent1"/>
+          </a:fillRef>
+          <a:effectRef idx="0">
+            <a:schemeClr val="accent1"/>
+          </a:effectRef>
+          <a:fontRef idx="minor">
+            <a:schemeClr val="tx1"/>
+          </a:fontRef>
+        </p:style>
+      </p:cxnSp>
+      <p:cxnSp>
+        <p:nvCxnSpPr>
+          <p:cNvPr id="47" name="Conector recto 46">
+            <a:extLst>
+              <a:ext uri="{FF2B5EF4-FFF2-40B4-BE49-F238E27FC236}">
+                <a16:creationId xmlns:a16="http://schemas.microsoft.com/office/drawing/2014/main" id="{D476AB6E-1C83-40A6-BE9B-2C9B3821514D}"/>
+              </a:ext>
+            </a:extLst>
+          </p:cNvPr>
+          <p:cNvCxnSpPr>
+            <a:cxnSpLocks/>
+          </p:cNvCxnSpPr>
+          <p:nvPr/>
+        </p:nvCxnSpPr>
+        <p:spPr>
+          <a:xfrm>
+            <a:off x="3801799" y="4404154"/>
+            <a:ext cx="0" cy="412750"/>
+          </a:xfrm>
+          <a:prstGeom prst="line">
+            <a:avLst/>
+          </a:prstGeom>
+          <a:ln w="38100">
+            <a:solidFill>
+              <a:schemeClr val="accent4">
+                <a:lumMod val="75000"/>
+              </a:schemeClr>
+            </a:solidFill>
+          </a:ln>
+        </p:spPr>
+        <p:style>
+          <a:lnRef idx="1">
+            <a:schemeClr val="accent1"/>
+          </a:lnRef>
+          <a:fillRef idx="0">
+            <a:schemeClr val="accent1"/>
+          </a:fillRef>
+          <a:effectRef idx="0">
+            <a:schemeClr val="accent1"/>
+          </a:effectRef>
+          <a:fontRef idx="minor">
+            <a:schemeClr val="tx1"/>
+          </a:fontRef>
+        </p:style>
+      </p:cxnSp>
+      <p:cxnSp>
+        <p:nvCxnSpPr>
+          <p:cNvPr id="48" name="Conector recto 47">
+            <a:extLst>
+              <a:ext uri="{FF2B5EF4-FFF2-40B4-BE49-F238E27FC236}">
+                <a16:creationId xmlns:a16="http://schemas.microsoft.com/office/drawing/2014/main" id="{45074E4F-B162-4AFD-90CA-BAEB5B6B4BE6}"/>
+              </a:ext>
+            </a:extLst>
+          </p:cNvPr>
+          <p:cNvCxnSpPr>
+            <a:cxnSpLocks/>
+          </p:cNvCxnSpPr>
+          <p:nvPr/>
+        </p:nvCxnSpPr>
+        <p:spPr>
+          <a:xfrm>
+            <a:off x="5504704" y="4404154"/>
+            <a:ext cx="0" cy="412750"/>
+          </a:xfrm>
+          <a:prstGeom prst="line">
+            <a:avLst/>
+          </a:prstGeom>
+          <a:ln w="38100">
+            <a:solidFill>
+              <a:schemeClr val="accent4">
+                <a:lumMod val="75000"/>
+              </a:schemeClr>
+            </a:solidFill>
+          </a:ln>
+        </p:spPr>
+        <p:style>
+          <a:lnRef idx="1">
+            <a:schemeClr val="accent1"/>
+          </a:lnRef>
+          <a:fillRef idx="0">
+            <a:schemeClr val="accent1"/>
+          </a:fillRef>
+          <a:effectRef idx="0">
+            <a:schemeClr val="accent1"/>
+          </a:effectRef>
+          <a:fontRef idx="minor">
+            <a:schemeClr val="tx1"/>
+          </a:fontRef>
+        </p:style>
+      </p:cxnSp>
+      <p:cxnSp>
+        <p:nvCxnSpPr>
+          <p:cNvPr id="51" name="Conector recto 50">
+            <a:extLst>
+              <a:ext uri="{FF2B5EF4-FFF2-40B4-BE49-F238E27FC236}">
+                <a16:creationId xmlns:a16="http://schemas.microsoft.com/office/drawing/2014/main" id="{36C54D4C-5F97-41AD-99CC-953283692C37}"/>
+              </a:ext>
+            </a:extLst>
+          </p:cNvPr>
+          <p:cNvCxnSpPr>
+            <a:cxnSpLocks/>
+          </p:cNvCxnSpPr>
+          <p:nvPr/>
+        </p:nvCxnSpPr>
+        <p:spPr>
+          <a:xfrm>
+            <a:off x="7422294" y="4404154"/>
+            <a:ext cx="0" cy="412750"/>
+          </a:xfrm>
+          <a:prstGeom prst="line">
+            <a:avLst/>
+          </a:prstGeom>
+          <a:ln w="38100">
+            <a:solidFill>
+              <a:schemeClr val="accent4">
+                <a:lumMod val="75000"/>
+              </a:schemeClr>
+            </a:solidFill>
+          </a:ln>
+        </p:spPr>
+        <p:style>
+          <a:lnRef idx="1">
+            <a:schemeClr val="accent1"/>
+          </a:lnRef>
+          <a:fillRef idx="0">
+            <a:schemeClr val="accent1"/>
+          </a:fillRef>
+          <a:effectRef idx="0">
+            <a:schemeClr val="accent1"/>
+          </a:effectRef>
+          <a:fontRef idx="minor">
+            <a:schemeClr val="tx1"/>
+          </a:fontRef>
+        </p:style>
+      </p:cxnSp>
+      <p:cxnSp>
+        <p:nvCxnSpPr>
+          <p:cNvPr id="54" name="Conector recto 53">
+            <a:extLst>
+              <a:ext uri="{FF2B5EF4-FFF2-40B4-BE49-F238E27FC236}">
+                <a16:creationId xmlns:a16="http://schemas.microsoft.com/office/drawing/2014/main" id="{D520950A-3B30-47F0-B44B-6A765974E1E4}"/>
+              </a:ext>
+            </a:extLst>
+          </p:cNvPr>
+          <p:cNvCxnSpPr>
+            <a:cxnSpLocks/>
+          </p:cNvCxnSpPr>
+          <p:nvPr/>
+        </p:nvCxnSpPr>
+        <p:spPr>
+          <a:xfrm>
+            <a:off x="9378327" y="4404154"/>
+            <a:ext cx="0" cy="412750"/>
+          </a:xfrm>
+          <a:prstGeom prst="line">
+            <a:avLst/>
+          </a:prstGeom>
+          <a:ln w="38100">
+            <a:solidFill>
+              <a:schemeClr val="accent4">
+                <a:lumMod val="75000"/>
+              </a:schemeClr>
+            </a:solidFill>
+          </a:ln>
+        </p:spPr>
+        <p:style>
+          <a:lnRef idx="1">
+            <a:schemeClr val="accent1"/>
+          </a:lnRef>
+          <a:fillRef idx="0">
+            <a:schemeClr val="accent1"/>
+          </a:fillRef>
+          <a:effectRef idx="0">
+            <a:schemeClr val="accent1"/>
+          </a:effectRef>
+          <a:fontRef idx="minor">
+            <a:schemeClr val="tx1"/>
+          </a:fontRef>
+        </p:style>
+      </p:cxnSp>
+      <p:sp>
+        <p:nvSpPr>
+          <p:cNvPr id="57" name="CuadroTexto 56">
+            <a:extLst>
+              <a:ext uri="{FF2B5EF4-FFF2-40B4-BE49-F238E27FC236}">
+                <a16:creationId xmlns:a16="http://schemas.microsoft.com/office/drawing/2014/main" id="{51DCCDF9-3046-4212-8E50-E5E8272F4C4C}"/>
+              </a:ext>
+            </a:extLst>
+          </p:cNvPr>
+          <p:cNvSpPr txBox="1"/>
+          <p:nvPr/>
+        </p:nvSpPr>
+        <p:spPr>
+          <a:xfrm>
+            <a:off x="3258894" y="2285420"/>
+            <a:ext cx="1109931" cy="276999"/>
+          </a:xfrm>
+          <a:prstGeom prst="rect">
+            <a:avLst/>
+          </a:prstGeom>
+          <a:solidFill>
+            <a:schemeClr val="accent6">
+              <a:lumMod val="20000"/>
+              <a:lumOff val="80000"/>
+            </a:schemeClr>
+          </a:solidFill>
+          <a:ln w="28575">
+            <a:solidFill>
+              <a:schemeClr val="accent6">
+                <a:lumMod val="60000"/>
+                <a:lumOff val="40000"/>
+              </a:schemeClr>
+            </a:solidFill>
+          </a:ln>
+        </p:spPr>
+        <p:txBody>
+          <a:bodyPr wrap="square" rtlCol="0">
+            <a:spAutoFit/>
+          </a:bodyPr>
+          <a:lstStyle/>
+          <a:p>
+            <a:r>
+              <a:rPr lang="es-ES" sz="1200" dirty="0" err="1"/>
+              <a:t>github</a:t>
+            </a:r>
+            <a:r>
+              <a:rPr lang="es-ES" sz="1200" dirty="0"/>
+              <a:t> </a:t>
+            </a:r>
+            <a:r>
+              <a:rPr lang="es-ES" sz="1200" dirty="0" err="1"/>
+              <a:t>secrets</a:t>
+            </a:r>
+            <a:endParaRPr lang="es-ES" sz="1200" dirty="0"/>
+          </a:p>
+        </p:txBody>
+      </p:sp>
+      <p:sp>
+        <p:nvSpPr>
+          <p:cNvPr id="58" name="CuadroTexto 57">
+            <a:extLst>
+              <a:ext uri="{FF2B5EF4-FFF2-40B4-BE49-F238E27FC236}">
+                <a16:creationId xmlns:a16="http://schemas.microsoft.com/office/drawing/2014/main" id="{E14DE0E9-6875-4F26-9B9C-2A694560EFCE}"/>
+              </a:ext>
+            </a:extLst>
+          </p:cNvPr>
+          <p:cNvSpPr txBox="1"/>
+          <p:nvPr/>
+        </p:nvSpPr>
+        <p:spPr>
+          <a:xfrm>
+            <a:off x="10924902" y="68242"/>
+            <a:ext cx="644340" cy="276999"/>
+          </a:xfrm>
+          <a:prstGeom prst="rect">
+            <a:avLst/>
+          </a:prstGeom>
+          <a:solidFill>
+            <a:schemeClr val="accent6">
+              <a:lumMod val="20000"/>
+              <a:lumOff val="80000"/>
+            </a:schemeClr>
+          </a:solidFill>
+          <a:ln w="28575">
+            <a:solidFill>
+              <a:schemeClr val="accent6">
+                <a:lumMod val="60000"/>
+                <a:lumOff val="40000"/>
+              </a:schemeClr>
+            </a:solidFill>
+          </a:ln>
+        </p:spPr>
+        <p:txBody>
+          <a:bodyPr wrap="square" rtlCol="0">
+            <a:spAutoFit/>
+          </a:bodyPr>
+          <a:lstStyle/>
+          <a:p>
+            <a:pPr algn="ctr"/>
+            <a:r>
+              <a:rPr lang="es-ES" sz="1200" dirty="0"/>
+              <a:t>DONE</a:t>
+            </a:r>
+          </a:p>
+        </p:txBody>
+      </p:sp>
+      <p:sp>
+        <p:nvSpPr>
+          <p:cNvPr id="59" name="CuadroTexto 58">
+            <a:extLst>
+              <a:ext uri="{FF2B5EF4-FFF2-40B4-BE49-F238E27FC236}">
+                <a16:creationId xmlns:a16="http://schemas.microsoft.com/office/drawing/2014/main" id="{CFB0600F-AF7A-46C1-BA36-0EC4575B2C75}"/>
+              </a:ext>
+            </a:extLst>
+          </p:cNvPr>
+          <p:cNvSpPr txBox="1"/>
+          <p:nvPr/>
+        </p:nvSpPr>
+        <p:spPr>
+          <a:xfrm>
+            <a:off x="10857790" y="431467"/>
+            <a:ext cx="856155" cy="276999"/>
+          </a:xfrm>
+          <a:prstGeom prst="rect">
+            <a:avLst/>
+          </a:prstGeom>
+          <a:noFill/>
+          <a:ln w="28575">
+            <a:solidFill>
+              <a:schemeClr val="accent4">
+                <a:lumMod val="60000"/>
+                <a:lumOff val="40000"/>
+              </a:schemeClr>
+            </a:solidFill>
+          </a:ln>
+        </p:spPr>
+        <p:txBody>
+          <a:bodyPr wrap="square" rtlCol="0">
+            <a:spAutoFit/>
+          </a:bodyPr>
+          <a:lstStyle/>
+          <a:p>
+            <a:pPr algn="ctr"/>
+            <a:r>
+              <a:rPr lang="es-ES" sz="1200" dirty="0"/>
+              <a:t>PLANNED</a:t>
+            </a:r>
           </a:p>
         </p:txBody>
       </p:sp>

</xml_diff>

<commit_message>
Update roadmap after v0.1.4
</commit_message>
<xml_diff>
--- a/docs/roadmap.pptx
+++ b/docs/roadmap.pptx
@@ -115,7 +115,7 @@
 <file path=ppt/revisionInfo.xml><?xml version="1.0" encoding="utf-8"?>
 <p1510:revInfo xmlns:a="http://schemas.openxmlformats.org/drawingml/2006/main" xmlns:r="http://schemas.openxmlformats.org/officeDocument/2006/relationships" xmlns:p1510="http://schemas.microsoft.com/office/powerpoint/2015/10/main">
   <p1510:revLst>
-    <p1510:client id="{E10D3731-EFCA-45B7-8039-2282C7B7AC93}" v="8" dt="2021-09-18T11:14:27.993"/>
+    <p1510:client id="{294FDEE4-22F5-4BA6-8A7A-6B03A781B212}" v="9" dt="2021-10-03T18:48:16.310"/>
   </p1510:revLst>
 </p1510:revInfo>
 </file>
@@ -514,6 +514,118 @@
       </pc:sldChg>
     </pc:docChg>
   </pc:docChgLst>
+  <pc:docChgLst>
+    <pc:chgData name="Alonso Guerrero Llorente" userId="451d9a1c5f7013d1" providerId="LiveId" clId="{294FDEE4-22F5-4BA6-8A7A-6B03A781B212}"/>
+    <pc:docChg chg="undo custSel modSld">
+      <pc:chgData name="Alonso Guerrero Llorente" userId="451d9a1c5f7013d1" providerId="LiveId" clId="{294FDEE4-22F5-4BA6-8A7A-6B03A781B212}" dt="2021-10-03T18:48:16.310" v="141"/>
+      <pc:docMkLst>
+        <pc:docMk/>
+      </pc:docMkLst>
+      <pc:sldChg chg="addSp delSp modSp mod">
+        <pc:chgData name="Alonso Guerrero Llorente" userId="451d9a1c5f7013d1" providerId="LiveId" clId="{294FDEE4-22F5-4BA6-8A7A-6B03A781B212}" dt="2021-10-03T18:48:16.310" v="141"/>
+        <pc:sldMkLst>
+          <pc:docMk/>
+          <pc:sldMk cId="1813519119" sldId="256"/>
+        </pc:sldMkLst>
+        <pc:spChg chg="mod">
+          <ac:chgData name="Alonso Guerrero Llorente" userId="451d9a1c5f7013d1" providerId="LiveId" clId="{294FDEE4-22F5-4BA6-8A7A-6B03A781B212}" dt="2021-10-03T18:47:52.077" v="134" actId="1076"/>
+          <ac:spMkLst>
+            <pc:docMk/>
+            <pc:sldMk cId="1813519119" sldId="256"/>
+            <ac:spMk id="21" creationId="{A43C41FD-0579-464D-95CF-A88C9555CB9F}"/>
+          </ac:spMkLst>
+        </pc:spChg>
+        <pc:spChg chg="del mod">
+          <ac:chgData name="Alonso Guerrero Llorente" userId="451d9a1c5f7013d1" providerId="LiveId" clId="{294FDEE4-22F5-4BA6-8A7A-6B03A781B212}" dt="2021-10-03T18:11:06.668" v="8" actId="478"/>
+          <ac:spMkLst>
+            <pc:docMk/>
+            <pc:sldMk cId="1813519119" sldId="256"/>
+            <ac:spMk id="27" creationId="{4E05F8F1-3F81-4D62-A850-70F1D35440BB}"/>
+          </ac:spMkLst>
+        </pc:spChg>
+        <pc:spChg chg="mod">
+          <ac:chgData name="Alonso Guerrero Llorente" userId="451d9a1c5f7013d1" providerId="LiveId" clId="{294FDEE4-22F5-4BA6-8A7A-6B03A781B212}" dt="2021-10-03T18:38:23.468" v="14" actId="1076"/>
+          <ac:spMkLst>
+            <pc:docMk/>
+            <pc:sldMk cId="1813519119" sldId="256"/>
+            <ac:spMk id="31" creationId="{DA013763-AE25-43D1-8FC4-C2A05AD9203C}"/>
+          </ac:spMkLst>
+        </pc:spChg>
+        <pc:spChg chg="mod">
+          <ac:chgData name="Alonso Guerrero Llorente" userId="451d9a1c5f7013d1" providerId="LiveId" clId="{294FDEE4-22F5-4BA6-8A7A-6B03A781B212}" dt="2021-10-03T18:38:33.764" v="30" actId="1076"/>
+          <ac:spMkLst>
+            <pc:docMk/>
+            <pc:sldMk cId="1813519119" sldId="256"/>
+            <ac:spMk id="34" creationId="{8346D467-61BC-4738-9085-D0C1296A1B5D}"/>
+          </ac:spMkLst>
+        </pc:spChg>
+        <pc:spChg chg="add mod">
+          <ac:chgData name="Alonso Guerrero Llorente" userId="451d9a1c5f7013d1" providerId="LiveId" clId="{294FDEE4-22F5-4BA6-8A7A-6B03A781B212}" dt="2021-10-03T18:41:37.392" v="126" actId="1076"/>
+          <ac:spMkLst>
+            <pc:docMk/>
+            <pc:sldMk cId="1813519119" sldId="256"/>
+            <ac:spMk id="40" creationId="{5B8E0F08-24C4-47C4-B963-FBBB6EE1CA84}"/>
+          </ac:spMkLst>
+        </pc:spChg>
+        <pc:spChg chg="add mod">
+          <ac:chgData name="Alonso Guerrero Llorente" userId="451d9a1c5f7013d1" providerId="LiveId" clId="{294FDEE4-22F5-4BA6-8A7A-6B03A781B212}" dt="2021-10-03T18:39:28.404" v="34" actId="20577"/>
+          <ac:spMkLst>
+            <pc:docMk/>
+            <pc:sldMk cId="1813519119" sldId="256"/>
+            <ac:spMk id="41" creationId="{4BF2A48C-CCA1-4887-9505-98DE0B22CD09}"/>
+          </ac:spMkLst>
+        </pc:spChg>
+        <pc:spChg chg="add mod">
+          <ac:chgData name="Alonso Guerrero Llorente" userId="451d9a1c5f7013d1" providerId="LiveId" clId="{294FDEE4-22F5-4BA6-8A7A-6B03A781B212}" dt="2021-10-03T18:48:07.949" v="135" actId="1076"/>
+          <ac:spMkLst>
+            <pc:docMk/>
+            <pc:sldMk cId="1813519119" sldId="256"/>
+            <ac:spMk id="44" creationId="{E9302D34-1059-465D-8CDA-59463A72E11A}"/>
+          </ac:spMkLst>
+        </pc:spChg>
+        <pc:spChg chg="add mod">
+          <ac:chgData name="Alonso Guerrero Llorente" userId="451d9a1c5f7013d1" providerId="LiveId" clId="{294FDEE4-22F5-4BA6-8A7A-6B03A781B212}" dt="2021-10-03T18:40:10.786" v="101" actId="1076"/>
+          <ac:spMkLst>
+            <pc:docMk/>
+            <pc:sldMk cId="1813519119" sldId="256"/>
+            <ac:spMk id="45" creationId="{AE2EDDC6-CEBF-4738-A65C-93AC2F522E5F}"/>
+          </ac:spMkLst>
+        </pc:spChg>
+        <pc:spChg chg="add mod">
+          <ac:chgData name="Alonso Guerrero Llorente" userId="451d9a1c5f7013d1" providerId="LiveId" clId="{294FDEE4-22F5-4BA6-8A7A-6B03A781B212}" dt="2021-10-03T18:40:13.760" v="102" actId="1076"/>
+          <ac:spMkLst>
+            <pc:docMk/>
+            <pc:sldMk cId="1813519119" sldId="256"/>
+            <ac:spMk id="46" creationId="{C9529B70-423C-431D-9460-BC47659DD43F}"/>
+          </ac:spMkLst>
+        </pc:spChg>
+        <pc:spChg chg="add del mod">
+          <ac:chgData name="Alonso Guerrero Llorente" userId="451d9a1c5f7013d1" providerId="LiveId" clId="{294FDEE4-22F5-4BA6-8A7A-6B03A781B212}" dt="2021-10-03T18:48:16.310" v="141"/>
+          <ac:spMkLst>
+            <pc:docMk/>
+            <pc:sldMk cId="1813519119" sldId="256"/>
+            <ac:spMk id="49" creationId="{6685D30B-229D-4943-B9B8-B862480E60CC}"/>
+          </ac:spMkLst>
+        </pc:spChg>
+        <pc:spChg chg="add del mod">
+          <ac:chgData name="Alonso Guerrero Llorente" userId="451d9a1c5f7013d1" providerId="LiveId" clId="{294FDEE4-22F5-4BA6-8A7A-6B03A781B212}" dt="2021-10-03T18:48:14.488" v="139"/>
+          <ac:spMkLst>
+            <pc:docMk/>
+            <pc:sldMk cId="1813519119" sldId="256"/>
+            <ac:spMk id="50" creationId="{85229524-047C-4B54-B196-0555B667F32A}"/>
+          </ac:spMkLst>
+        </pc:spChg>
+        <pc:spChg chg="mod">
+          <ac:chgData name="Alonso Guerrero Llorente" userId="451d9a1c5f7013d1" providerId="LiveId" clId="{294FDEE4-22F5-4BA6-8A7A-6B03A781B212}" dt="2021-10-03T18:40:35.059" v="107" actId="20577"/>
+          <ac:spMkLst>
+            <pc:docMk/>
+            <pc:sldMk cId="1813519119" sldId="256"/>
+            <ac:spMk id="57" creationId="{51DCCDF9-3046-4212-8E50-E5E8272F4C4C}"/>
+          </ac:spMkLst>
+        </pc:spChg>
+      </pc:sldChg>
+    </pc:docChg>
+  </pc:docChgLst>
 </pc:chgInfo>
 </file>
 
@@ -664,7 +776,7 @@
           <a:p>
             <a:fld id="{02CD1CC9-5596-4E27-B1CC-DEB413C482D2}" type="datetimeFigureOut">
               <a:rPr lang="es-ES" smtClean="0"/>
-              <a:t>18/09/2021</a:t>
+              <a:t>03/10/2021</a:t>
             </a:fld>
             <a:endParaRPr lang="es-ES"/>
           </a:p>
@@ -862,7 +974,7 @@
           <a:p>
             <a:fld id="{02CD1CC9-5596-4E27-B1CC-DEB413C482D2}" type="datetimeFigureOut">
               <a:rPr lang="es-ES" smtClean="0"/>
-              <a:t>18/09/2021</a:t>
+              <a:t>03/10/2021</a:t>
             </a:fld>
             <a:endParaRPr lang="es-ES"/>
           </a:p>
@@ -1070,7 +1182,7 @@
           <a:p>
             <a:fld id="{02CD1CC9-5596-4E27-B1CC-DEB413C482D2}" type="datetimeFigureOut">
               <a:rPr lang="es-ES" smtClean="0"/>
-              <a:t>18/09/2021</a:t>
+              <a:t>03/10/2021</a:t>
             </a:fld>
             <a:endParaRPr lang="es-ES"/>
           </a:p>
@@ -1268,7 +1380,7 @@
           <a:p>
             <a:fld id="{02CD1CC9-5596-4E27-B1CC-DEB413C482D2}" type="datetimeFigureOut">
               <a:rPr lang="es-ES" smtClean="0"/>
-              <a:t>18/09/2021</a:t>
+              <a:t>03/10/2021</a:t>
             </a:fld>
             <a:endParaRPr lang="es-ES"/>
           </a:p>
@@ -1543,7 +1655,7 @@
           <a:p>
             <a:fld id="{02CD1CC9-5596-4E27-B1CC-DEB413C482D2}" type="datetimeFigureOut">
               <a:rPr lang="es-ES" smtClean="0"/>
-              <a:t>18/09/2021</a:t>
+              <a:t>03/10/2021</a:t>
             </a:fld>
             <a:endParaRPr lang="es-ES"/>
           </a:p>
@@ -1808,7 +1920,7 @@
           <a:p>
             <a:fld id="{02CD1CC9-5596-4E27-B1CC-DEB413C482D2}" type="datetimeFigureOut">
               <a:rPr lang="es-ES" smtClean="0"/>
-              <a:t>18/09/2021</a:t>
+              <a:t>03/10/2021</a:t>
             </a:fld>
             <a:endParaRPr lang="es-ES"/>
           </a:p>
@@ -2220,7 +2332,7 @@
           <a:p>
             <a:fld id="{02CD1CC9-5596-4E27-B1CC-DEB413C482D2}" type="datetimeFigureOut">
               <a:rPr lang="es-ES" smtClean="0"/>
-              <a:t>18/09/2021</a:t>
+              <a:t>03/10/2021</a:t>
             </a:fld>
             <a:endParaRPr lang="es-ES"/>
           </a:p>
@@ -2361,7 +2473,7 @@
           <a:p>
             <a:fld id="{02CD1CC9-5596-4E27-B1CC-DEB413C482D2}" type="datetimeFigureOut">
               <a:rPr lang="es-ES" smtClean="0"/>
-              <a:t>18/09/2021</a:t>
+              <a:t>03/10/2021</a:t>
             </a:fld>
             <a:endParaRPr lang="es-ES"/>
           </a:p>
@@ -2474,7 +2586,7 @@
           <a:p>
             <a:fld id="{02CD1CC9-5596-4E27-B1CC-DEB413C482D2}" type="datetimeFigureOut">
               <a:rPr lang="es-ES" smtClean="0"/>
-              <a:t>18/09/2021</a:t>
+              <a:t>03/10/2021</a:t>
             </a:fld>
             <a:endParaRPr lang="es-ES"/>
           </a:p>
@@ -2785,7 +2897,7 @@
           <a:p>
             <a:fld id="{02CD1CC9-5596-4E27-B1CC-DEB413C482D2}" type="datetimeFigureOut">
               <a:rPr lang="es-ES" smtClean="0"/>
-              <a:t>18/09/2021</a:t>
+              <a:t>03/10/2021</a:t>
             </a:fld>
             <a:endParaRPr lang="es-ES"/>
           </a:p>
@@ -3073,7 +3185,7 @@
           <a:p>
             <a:fld id="{02CD1CC9-5596-4E27-B1CC-DEB413C482D2}" type="datetimeFigureOut">
               <a:rPr lang="es-ES" smtClean="0"/>
-              <a:t>18/09/2021</a:t>
+              <a:t>03/10/2021</a:t>
             </a:fld>
             <a:endParaRPr lang="es-ES"/>
           </a:p>
@@ -3314,7 +3426,7 @@
           <a:p>
             <a:fld id="{02CD1CC9-5596-4E27-B1CC-DEB413C482D2}" type="datetimeFigureOut">
               <a:rPr lang="es-ES" smtClean="0"/>
-              <a:t>18/09/2021</a:t>
+              <a:t>03/10/2021</a:t>
             </a:fld>
             <a:endParaRPr lang="es-ES"/>
           </a:p>
@@ -4325,8 +4437,8 @@
         </p:nvSpPr>
         <p:spPr>
           <a:xfrm>
-            <a:off x="4995918" y="1132317"/>
-            <a:ext cx="1017571" cy="276999"/>
+            <a:off x="4873858" y="1131676"/>
+            <a:ext cx="1487194" cy="276999"/>
           </a:xfrm>
           <a:prstGeom prst="rect">
             <a:avLst/>
@@ -4360,7 +4472,10 @@
               <a:rPr lang="es-ES" sz="1200" dirty="0" err="1"/>
               <a:t>debt</a:t>
             </a:r>
-            <a:endParaRPr lang="es-ES" sz="1200" dirty="0"/>
+            <a:r>
+              <a:rPr lang="es-ES" sz="1200" dirty="0"/>
+              <a:t> #105</a:t>
+            </a:r>
           </a:p>
         </p:txBody>
       </p:sp>
@@ -4496,64 +4611,6 @@
           </a:p>
         </p:txBody>
       </p:sp>
-      <p:sp>
-        <p:nvSpPr>
-          <p:cNvPr id="27" name="CuadroTexto 26">
-            <a:extLst>
-              <a:ext uri="{FF2B5EF4-FFF2-40B4-BE49-F238E27FC236}">
-                <a16:creationId xmlns:a16="http://schemas.microsoft.com/office/drawing/2014/main" id="{4E05F8F1-3F81-4D62-A850-70F1D35440BB}"/>
-              </a:ext>
-            </a:extLst>
-          </p:cNvPr>
-          <p:cNvSpPr txBox="1"/>
-          <p:nvPr/>
-        </p:nvSpPr>
-        <p:spPr>
-          <a:xfrm>
-            <a:off x="6843540" y="2383712"/>
-            <a:ext cx="1465683" cy="461665"/>
-          </a:xfrm>
-          <a:prstGeom prst="rect">
-            <a:avLst/>
-          </a:prstGeom>
-          <a:noFill/>
-          <a:ln w="28575">
-            <a:solidFill>
-              <a:schemeClr val="accent4">
-                <a:lumMod val="60000"/>
-                <a:lumOff val="40000"/>
-              </a:schemeClr>
-            </a:solidFill>
-          </a:ln>
-        </p:spPr>
-        <p:txBody>
-          <a:bodyPr wrap="square" rtlCol="0">
-            <a:spAutoFit/>
-          </a:bodyPr>
-          <a:lstStyle/>
-          <a:p>
-            <a:r>
-              <a:rPr lang="es-ES" sz="1200" dirty="0"/>
-              <a:t>editor.js </a:t>
-            </a:r>
-            <a:r>
-              <a:rPr lang="es-ES" sz="1200" dirty="0" err="1"/>
-              <a:t>refactor</a:t>
-            </a:r>
-            <a:endParaRPr lang="es-ES" sz="1200" dirty="0"/>
-          </a:p>
-          <a:p>
-            <a:r>
-              <a:rPr lang="es-ES" sz="1200" dirty="0" err="1"/>
-              <a:t>Refactor</a:t>
-            </a:r>
-            <a:r>
-              <a:rPr lang="es-ES" sz="1200" dirty="0"/>
-              <a:t> links</a:t>
-            </a:r>
-          </a:p>
-        </p:txBody>
-      </p:sp>
       <p:cxnSp>
         <p:nvCxnSpPr>
           <p:cNvPr id="29" name="Conector recto 28">
@@ -4655,7 +4712,7 @@
         </p:nvSpPr>
         <p:spPr>
           <a:xfrm>
-            <a:off x="8815795" y="1189219"/>
+            <a:off x="1288193" y="3945577"/>
             <a:ext cx="1144346" cy="276999"/>
           </a:xfrm>
           <a:prstGeom prst="rect">
@@ -4794,8 +4851,8 @@
         </p:nvSpPr>
         <p:spPr>
           <a:xfrm>
-            <a:off x="1112153" y="3757307"/>
-            <a:ext cx="1465683" cy="461665"/>
+            <a:off x="8847351" y="1245152"/>
+            <a:ext cx="1125355" cy="276999"/>
           </a:xfrm>
           <a:prstGeom prst="rect">
             <a:avLst/>
@@ -4818,7 +4875,7 @@
           <a:p>
             <a:r>
               <a:rPr lang="es-ES" sz="1200" dirty="0" err="1"/>
-              <a:t>Fix</a:t>
+              <a:t>Refactor</a:t>
             </a:r>
             <a:r>
               <a:rPr lang="es-ES" sz="1200" dirty="0"/>
@@ -4826,23 +4883,7 @@
             </a:r>
             <a:r>
               <a:rPr lang="es-ES" sz="1200" dirty="0" err="1"/>
-              <a:t>distance</a:t>
-            </a:r>
-            <a:r>
-              <a:rPr lang="es-ES" sz="1200" dirty="0"/>
-              <a:t> after </a:t>
-            </a:r>
-            <a:r>
-              <a:rPr lang="es-ES" sz="1200" dirty="0" err="1"/>
-              <a:t>segment</a:t>
-            </a:r>
-            <a:r>
-              <a:rPr lang="es-ES" sz="1200" dirty="0"/>
-              <a:t> </a:t>
-            </a:r>
-            <a:r>
-              <a:rPr lang="es-ES" sz="1200" dirty="0" err="1"/>
-              <a:t>removal</a:t>
+              <a:t>json</a:t>
             </a:r>
             <a:endParaRPr lang="es-ES" sz="1200" dirty="0"/>
           </a:p>
@@ -5410,7 +5451,7 @@
         <p:spPr>
           <a:xfrm>
             <a:off x="3258894" y="2285420"/>
-            <a:ext cx="1109931" cy="276999"/>
+            <a:ext cx="1109931" cy="461665"/>
           </a:xfrm>
           <a:prstGeom prst="rect">
             <a:avLst/>
@@ -5448,7 +5489,10 @@
               <a:rPr lang="es-ES" sz="1200" dirty="0" err="1"/>
               <a:t>secrets</a:t>
             </a:r>
-            <a:endParaRPr lang="es-ES" sz="1200" dirty="0"/>
+            <a:r>
+              <a:rPr lang="es-ES" sz="1200" dirty="0"/>
+              <a:t> #103</a:t>
+            </a:r>
           </a:p>
         </p:txBody>
       </p:sp>
@@ -5542,6 +5586,316 @@
               <a:rPr lang="es-ES" sz="1200" dirty="0"/>
               <a:t>PLANNED</a:t>
             </a:r>
+          </a:p>
+        </p:txBody>
+      </p:sp>
+      <p:sp>
+        <p:nvSpPr>
+          <p:cNvPr id="40" name="CuadroTexto 39">
+            <a:extLst>
+              <a:ext uri="{FF2B5EF4-FFF2-40B4-BE49-F238E27FC236}">
+                <a16:creationId xmlns:a16="http://schemas.microsoft.com/office/drawing/2014/main" id="{5B8E0F08-24C4-47C4-B963-FBBB6EE1CA84}"/>
+              </a:ext>
+            </a:extLst>
+          </p:cNvPr>
+          <p:cNvSpPr txBox="1"/>
+          <p:nvPr/>
+        </p:nvSpPr>
+        <p:spPr>
+          <a:xfrm>
+            <a:off x="6686532" y="2235891"/>
+            <a:ext cx="1597808" cy="1015663"/>
+          </a:xfrm>
+          <a:prstGeom prst="rect">
+            <a:avLst/>
+          </a:prstGeom>
+          <a:solidFill>
+            <a:schemeClr val="accent6">
+              <a:lumMod val="20000"/>
+              <a:lumOff val="80000"/>
+            </a:schemeClr>
+          </a:solidFill>
+          <a:ln w="28575">
+            <a:solidFill>
+              <a:schemeClr val="accent6">
+                <a:lumMod val="60000"/>
+                <a:lumOff val="40000"/>
+              </a:schemeClr>
+            </a:solidFill>
+          </a:ln>
+        </p:spPr>
+        <p:txBody>
+          <a:bodyPr wrap="square" rtlCol="0">
+            <a:spAutoFit/>
+          </a:bodyPr>
+          <a:lstStyle/>
+          <a:p>
+            <a:r>
+              <a:rPr lang="es-ES" sz="1200" dirty="0"/>
+              <a:t>editor.js </a:t>
+            </a:r>
+            <a:r>
+              <a:rPr lang="es-ES" sz="1200" dirty="0" err="1"/>
+              <a:t>refactor</a:t>
+            </a:r>
+            <a:r>
+              <a:rPr lang="es-ES" sz="1200" dirty="0"/>
+              <a:t> #106</a:t>
+            </a:r>
+          </a:p>
+          <a:p>
+            <a:r>
+              <a:rPr lang="es-ES" sz="1200" dirty="0" err="1"/>
+              <a:t>Refactor</a:t>
+            </a:r>
+            <a:r>
+              <a:rPr lang="es-ES" sz="1200" dirty="0"/>
+              <a:t> links #75</a:t>
+            </a:r>
+          </a:p>
+          <a:p>
+            <a:r>
+              <a:rPr lang="es-ES" sz="1200" dirty="0" err="1"/>
+              <a:t>Fix</a:t>
+            </a:r>
+            <a:r>
+              <a:rPr lang="es-ES" sz="1200" dirty="0"/>
+              <a:t> </a:t>
+            </a:r>
+            <a:r>
+              <a:rPr lang="es-ES" sz="1200" dirty="0" err="1"/>
+              <a:t>distance</a:t>
+            </a:r>
+            <a:r>
+              <a:rPr lang="es-ES" sz="1200" dirty="0"/>
+              <a:t> after </a:t>
+            </a:r>
+            <a:r>
+              <a:rPr lang="es-ES" sz="1200" dirty="0" err="1"/>
+              <a:t>segment</a:t>
+            </a:r>
+            <a:r>
+              <a:rPr lang="es-ES" sz="1200" dirty="0"/>
+              <a:t> </a:t>
+            </a:r>
+            <a:r>
+              <a:rPr lang="es-ES" sz="1200" dirty="0" err="1"/>
+              <a:t>removal</a:t>
+            </a:r>
+            <a:r>
+              <a:rPr lang="es-ES" sz="1200" dirty="0"/>
+              <a:t> #76</a:t>
+            </a:r>
+          </a:p>
+          <a:p>
+            <a:endParaRPr lang="es-ES" sz="1200" dirty="0"/>
+          </a:p>
+        </p:txBody>
+      </p:sp>
+      <p:sp>
+        <p:nvSpPr>
+          <p:cNvPr id="41" name="CuadroTexto 40">
+            <a:extLst>
+              <a:ext uri="{FF2B5EF4-FFF2-40B4-BE49-F238E27FC236}">
+                <a16:creationId xmlns:a16="http://schemas.microsoft.com/office/drawing/2014/main" id="{4BF2A48C-CCA1-4887-9505-98DE0B22CD09}"/>
+              </a:ext>
+            </a:extLst>
+          </p:cNvPr>
+          <p:cNvSpPr txBox="1"/>
+          <p:nvPr/>
+        </p:nvSpPr>
+        <p:spPr>
+          <a:xfrm>
+            <a:off x="3404983" y="3841367"/>
+            <a:ext cx="835864" cy="369332"/>
+          </a:xfrm>
+          <a:prstGeom prst="rect">
+            <a:avLst/>
+          </a:prstGeom>
+          <a:noFill/>
+          <a:ln w="38100">
+            <a:solidFill>
+              <a:schemeClr val="accent4">
+                <a:lumMod val="75000"/>
+              </a:schemeClr>
+            </a:solidFill>
+          </a:ln>
+        </p:spPr>
+        <p:txBody>
+          <a:bodyPr wrap="square" rtlCol="0">
+            <a:spAutoFit/>
+          </a:bodyPr>
+          <a:lstStyle/>
+          <a:p>
+            <a:r>
+              <a:rPr lang="es-ES" dirty="0"/>
+              <a:t>V0.1.7</a:t>
+            </a:r>
+          </a:p>
+        </p:txBody>
+      </p:sp>
+      <p:sp>
+        <p:nvSpPr>
+          <p:cNvPr id="44" name="CuadroTexto 43">
+            <a:extLst>
+              <a:ext uri="{FF2B5EF4-FFF2-40B4-BE49-F238E27FC236}">
+                <a16:creationId xmlns:a16="http://schemas.microsoft.com/office/drawing/2014/main" id="{E9302D34-1059-465D-8CDA-59463A72E11A}"/>
+              </a:ext>
+            </a:extLst>
+          </p:cNvPr>
+          <p:cNvSpPr txBox="1"/>
+          <p:nvPr/>
+        </p:nvSpPr>
+        <p:spPr>
+          <a:xfrm>
+            <a:off x="3307043" y="5074148"/>
+            <a:ext cx="1144346" cy="461665"/>
+          </a:xfrm>
+          <a:prstGeom prst="rect">
+            <a:avLst/>
+          </a:prstGeom>
+          <a:noFill/>
+          <a:ln w="28575">
+            <a:solidFill>
+              <a:schemeClr val="accent4">
+                <a:lumMod val="60000"/>
+                <a:lumOff val="40000"/>
+              </a:schemeClr>
+            </a:solidFill>
+          </a:ln>
+        </p:spPr>
+        <p:txBody>
+          <a:bodyPr wrap="square" rtlCol="0">
+            <a:spAutoFit/>
+          </a:bodyPr>
+          <a:lstStyle/>
+          <a:p>
+            <a:r>
+              <a:rPr lang="es-ES" sz="1200" dirty="0" err="1"/>
+              <a:t>Think</a:t>
+            </a:r>
+            <a:r>
+              <a:rPr lang="es-ES" sz="1200" dirty="0"/>
+              <a:t> </a:t>
+            </a:r>
+            <a:r>
+              <a:rPr lang="es-ES" sz="1200" dirty="0" err="1"/>
+              <a:t>about</a:t>
+            </a:r>
+            <a:r>
+              <a:rPr lang="es-ES" sz="1200" dirty="0"/>
+              <a:t> </a:t>
+            </a:r>
+            <a:r>
+              <a:rPr lang="es-ES" sz="1200" dirty="0" err="1"/>
+              <a:t>deploy</a:t>
+            </a:r>
+            <a:r>
+              <a:rPr lang="es-ES" sz="1200" dirty="0"/>
+              <a:t>?</a:t>
+            </a:r>
+          </a:p>
+        </p:txBody>
+      </p:sp>
+      <p:sp>
+        <p:nvSpPr>
+          <p:cNvPr id="45" name="CuadroTexto 44">
+            <a:extLst>
+              <a:ext uri="{FF2B5EF4-FFF2-40B4-BE49-F238E27FC236}">
+                <a16:creationId xmlns:a16="http://schemas.microsoft.com/office/drawing/2014/main" id="{AE2EDDC6-CEBF-4738-A65C-93AC2F522E5F}"/>
+              </a:ext>
+            </a:extLst>
+          </p:cNvPr>
+          <p:cNvSpPr txBox="1"/>
+          <p:nvPr/>
+        </p:nvSpPr>
+        <p:spPr>
+          <a:xfrm>
+            <a:off x="9039199" y="3840294"/>
+            <a:ext cx="835864" cy="369332"/>
+          </a:xfrm>
+          <a:prstGeom prst="rect">
+            <a:avLst/>
+          </a:prstGeom>
+          <a:noFill/>
+          <a:ln w="38100">
+            <a:solidFill>
+              <a:schemeClr val="accent4">
+                <a:lumMod val="75000"/>
+              </a:schemeClr>
+            </a:solidFill>
+          </a:ln>
+        </p:spPr>
+        <p:txBody>
+          <a:bodyPr wrap="square" rtlCol="0">
+            <a:spAutoFit/>
+          </a:bodyPr>
+          <a:lstStyle/>
+          <a:p>
+            <a:r>
+              <a:rPr lang="es-ES" dirty="0"/>
+              <a:t>V0.2.0</a:t>
+            </a:r>
+          </a:p>
+        </p:txBody>
+      </p:sp>
+      <p:sp>
+        <p:nvSpPr>
+          <p:cNvPr id="46" name="CuadroTexto 45">
+            <a:extLst>
+              <a:ext uri="{FF2B5EF4-FFF2-40B4-BE49-F238E27FC236}">
+                <a16:creationId xmlns:a16="http://schemas.microsoft.com/office/drawing/2014/main" id="{C9529B70-423C-431D-9460-BC47659DD43F}"/>
+              </a:ext>
+            </a:extLst>
+          </p:cNvPr>
+          <p:cNvSpPr txBox="1"/>
+          <p:nvPr/>
+        </p:nvSpPr>
+        <p:spPr>
+          <a:xfrm>
+            <a:off x="8884958" y="5078104"/>
+            <a:ext cx="1144346" cy="461665"/>
+          </a:xfrm>
+          <a:prstGeom prst="rect">
+            <a:avLst/>
+          </a:prstGeom>
+          <a:noFill/>
+          <a:ln w="28575">
+            <a:solidFill>
+              <a:schemeClr val="accent4">
+                <a:lumMod val="60000"/>
+                <a:lumOff val="40000"/>
+              </a:schemeClr>
+            </a:solidFill>
+          </a:ln>
+        </p:spPr>
+        <p:txBody>
+          <a:bodyPr wrap="square" rtlCol="0">
+            <a:spAutoFit/>
+          </a:bodyPr>
+          <a:lstStyle/>
+          <a:p>
+            <a:r>
+              <a:rPr lang="es-ES" sz="1200" dirty="0" err="1"/>
+              <a:t>First</a:t>
+            </a:r>
+            <a:r>
+              <a:rPr lang="es-ES" sz="1200" dirty="0"/>
+              <a:t> </a:t>
+            </a:r>
+            <a:r>
+              <a:rPr lang="es-ES" sz="1200" dirty="0" err="1"/>
+              <a:t>deployed</a:t>
+            </a:r>
+            <a:r>
+              <a:rPr lang="es-ES" sz="1200" dirty="0"/>
+              <a:t> </a:t>
+            </a:r>
+            <a:r>
+              <a:rPr lang="es-ES" sz="1200" dirty="0" err="1"/>
+              <a:t>version</a:t>
+            </a:r>
+            <a:endParaRPr lang="es-ES" sz="1200" dirty="0"/>
           </a:p>
         </p:txBody>
       </p:sp>

</xml_diff>

<commit_message>
Update version and roadmap
</commit_message>
<xml_diff>
--- a/docs/roadmap.pptx
+++ b/docs/roadmap.pptx
@@ -517,12 +517,12 @@
   <pc:docChgLst>
     <pc:chgData name="Alonso Guerrero Llorente" userId="451d9a1c5f7013d1" providerId="LiveId" clId="{294FDEE4-22F5-4BA6-8A7A-6B03A781B212}"/>
     <pc:docChg chg="undo custSel modSld">
-      <pc:chgData name="Alonso Guerrero Llorente" userId="451d9a1c5f7013d1" providerId="LiveId" clId="{294FDEE4-22F5-4BA6-8A7A-6B03A781B212}" dt="2021-10-03T18:48:16.310" v="141"/>
+      <pc:chgData name="Alonso Guerrero Llorente" userId="451d9a1c5f7013d1" providerId="LiveId" clId="{294FDEE4-22F5-4BA6-8A7A-6B03A781B212}" dt="2021-10-05T19:31:27.656" v="160" actId="478"/>
       <pc:docMkLst>
         <pc:docMk/>
       </pc:docMkLst>
       <pc:sldChg chg="addSp delSp modSp mod">
-        <pc:chgData name="Alonso Guerrero Llorente" userId="451d9a1c5f7013d1" providerId="LiveId" clId="{294FDEE4-22F5-4BA6-8A7A-6B03A781B212}" dt="2021-10-03T18:48:16.310" v="141"/>
+        <pc:chgData name="Alonso Guerrero Llorente" userId="451d9a1c5f7013d1" providerId="LiveId" clId="{294FDEE4-22F5-4BA6-8A7A-6B03A781B212}" dt="2021-10-05T19:31:27.656" v="160" actId="478"/>
         <pc:sldMkLst>
           <pc:docMk/>
           <pc:sldMk cId="1813519119" sldId="256"/>
@@ -544,19 +544,43 @@
           </ac:spMkLst>
         </pc:spChg>
         <pc:spChg chg="mod">
-          <ac:chgData name="Alonso Guerrero Llorente" userId="451d9a1c5f7013d1" providerId="LiveId" clId="{294FDEE4-22F5-4BA6-8A7A-6B03A781B212}" dt="2021-10-03T18:38:23.468" v="14" actId="1076"/>
+          <ac:chgData name="Alonso Guerrero Llorente" userId="451d9a1c5f7013d1" providerId="LiveId" clId="{294FDEE4-22F5-4BA6-8A7A-6B03A781B212}" dt="2021-10-04T15:44:19.745" v="155" actId="1076"/>
           <ac:spMkLst>
             <pc:docMk/>
             <pc:sldMk cId="1813519119" sldId="256"/>
             <ac:spMk id="31" creationId="{DA013763-AE25-43D1-8FC4-C2A05AD9203C}"/>
           </ac:spMkLst>
         </pc:spChg>
-        <pc:spChg chg="mod">
-          <ac:chgData name="Alonso Guerrero Llorente" userId="451d9a1c5f7013d1" providerId="LiveId" clId="{294FDEE4-22F5-4BA6-8A7A-6B03A781B212}" dt="2021-10-03T18:38:33.764" v="30" actId="1076"/>
+        <pc:spChg chg="del mod">
+          <ac:chgData name="Alonso Guerrero Llorente" userId="451d9a1c5f7013d1" providerId="LiveId" clId="{294FDEE4-22F5-4BA6-8A7A-6B03A781B212}" dt="2021-10-04T15:43:06.242" v="144" actId="478"/>
           <ac:spMkLst>
             <pc:docMk/>
             <pc:sldMk cId="1813519119" sldId="256"/>
             <ac:spMk id="34" creationId="{8346D467-61BC-4738-9085-D0C1296A1B5D}"/>
+          </ac:spMkLst>
+        </pc:spChg>
+        <pc:spChg chg="del">
+          <ac:chgData name="Alonso Guerrero Llorente" userId="451d9a1c5f7013d1" providerId="LiveId" clId="{294FDEE4-22F5-4BA6-8A7A-6B03A781B212}" dt="2021-10-05T19:31:25.740" v="158" actId="478"/>
+          <ac:spMkLst>
+            <pc:docMk/>
+            <pc:sldMk cId="1813519119" sldId="256"/>
+            <ac:spMk id="35" creationId="{494CEAFC-A87B-4B7E-990D-12F5109F547C}"/>
+          </ac:spMkLst>
+        </pc:spChg>
+        <pc:spChg chg="del">
+          <ac:chgData name="Alonso Guerrero Llorente" userId="451d9a1c5f7013d1" providerId="LiveId" clId="{294FDEE4-22F5-4BA6-8A7A-6B03A781B212}" dt="2021-10-05T19:31:25.740" v="158" actId="478"/>
+          <ac:spMkLst>
+            <pc:docMk/>
+            <pc:sldMk cId="1813519119" sldId="256"/>
+            <ac:spMk id="36" creationId="{B66920C0-5D30-4285-A97C-53F2A7440D2B}"/>
+          </ac:spMkLst>
+        </pc:spChg>
+        <pc:spChg chg="del mod">
+          <ac:chgData name="Alonso Guerrero Llorente" userId="451d9a1c5f7013d1" providerId="LiveId" clId="{294FDEE4-22F5-4BA6-8A7A-6B03A781B212}" dt="2021-10-05T19:31:27.656" v="160" actId="478"/>
+          <ac:spMkLst>
+            <pc:docMk/>
+            <pc:sldMk cId="1813519119" sldId="256"/>
+            <ac:spMk id="37" creationId="{43B149ED-2CA3-4547-AFF9-B37380C17270}"/>
           </ac:spMkLst>
         </pc:spChg>
         <pc:spChg chg="add mod">
@@ -568,15 +592,23 @@
           </ac:spMkLst>
         </pc:spChg>
         <pc:spChg chg="add mod">
-          <ac:chgData name="Alonso Guerrero Llorente" userId="451d9a1c5f7013d1" providerId="LiveId" clId="{294FDEE4-22F5-4BA6-8A7A-6B03A781B212}" dt="2021-10-03T18:39:28.404" v="34" actId="20577"/>
+          <ac:chgData name="Alonso Guerrero Llorente" userId="451d9a1c5f7013d1" providerId="LiveId" clId="{294FDEE4-22F5-4BA6-8A7A-6B03A781B212}" dt="2021-10-04T15:43:15.095" v="148" actId="1076"/>
           <ac:spMkLst>
             <pc:docMk/>
             <pc:sldMk cId="1813519119" sldId="256"/>
             <ac:spMk id="41" creationId="{4BF2A48C-CCA1-4887-9505-98DE0B22CD09}"/>
           </ac:spMkLst>
         </pc:spChg>
+        <pc:spChg chg="del">
+          <ac:chgData name="Alonso Guerrero Llorente" userId="451d9a1c5f7013d1" providerId="LiveId" clId="{294FDEE4-22F5-4BA6-8A7A-6B03A781B212}" dt="2021-10-04T15:43:06.919" v="145" actId="478"/>
+          <ac:spMkLst>
+            <pc:docMk/>
+            <pc:sldMk cId="1813519119" sldId="256"/>
+            <ac:spMk id="42" creationId="{1ABD6C16-AA33-41CD-9BB4-E3399CAFACA5}"/>
+          </ac:spMkLst>
+        </pc:spChg>
         <pc:spChg chg="add mod">
-          <ac:chgData name="Alonso Guerrero Llorente" userId="451d9a1c5f7013d1" providerId="LiveId" clId="{294FDEE4-22F5-4BA6-8A7A-6B03A781B212}" dt="2021-10-03T18:48:07.949" v="135" actId="1076"/>
+          <ac:chgData name="Alonso Guerrero Llorente" userId="451d9a1c5f7013d1" providerId="LiveId" clId="{294FDEE4-22F5-4BA6-8A7A-6B03A781B212}" dt="2021-10-04T15:43:18.356" v="149" actId="1076"/>
           <ac:spMkLst>
             <pc:docMk/>
             <pc:sldMk cId="1813519119" sldId="256"/>
@@ -584,7 +616,7 @@
           </ac:spMkLst>
         </pc:spChg>
         <pc:spChg chg="add mod">
-          <ac:chgData name="Alonso Guerrero Llorente" userId="451d9a1c5f7013d1" providerId="LiveId" clId="{294FDEE4-22F5-4BA6-8A7A-6B03A781B212}" dt="2021-10-03T18:40:10.786" v="101" actId="1076"/>
+          <ac:chgData name="Alonso Guerrero Llorente" userId="451d9a1c5f7013d1" providerId="LiveId" clId="{294FDEE4-22F5-4BA6-8A7A-6B03A781B212}" dt="2021-10-05T19:31:22.133" v="157" actId="1076"/>
           <ac:spMkLst>
             <pc:docMk/>
             <pc:sldMk cId="1813519119" sldId="256"/>
@@ -592,7 +624,7 @@
           </ac:spMkLst>
         </pc:spChg>
         <pc:spChg chg="add mod">
-          <ac:chgData name="Alonso Guerrero Llorente" userId="451d9a1c5f7013d1" providerId="LiveId" clId="{294FDEE4-22F5-4BA6-8A7A-6B03A781B212}" dt="2021-10-03T18:40:13.760" v="102" actId="1076"/>
+          <ac:chgData name="Alonso Guerrero Llorente" userId="451d9a1c5f7013d1" providerId="LiveId" clId="{294FDEE4-22F5-4BA6-8A7A-6B03A781B212}" dt="2021-10-05T19:31:17.094" v="156" actId="1076"/>
           <ac:spMkLst>
             <pc:docMk/>
             <pc:sldMk cId="1813519119" sldId="256"/>
@@ -623,6 +655,30 @@
             <ac:spMk id="57" creationId="{51DCCDF9-3046-4212-8E50-E5E8272F4C4C}"/>
           </ac:spMkLst>
         </pc:spChg>
+        <pc:cxnChg chg="del">
+          <ac:chgData name="Alonso Guerrero Llorente" userId="451d9a1c5f7013d1" providerId="LiveId" clId="{294FDEE4-22F5-4BA6-8A7A-6B03A781B212}" dt="2021-10-05T19:31:25.740" v="158" actId="478"/>
+          <ac:cxnSpMkLst>
+            <pc:docMk/>
+            <pc:sldMk cId="1813519119" sldId="256"/>
+            <ac:cxnSpMk id="48" creationId="{45074E4F-B162-4AFD-90CA-BAEB5B6B4BE6}"/>
+          </ac:cxnSpMkLst>
+        </pc:cxnChg>
+        <pc:cxnChg chg="del">
+          <ac:chgData name="Alonso Guerrero Llorente" userId="451d9a1c5f7013d1" providerId="LiveId" clId="{294FDEE4-22F5-4BA6-8A7A-6B03A781B212}" dt="2021-10-05T19:31:25.740" v="158" actId="478"/>
+          <ac:cxnSpMkLst>
+            <pc:docMk/>
+            <pc:sldMk cId="1813519119" sldId="256"/>
+            <ac:cxnSpMk id="51" creationId="{36C54D4C-5F97-41AD-99CC-953283692C37}"/>
+          </ac:cxnSpMkLst>
+        </pc:cxnChg>
+        <pc:cxnChg chg="del">
+          <ac:chgData name="Alonso Guerrero Llorente" userId="451d9a1c5f7013d1" providerId="LiveId" clId="{294FDEE4-22F5-4BA6-8A7A-6B03A781B212}" dt="2021-10-05T19:31:25.740" v="158" actId="478"/>
+          <ac:cxnSpMkLst>
+            <pc:docMk/>
+            <pc:sldMk cId="1813519119" sldId="256"/>
+            <ac:cxnSpMk id="54" creationId="{D520950A-3B30-47F0-B44B-6A765974E1E4}"/>
+          </ac:cxnSpMkLst>
+        </pc:cxnChg>
       </pc:sldChg>
     </pc:docChg>
   </pc:docChgLst>
@@ -776,7 +832,7 @@
           <a:p>
             <a:fld id="{02CD1CC9-5596-4E27-B1CC-DEB413C482D2}" type="datetimeFigureOut">
               <a:rPr lang="es-ES" smtClean="0"/>
-              <a:t>03/10/2021</a:t>
+              <a:t>05/10/2021</a:t>
             </a:fld>
             <a:endParaRPr lang="es-ES"/>
           </a:p>
@@ -974,7 +1030,7 @@
           <a:p>
             <a:fld id="{02CD1CC9-5596-4E27-B1CC-DEB413C482D2}" type="datetimeFigureOut">
               <a:rPr lang="es-ES" smtClean="0"/>
-              <a:t>03/10/2021</a:t>
+              <a:t>05/10/2021</a:t>
             </a:fld>
             <a:endParaRPr lang="es-ES"/>
           </a:p>
@@ -1182,7 +1238,7 @@
           <a:p>
             <a:fld id="{02CD1CC9-5596-4E27-B1CC-DEB413C482D2}" type="datetimeFigureOut">
               <a:rPr lang="es-ES" smtClean="0"/>
-              <a:t>03/10/2021</a:t>
+              <a:t>05/10/2021</a:t>
             </a:fld>
             <a:endParaRPr lang="es-ES"/>
           </a:p>
@@ -1380,7 +1436,7 @@
           <a:p>
             <a:fld id="{02CD1CC9-5596-4E27-B1CC-DEB413C482D2}" type="datetimeFigureOut">
               <a:rPr lang="es-ES" smtClean="0"/>
-              <a:t>03/10/2021</a:t>
+              <a:t>05/10/2021</a:t>
             </a:fld>
             <a:endParaRPr lang="es-ES"/>
           </a:p>
@@ -1655,7 +1711,7 @@
           <a:p>
             <a:fld id="{02CD1CC9-5596-4E27-B1CC-DEB413C482D2}" type="datetimeFigureOut">
               <a:rPr lang="es-ES" smtClean="0"/>
-              <a:t>03/10/2021</a:t>
+              <a:t>05/10/2021</a:t>
             </a:fld>
             <a:endParaRPr lang="es-ES"/>
           </a:p>
@@ -1920,7 +1976,7 @@
           <a:p>
             <a:fld id="{02CD1CC9-5596-4E27-B1CC-DEB413C482D2}" type="datetimeFigureOut">
               <a:rPr lang="es-ES" smtClean="0"/>
-              <a:t>03/10/2021</a:t>
+              <a:t>05/10/2021</a:t>
             </a:fld>
             <a:endParaRPr lang="es-ES"/>
           </a:p>
@@ -2332,7 +2388,7 @@
           <a:p>
             <a:fld id="{02CD1CC9-5596-4E27-B1CC-DEB413C482D2}" type="datetimeFigureOut">
               <a:rPr lang="es-ES" smtClean="0"/>
-              <a:t>03/10/2021</a:t>
+              <a:t>05/10/2021</a:t>
             </a:fld>
             <a:endParaRPr lang="es-ES"/>
           </a:p>
@@ -2473,7 +2529,7 @@
           <a:p>
             <a:fld id="{02CD1CC9-5596-4E27-B1CC-DEB413C482D2}" type="datetimeFigureOut">
               <a:rPr lang="es-ES" smtClean="0"/>
-              <a:t>03/10/2021</a:t>
+              <a:t>05/10/2021</a:t>
             </a:fld>
             <a:endParaRPr lang="es-ES"/>
           </a:p>
@@ -2586,7 +2642,7 @@
           <a:p>
             <a:fld id="{02CD1CC9-5596-4E27-B1CC-DEB413C482D2}" type="datetimeFigureOut">
               <a:rPr lang="es-ES" smtClean="0"/>
-              <a:t>03/10/2021</a:t>
+              <a:t>05/10/2021</a:t>
             </a:fld>
             <a:endParaRPr lang="es-ES"/>
           </a:p>
@@ -2897,7 +2953,7 @@
           <a:p>
             <a:fld id="{02CD1CC9-5596-4E27-B1CC-DEB413C482D2}" type="datetimeFigureOut">
               <a:rPr lang="es-ES" smtClean="0"/>
-              <a:t>03/10/2021</a:t>
+              <a:t>05/10/2021</a:t>
             </a:fld>
             <a:endParaRPr lang="es-ES"/>
           </a:p>
@@ -3185,7 +3241,7 @@
           <a:p>
             <a:fld id="{02CD1CC9-5596-4E27-B1CC-DEB413C482D2}" type="datetimeFigureOut">
               <a:rPr lang="es-ES" smtClean="0"/>
-              <a:t>03/10/2021</a:t>
+              <a:t>05/10/2021</a:t>
             </a:fld>
             <a:endParaRPr lang="es-ES"/>
           </a:p>
@@ -3426,7 +3482,7 @@
           <a:p>
             <a:fld id="{02CD1CC9-5596-4E27-B1CC-DEB413C482D2}" type="datetimeFigureOut">
               <a:rPr lang="es-ES" smtClean="0"/>
-              <a:t>03/10/2021</a:t>
+              <a:t>05/10/2021</a:t>
             </a:fld>
             <a:endParaRPr lang="es-ES"/>
           </a:p>
@@ -4712,8 +4768,8 @@
         </p:nvSpPr>
         <p:spPr>
           <a:xfrm>
-            <a:off x="1288193" y="3945577"/>
-            <a:ext cx="1144346" cy="276999"/>
+            <a:off x="8824203" y="1189279"/>
+            <a:ext cx="1332633" cy="276999"/>
           </a:xfrm>
           <a:prstGeom prst="rect">
             <a:avLst/>
@@ -4746,7 +4802,10 @@
               <a:rPr lang="es-ES" sz="1200" dirty="0" err="1"/>
               <a:t>segment</a:t>
             </a:r>
-            <a:endParaRPr lang="es-ES" sz="1200" dirty="0"/>
+            <a:r>
+              <a:rPr lang="es-ES" sz="1200" dirty="0"/>
+              <a:t> #73</a:t>
+            </a:r>
           </a:p>
         </p:txBody>
       </p:sp>
@@ -4839,226 +4898,6 @@
       </p:sp>
       <p:sp>
         <p:nvSpPr>
-          <p:cNvPr id="34" name="CuadroTexto 33">
-            <a:extLst>
-              <a:ext uri="{FF2B5EF4-FFF2-40B4-BE49-F238E27FC236}">
-                <a16:creationId xmlns:a16="http://schemas.microsoft.com/office/drawing/2014/main" id="{8346D467-61BC-4738-9085-D0C1296A1B5D}"/>
-              </a:ext>
-            </a:extLst>
-          </p:cNvPr>
-          <p:cNvSpPr txBox="1"/>
-          <p:nvPr/>
-        </p:nvSpPr>
-        <p:spPr>
-          <a:xfrm>
-            <a:off x="8847351" y="1245152"/>
-            <a:ext cx="1125355" cy="276999"/>
-          </a:xfrm>
-          <a:prstGeom prst="rect">
-            <a:avLst/>
-          </a:prstGeom>
-          <a:noFill/>
-          <a:ln w="28575">
-            <a:solidFill>
-              <a:schemeClr val="accent4">
-                <a:lumMod val="60000"/>
-                <a:lumOff val="40000"/>
-              </a:schemeClr>
-            </a:solidFill>
-          </a:ln>
-        </p:spPr>
-        <p:txBody>
-          <a:bodyPr wrap="square" rtlCol="0">
-            <a:spAutoFit/>
-          </a:bodyPr>
-          <a:lstStyle/>
-          <a:p>
-            <a:r>
-              <a:rPr lang="es-ES" sz="1200" dirty="0" err="1"/>
-              <a:t>Refactor</a:t>
-            </a:r>
-            <a:r>
-              <a:rPr lang="es-ES" sz="1200" dirty="0"/>
-              <a:t> </a:t>
-            </a:r>
-            <a:r>
-              <a:rPr lang="es-ES" sz="1200" dirty="0" err="1"/>
-              <a:t>json</a:t>
-            </a:r>
-            <a:endParaRPr lang="es-ES" sz="1200" dirty="0"/>
-          </a:p>
-        </p:txBody>
-      </p:sp>
-      <p:sp>
-        <p:nvSpPr>
-          <p:cNvPr id="35" name="Flecha: a la derecha 34">
-            <a:extLst>
-              <a:ext uri="{FF2B5EF4-FFF2-40B4-BE49-F238E27FC236}">
-                <a16:creationId xmlns:a16="http://schemas.microsoft.com/office/drawing/2014/main" id="{494CEAFC-A87B-4B7E-990D-12F5109F547C}"/>
-              </a:ext>
-            </a:extLst>
-          </p:cNvPr>
-          <p:cNvSpPr/>
-          <p:nvPr/>
-        </p:nvSpPr>
-        <p:spPr>
-          <a:xfrm>
-            <a:off x="7476801" y="4216101"/>
-            <a:ext cx="3124796" cy="788432"/>
-          </a:xfrm>
-          <a:prstGeom prst="rightArrow">
-            <a:avLst/>
-          </a:prstGeom>
-          <a:solidFill>
-            <a:srgbClr val="00B0F0"/>
-          </a:solidFill>
-          <a:ln>
-            <a:solidFill>
-              <a:schemeClr val="accent1">
-                <a:lumMod val="75000"/>
-              </a:schemeClr>
-            </a:solidFill>
-          </a:ln>
-        </p:spPr>
-        <p:style>
-          <a:lnRef idx="2">
-            <a:schemeClr val="accent1">
-              <a:shade val="50000"/>
-            </a:schemeClr>
-          </a:lnRef>
-          <a:fillRef idx="1">
-            <a:schemeClr val="accent1"/>
-          </a:fillRef>
-          <a:effectRef idx="0">
-            <a:schemeClr val="accent1"/>
-          </a:effectRef>
-          <a:fontRef idx="minor">
-            <a:schemeClr val="lt1"/>
-          </a:fontRef>
-        </p:style>
-        <p:txBody>
-          <a:bodyPr rtlCol="0" anchor="ctr"/>
-          <a:lstStyle/>
-          <a:p>
-            <a:pPr algn="ctr"/>
-            <a:endParaRPr lang="es-ES"/>
-          </a:p>
-        </p:txBody>
-      </p:sp>
-      <p:sp>
-        <p:nvSpPr>
-          <p:cNvPr id="36" name="Flecha: a la derecha 35">
-            <a:extLst>
-              <a:ext uri="{FF2B5EF4-FFF2-40B4-BE49-F238E27FC236}">
-                <a16:creationId xmlns:a16="http://schemas.microsoft.com/office/drawing/2014/main" id="{B66920C0-5D30-4285-A97C-53F2A7440D2B}"/>
-              </a:ext>
-            </a:extLst>
-          </p:cNvPr>
-          <p:cNvSpPr/>
-          <p:nvPr/>
-        </p:nvSpPr>
-        <p:spPr>
-          <a:xfrm>
-            <a:off x="5542318" y="4222576"/>
-            <a:ext cx="3124796" cy="788432"/>
-          </a:xfrm>
-          <a:prstGeom prst="rightArrow">
-            <a:avLst/>
-          </a:prstGeom>
-          <a:solidFill>
-            <a:srgbClr val="00B0F0"/>
-          </a:solidFill>
-          <a:ln>
-            <a:solidFill>
-              <a:schemeClr val="accent1">
-                <a:lumMod val="75000"/>
-              </a:schemeClr>
-            </a:solidFill>
-          </a:ln>
-        </p:spPr>
-        <p:style>
-          <a:lnRef idx="2">
-            <a:schemeClr val="accent1">
-              <a:shade val="50000"/>
-            </a:schemeClr>
-          </a:lnRef>
-          <a:fillRef idx="1">
-            <a:schemeClr val="accent1"/>
-          </a:fillRef>
-          <a:effectRef idx="0">
-            <a:schemeClr val="accent1"/>
-          </a:effectRef>
-          <a:fontRef idx="minor">
-            <a:schemeClr val="lt1"/>
-          </a:fontRef>
-        </p:style>
-        <p:txBody>
-          <a:bodyPr rtlCol="0" anchor="ctr"/>
-          <a:lstStyle/>
-          <a:p>
-            <a:pPr algn="ctr"/>
-            <a:endParaRPr lang="es-ES"/>
-          </a:p>
-        </p:txBody>
-      </p:sp>
-      <p:sp>
-        <p:nvSpPr>
-          <p:cNvPr id="37" name="Flecha: a la derecha 36">
-            <a:extLst>
-              <a:ext uri="{FF2B5EF4-FFF2-40B4-BE49-F238E27FC236}">
-                <a16:creationId xmlns:a16="http://schemas.microsoft.com/office/drawing/2014/main" id="{43B149ED-2CA3-4547-AFF9-B37380C17270}"/>
-              </a:ext>
-            </a:extLst>
-          </p:cNvPr>
-          <p:cNvSpPr/>
-          <p:nvPr/>
-        </p:nvSpPr>
-        <p:spPr>
-          <a:xfrm>
-            <a:off x="3808304" y="4216658"/>
-            <a:ext cx="3124796" cy="788432"/>
-          </a:xfrm>
-          <a:prstGeom prst="rightArrow">
-            <a:avLst/>
-          </a:prstGeom>
-          <a:solidFill>
-            <a:srgbClr val="00B0F0"/>
-          </a:solidFill>
-          <a:ln>
-            <a:solidFill>
-              <a:schemeClr val="accent1">
-                <a:lumMod val="75000"/>
-              </a:schemeClr>
-            </a:solidFill>
-          </a:ln>
-        </p:spPr>
-        <p:style>
-          <a:lnRef idx="2">
-            <a:schemeClr val="accent1">
-              <a:shade val="50000"/>
-            </a:schemeClr>
-          </a:lnRef>
-          <a:fillRef idx="1">
-            <a:schemeClr val="accent1"/>
-          </a:fillRef>
-          <a:effectRef idx="0">
-            <a:schemeClr val="accent1"/>
-          </a:effectRef>
-          <a:fontRef idx="minor">
-            <a:schemeClr val="lt1"/>
-          </a:fontRef>
-        </p:style>
-        <p:txBody>
-          <a:bodyPr rtlCol="0" anchor="ctr"/>
-          <a:lstStyle/>
-          <a:p>
-            <a:pPr algn="ctr"/>
-            <a:endParaRPr lang="es-ES"/>
-          </a:p>
-        </p:txBody>
-      </p:sp>
-      <p:sp>
-        <p:nvSpPr>
           <p:cNvPr id="38" name="Flecha: a la derecha 37">
             <a:extLst>
               <a:ext uri="{FF2B5EF4-FFF2-40B4-BE49-F238E27FC236}">
@@ -5166,48 +5005,6 @@
           <a:p>
             <a:pPr algn="ctr"/>
             <a:endParaRPr lang="es-ES"/>
-          </a:p>
-        </p:txBody>
-      </p:sp>
-      <p:sp>
-        <p:nvSpPr>
-          <p:cNvPr id="42" name="CuadroTexto 41">
-            <a:extLst>
-              <a:ext uri="{FF2B5EF4-FFF2-40B4-BE49-F238E27FC236}">
-                <a16:creationId xmlns:a16="http://schemas.microsoft.com/office/drawing/2014/main" id="{1ABD6C16-AA33-41CD-9BB4-E3399CAFACA5}"/>
-              </a:ext>
-            </a:extLst>
-          </p:cNvPr>
-          <p:cNvSpPr txBox="1"/>
-          <p:nvPr/>
-        </p:nvSpPr>
-        <p:spPr>
-          <a:xfrm>
-            <a:off x="1362067" y="4939605"/>
-            <a:ext cx="835864" cy="369332"/>
-          </a:xfrm>
-          <a:prstGeom prst="rect">
-            <a:avLst/>
-          </a:prstGeom>
-          <a:noFill/>
-          <a:ln w="38100">
-            <a:solidFill>
-              <a:schemeClr val="accent4">
-                <a:lumMod val="75000"/>
-              </a:schemeClr>
-            </a:solidFill>
-          </a:ln>
-        </p:spPr>
-        <p:txBody>
-          <a:bodyPr wrap="square" rtlCol="0">
-            <a:spAutoFit/>
-          </a:bodyPr>
-          <a:lstStyle/>
-          <a:p>
-            <a:r>
-              <a:rPr lang="es-ES" dirty="0"/>
-              <a:t>V0.1.6</a:t>
-            </a:r>
           </a:p>
         </p:txBody>
       </p:sp>
@@ -5301,141 +5098,6 @@
           </a:fontRef>
         </p:style>
       </p:cxnSp>
-      <p:cxnSp>
-        <p:nvCxnSpPr>
-          <p:cNvPr id="48" name="Conector recto 47">
-            <a:extLst>
-              <a:ext uri="{FF2B5EF4-FFF2-40B4-BE49-F238E27FC236}">
-                <a16:creationId xmlns:a16="http://schemas.microsoft.com/office/drawing/2014/main" id="{45074E4F-B162-4AFD-90CA-BAEB5B6B4BE6}"/>
-              </a:ext>
-            </a:extLst>
-          </p:cNvPr>
-          <p:cNvCxnSpPr>
-            <a:cxnSpLocks/>
-          </p:cNvCxnSpPr>
-          <p:nvPr/>
-        </p:nvCxnSpPr>
-        <p:spPr>
-          <a:xfrm>
-            <a:off x="5504704" y="4404154"/>
-            <a:ext cx="0" cy="412750"/>
-          </a:xfrm>
-          <a:prstGeom prst="line">
-            <a:avLst/>
-          </a:prstGeom>
-          <a:ln w="38100">
-            <a:solidFill>
-              <a:schemeClr val="accent4">
-                <a:lumMod val="75000"/>
-              </a:schemeClr>
-            </a:solidFill>
-          </a:ln>
-        </p:spPr>
-        <p:style>
-          <a:lnRef idx="1">
-            <a:schemeClr val="accent1"/>
-          </a:lnRef>
-          <a:fillRef idx="0">
-            <a:schemeClr val="accent1"/>
-          </a:fillRef>
-          <a:effectRef idx="0">
-            <a:schemeClr val="accent1"/>
-          </a:effectRef>
-          <a:fontRef idx="minor">
-            <a:schemeClr val="tx1"/>
-          </a:fontRef>
-        </p:style>
-      </p:cxnSp>
-      <p:cxnSp>
-        <p:nvCxnSpPr>
-          <p:cNvPr id="51" name="Conector recto 50">
-            <a:extLst>
-              <a:ext uri="{FF2B5EF4-FFF2-40B4-BE49-F238E27FC236}">
-                <a16:creationId xmlns:a16="http://schemas.microsoft.com/office/drawing/2014/main" id="{36C54D4C-5F97-41AD-99CC-953283692C37}"/>
-              </a:ext>
-            </a:extLst>
-          </p:cNvPr>
-          <p:cNvCxnSpPr>
-            <a:cxnSpLocks/>
-          </p:cNvCxnSpPr>
-          <p:nvPr/>
-        </p:nvCxnSpPr>
-        <p:spPr>
-          <a:xfrm>
-            <a:off x="7422294" y="4404154"/>
-            <a:ext cx="0" cy="412750"/>
-          </a:xfrm>
-          <a:prstGeom prst="line">
-            <a:avLst/>
-          </a:prstGeom>
-          <a:ln w="38100">
-            <a:solidFill>
-              <a:schemeClr val="accent4">
-                <a:lumMod val="75000"/>
-              </a:schemeClr>
-            </a:solidFill>
-          </a:ln>
-        </p:spPr>
-        <p:style>
-          <a:lnRef idx="1">
-            <a:schemeClr val="accent1"/>
-          </a:lnRef>
-          <a:fillRef idx="0">
-            <a:schemeClr val="accent1"/>
-          </a:fillRef>
-          <a:effectRef idx="0">
-            <a:schemeClr val="accent1"/>
-          </a:effectRef>
-          <a:fontRef idx="minor">
-            <a:schemeClr val="tx1"/>
-          </a:fontRef>
-        </p:style>
-      </p:cxnSp>
-      <p:cxnSp>
-        <p:nvCxnSpPr>
-          <p:cNvPr id="54" name="Conector recto 53">
-            <a:extLst>
-              <a:ext uri="{FF2B5EF4-FFF2-40B4-BE49-F238E27FC236}">
-                <a16:creationId xmlns:a16="http://schemas.microsoft.com/office/drawing/2014/main" id="{D520950A-3B30-47F0-B44B-6A765974E1E4}"/>
-              </a:ext>
-            </a:extLst>
-          </p:cNvPr>
-          <p:cNvCxnSpPr>
-            <a:cxnSpLocks/>
-          </p:cNvCxnSpPr>
-          <p:nvPr/>
-        </p:nvCxnSpPr>
-        <p:spPr>
-          <a:xfrm>
-            <a:off x="9378327" y="4404154"/>
-            <a:ext cx="0" cy="412750"/>
-          </a:xfrm>
-          <a:prstGeom prst="line">
-            <a:avLst/>
-          </a:prstGeom>
-          <a:ln w="38100">
-            <a:solidFill>
-              <a:schemeClr val="accent4">
-                <a:lumMod val="75000"/>
-              </a:schemeClr>
-            </a:solidFill>
-          </a:ln>
-        </p:spPr>
-        <p:style>
-          <a:lnRef idx="1">
-            <a:schemeClr val="accent1"/>
-          </a:lnRef>
-          <a:fillRef idx="0">
-            <a:schemeClr val="accent1"/>
-          </a:fillRef>
-          <a:effectRef idx="0">
-            <a:schemeClr val="accent1"/>
-          </a:effectRef>
-          <a:fontRef idx="minor">
-            <a:schemeClr val="tx1"/>
-          </a:fontRef>
-        </p:style>
-      </p:cxnSp>
       <p:sp>
         <p:nvSpPr>
           <p:cNvPr id="57" name="CuadroTexto 56">
@@ -5706,7 +5368,7 @@
         </p:nvSpPr>
         <p:spPr>
           <a:xfrm>
-            <a:off x="3404983" y="3841367"/>
+            <a:off x="1427063" y="3812781"/>
             <a:ext cx="835864" cy="369332"/>
           </a:xfrm>
           <a:prstGeom prst="rect">
@@ -5729,7 +5391,7 @@
           <a:p>
             <a:r>
               <a:rPr lang="es-ES" dirty="0"/>
-              <a:t>V0.1.7</a:t>
+              <a:t>V0.1.6</a:t>
             </a:r>
           </a:p>
         </p:txBody>
@@ -5748,7 +5410,7 @@
         </p:nvSpPr>
         <p:spPr>
           <a:xfrm>
-            <a:off x="3307043" y="5074148"/>
+            <a:off x="1301648" y="4967015"/>
             <a:ext cx="1144346" cy="461665"/>
           </a:xfrm>
           <a:prstGeom prst="rect">
@@ -5811,7 +5473,7 @@
         </p:nvSpPr>
         <p:spPr>
           <a:xfrm>
-            <a:off x="9039199" y="3840294"/>
+            <a:off x="3377485" y="5137670"/>
             <a:ext cx="835864" cy="369332"/>
           </a:xfrm>
           <a:prstGeom prst="rect">
@@ -5853,7 +5515,7 @@
         </p:nvSpPr>
         <p:spPr>
           <a:xfrm>
-            <a:off x="8884958" y="5078104"/>
+            <a:off x="3236131" y="3711545"/>
             <a:ext cx="1144346" cy="461665"/>
           </a:xfrm>
           <a:prstGeom prst="rect">

</xml_diff>

<commit_message>
Update versioning and roadmap after first deploy
</commit_message>
<xml_diff>
--- a/docs/roadmap.pptx
+++ b/docs/roadmap.pptx
@@ -115,7 +115,7 @@
 <file path=ppt/revisionInfo.xml><?xml version="1.0" encoding="utf-8"?>
 <p1510:revInfo xmlns:a="http://schemas.openxmlformats.org/drawingml/2006/main" xmlns:r="http://schemas.openxmlformats.org/officeDocument/2006/relationships" xmlns:p1510="http://schemas.microsoft.com/office/powerpoint/2015/10/main">
   <p1510:revLst>
-    <p1510:client id="{294FDEE4-22F5-4BA6-8A7A-6B03A781B212}" v="10" dt="2021-10-17T17:07:35.980"/>
+    <p1510:client id="{294FDEE4-22F5-4BA6-8A7A-6B03A781B212}" v="25" dt="2021-10-23T23:16:11.569"/>
   </p1510:revLst>
 </p1510:revInfo>
 </file>
@@ -517,12 +517,12 @@
   <pc:docChgLst>
     <pc:chgData name="Alonso Guerrero Llorente" userId="451d9a1c5f7013d1" providerId="LiveId" clId="{294FDEE4-22F5-4BA6-8A7A-6B03A781B212}"/>
     <pc:docChg chg="undo custSel modSld">
-      <pc:chgData name="Alonso Guerrero Llorente" userId="451d9a1c5f7013d1" providerId="LiveId" clId="{294FDEE4-22F5-4BA6-8A7A-6B03A781B212}" dt="2021-10-17T17:08:19.075" v="176" actId="1076"/>
+      <pc:chgData name="Alonso Guerrero Llorente" userId="451d9a1c5f7013d1" providerId="LiveId" clId="{294FDEE4-22F5-4BA6-8A7A-6B03A781B212}" dt="2021-10-23T23:16:44.781" v="427" actId="1076"/>
       <pc:docMkLst>
         <pc:docMk/>
       </pc:docMkLst>
       <pc:sldChg chg="addSp delSp modSp mod">
-        <pc:chgData name="Alonso Guerrero Llorente" userId="451d9a1c5f7013d1" providerId="LiveId" clId="{294FDEE4-22F5-4BA6-8A7A-6B03A781B212}" dt="2021-10-17T17:08:19.075" v="176" actId="1076"/>
+        <pc:chgData name="Alonso Guerrero Llorente" userId="451d9a1c5f7013d1" providerId="LiveId" clId="{294FDEE4-22F5-4BA6-8A7A-6B03A781B212}" dt="2021-10-23T23:16:44.781" v="427" actId="1076"/>
         <pc:sldMkLst>
           <pc:docMk/>
           <pc:sldMk cId="1813519119" sldId="256"/>
@@ -575,6 +575,14 @@
             <ac:spMk id="35" creationId="{494CEAFC-A87B-4B7E-990D-12F5109F547C}"/>
           </ac:spMkLst>
         </pc:spChg>
+        <pc:spChg chg="add mod">
+          <ac:chgData name="Alonso Guerrero Llorente" userId="451d9a1c5f7013d1" providerId="LiveId" clId="{294FDEE4-22F5-4BA6-8A7A-6B03A781B212}" dt="2021-10-23T23:08:27.349" v="186" actId="1076"/>
+          <ac:spMkLst>
+            <pc:docMk/>
+            <pc:sldMk cId="1813519119" sldId="256"/>
+            <ac:spMk id="35" creationId="{95F394F3-233E-43BB-8516-9BBF3CDA3CFA}"/>
+          </ac:spMkLst>
+        </pc:spChg>
         <pc:spChg chg="del">
           <ac:chgData name="Alonso Guerrero Llorente" userId="451d9a1c5f7013d1" providerId="LiveId" clId="{294FDEE4-22F5-4BA6-8A7A-6B03A781B212}" dt="2021-10-05T19:31:25.740" v="158" actId="478"/>
           <ac:spMkLst>
@@ -583,6 +591,14 @@
             <ac:spMk id="36" creationId="{B66920C0-5D30-4285-A97C-53F2A7440D2B}"/>
           </ac:spMkLst>
         </pc:spChg>
+        <pc:spChg chg="add mod">
+          <ac:chgData name="Alonso Guerrero Llorente" userId="451d9a1c5f7013d1" providerId="LiveId" clId="{294FDEE4-22F5-4BA6-8A7A-6B03A781B212}" dt="2021-10-23T23:12:22.853" v="235" actId="1076"/>
+          <ac:spMkLst>
+            <pc:docMk/>
+            <pc:sldMk cId="1813519119" sldId="256"/>
+            <ac:spMk id="36" creationId="{F5684C7F-BEE8-4AF1-8BEA-2ECFE4DC2F5C}"/>
+          </ac:spMkLst>
+        </pc:spChg>
         <pc:spChg chg="del mod">
           <ac:chgData name="Alonso Guerrero Llorente" userId="451d9a1c5f7013d1" providerId="LiveId" clId="{294FDEE4-22F5-4BA6-8A7A-6B03A781B212}" dt="2021-10-05T19:31:27.656" v="160" actId="478"/>
           <ac:spMkLst>
@@ -591,6 +607,30 @@
             <ac:spMk id="37" creationId="{43B149ED-2CA3-4547-AFF9-B37380C17270}"/>
           </ac:spMkLst>
         </pc:spChg>
+        <pc:spChg chg="add del mod">
+          <ac:chgData name="Alonso Guerrero Llorente" userId="451d9a1c5f7013d1" providerId="LiveId" clId="{294FDEE4-22F5-4BA6-8A7A-6B03A781B212}" dt="2021-10-23T23:11:02.749" v="194"/>
+          <ac:spMkLst>
+            <pc:docMk/>
+            <pc:sldMk cId="1813519119" sldId="256"/>
+            <ac:spMk id="37" creationId="{C0F5EFB6-BA19-40AD-934C-8E186E9904AE}"/>
+          </ac:spMkLst>
+        </pc:spChg>
+        <pc:spChg chg="del">
+          <ac:chgData name="Alonso Guerrero Llorente" userId="451d9a1c5f7013d1" providerId="LiveId" clId="{294FDEE4-22F5-4BA6-8A7A-6B03A781B212}" dt="2021-10-23T23:11:25.608" v="200" actId="478"/>
+          <ac:spMkLst>
+            <pc:docMk/>
+            <pc:sldMk cId="1813519119" sldId="256"/>
+            <ac:spMk id="38" creationId="{8B147247-3BF7-4730-B43F-0C8EE53F75C1}"/>
+          </ac:spMkLst>
+        </pc:spChg>
+        <pc:spChg chg="del">
+          <ac:chgData name="Alonso Guerrero Llorente" userId="451d9a1c5f7013d1" providerId="LiveId" clId="{294FDEE4-22F5-4BA6-8A7A-6B03A781B212}" dt="2021-10-23T23:11:26.680" v="202" actId="478"/>
+          <ac:spMkLst>
+            <pc:docMk/>
+            <pc:sldMk cId="1813519119" sldId="256"/>
+            <ac:spMk id="39" creationId="{6CFE131A-964B-4143-A5B1-72A19AC46C0E}"/>
+          </ac:spMkLst>
+        </pc:spChg>
         <pc:spChg chg="add mod">
           <ac:chgData name="Alonso Guerrero Llorente" userId="451d9a1c5f7013d1" providerId="LiveId" clId="{294FDEE4-22F5-4BA6-8A7A-6B03A781B212}" dt="2021-10-03T18:41:37.392" v="126" actId="1076"/>
           <ac:spMkLst>
@@ -615,6 +655,14 @@
             <ac:spMk id="42" creationId="{1ABD6C16-AA33-41CD-9BB4-E3399CAFACA5}"/>
           </ac:spMkLst>
         </pc:spChg>
+        <pc:spChg chg="add del mod ord">
+          <ac:chgData name="Alonso Guerrero Llorente" userId="451d9a1c5f7013d1" providerId="LiveId" clId="{294FDEE4-22F5-4BA6-8A7A-6B03A781B212}" dt="2021-10-23T23:11:26.119" v="201" actId="478"/>
+          <ac:spMkLst>
+            <pc:docMk/>
+            <pc:sldMk cId="1813519119" sldId="256"/>
+            <ac:spMk id="44" creationId="{4DFF1242-9E48-4E01-ACE5-2A5D3625B3F3}"/>
+          </ac:spMkLst>
+        </pc:spChg>
         <pc:spChg chg="add del mod">
           <ac:chgData name="Alonso Guerrero Llorente" userId="451d9a1c5f7013d1" providerId="LiveId" clId="{294FDEE4-22F5-4BA6-8A7A-6B03A781B212}" dt="2021-10-17T17:08:12.413" v="173" actId="478"/>
           <ac:spMkLst>
@@ -631,12 +679,20 @@
             <ac:spMk id="45" creationId="{AE2EDDC6-CEBF-4738-A65C-93AC2F522E5F}"/>
           </ac:spMkLst>
         </pc:spChg>
+        <pc:spChg chg="add del mod">
+          <ac:chgData name="Alonso Guerrero Llorente" userId="451d9a1c5f7013d1" providerId="LiveId" clId="{294FDEE4-22F5-4BA6-8A7A-6B03A781B212}" dt="2021-10-23T23:08:22.023" v="185" actId="478"/>
+          <ac:spMkLst>
+            <pc:docMk/>
+            <pc:sldMk cId="1813519119" sldId="256"/>
+            <ac:spMk id="46" creationId="{C9529B70-423C-431D-9460-BC47659DD43F}"/>
+          </ac:spMkLst>
+        </pc:spChg>
         <pc:spChg chg="add mod">
-          <ac:chgData name="Alonso Guerrero Llorente" userId="451d9a1c5f7013d1" providerId="LiveId" clId="{294FDEE4-22F5-4BA6-8A7A-6B03A781B212}" dt="2021-10-17T17:08:19.075" v="176" actId="1076"/>
-          <ac:spMkLst>
-            <pc:docMk/>
-            <pc:sldMk cId="1813519119" sldId="256"/>
-            <ac:spMk id="46" creationId="{C9529B70-423C-431D-9460-BC47659DD43F}"/>
+          <ac:chgData name="Alonso Guerrero Llorente" userId="451d9a1c5f7013d1" providerId="LiveId" clId="{294FDEE4-22F5-4BA6-8A7A-6B03A781B212}" dt="2021-10-23T23:11:42.529" v="204" actId="1076"/>
+          <ac:spMkLst>
+            <pc:docMk/>
+            <pc:sldMk cId="1813519119" sldId="256"/>
+            <ac:spMk id="49" creationId="{5794D025-8B25-4546-9E11-FFF58E1C20B4}"/>
           </ac:spMkLst>
         </pc:spChg>
         <pc:spChg chg="add del mod">
@@ -647,6 +703,14 @@
             <ac:spMk id="49" creationId="{6685D30B-229D-4943-B9B8-B862480E60CC}"/>
           </ac:spMkLst>
         </pc:spChg>
+        <pc:spChg chg="add mod">
+          <ac:chgData name="Alonso Guerrero Llorente" userId="451d9a1c5f7013d1" providerId="LiveId" clId="{294FDEE4-22F5-4BA6-8A7A-6B03A781B212}" dt="2021-10-23T23:11:42.529" v="204" actId="1076"/>
+          <ac:spMkLst>
+            <pc:docMk/>
+            <pc:sldMk cId="1813519119" sldId="256"/>
+            <ac:spMk id="50" creationId="{4209C9A4-737E-499B-B0DB-34783B30BEF5}"/>
+          </ac:spMkLst>
+        </pc:spChg>
         <pc:spChg chg="add del mod">
           <ac:chgData name="Alonso Guerrero Llorente" userId="451d9a1c5f7013d1" providerId="LiveId" clId="{294FDEE4-22F5-4BA6-8A7A-6B03A781B212}" dt="2021-10-03T18:48:14.488" v="139"/>
           <ac:spMkLst>
@@ -655,6 +719,30 @@
             <ac:spMk id="50" creationId="{85229524-047C-4B54-B196-0555B667F32A}"/>
           </ac:spMkLst>
         </pc:spChg>
+        <pc:spChg chg="add mod">
+          <ac:chgData name="Alonso Guerrero Llorente" userId="451d9a1c5f7013d1" providerId="LiveId" clId="{294FDEE4-22F5-4BA6-8A7A-6B03A781B212}" dt="2021-10-23T23:11:42.529" v="204" actId="1076"/>
+          <ac:spMkLst>
+            <pc:docMk/>
+            <pc:sldMk cId="1813519119" sldId="256"/>
+            <ac:spMk id="51" creationId="{2D8DD951-650A-4CC5-9E2A-C925D0D3D8D4}"/>
+          </ac:spMkLst>
+        </pc:spChg>
+        <pc:spChg chg="add mod">
+          <ac:chgData name="Alonso Guerrero Llorente" userId="451d9a1c5f7013d1" providerId="LiveId" clId="{294FDEE4-22F5-4BA6-8A7A-6B03A781B212}" dt="2021-10-23T23:11:42.529" v="204" actId="1076"/>
+          <ac:spMkLst>
+            <pc:docMk/>
+            <pc:sldMk cId="1813519119" sldId="256"/>
+            <ac:spMk id="52" creationId="{B91CE77F-FF42-4775-8EEF-ACE2453FC4EA}"/>
+          </ac:spMkLst>
+        </pc:spChg>
+        <pc:spChg chg="add del mod">
+          <ac:chgData name="Alonso Guerrero Llorente" userId="451d9a1c5f7013d1" providerId="LiveId" clId="{294FDEE4-22F5-4BA6-8A7A-6B03A781B212}" dt="2021-10-23T23:12:18.018" v="234" actId="1035"/>
+          <ac:spMkLst>
+            <pc:docMk/>
+            <pc:sldMk cId="1813519119" sldId="256"/>
+            <ac:spMk id="53" creationId="{991F18BF-A8E9-4D8C-AD7B-EEA70660C8E4}"/>
+          </ac:spMkLst>
+        </pc:spChg>
         <pc:spChg chg="mod">
           <ac:chgData name="Alonso Guerrero Llorente" userId="451d9a1c5f7013d1" providerId="LiveId" clId="{294FDEE4-22F5-4BA6-8A7A-6B03A781B212}" dt="2021-10-03T18:40:35.059" v="107" actId="20577"/>
           <ac:spMkLst>
@@ -663,12 +751,100 @@
             <ac:spMk id="57" creationId="{51DCCDF9-3046-4212-8E50-E5E8272F4C4C}"/>
           </ac:spMkLst>
         </pc:spChg>
+        <pc:spChg chg="add del mod">
+          <ac:chgData name="Alonso Guerrero Llorente" userId="451d9a1c5f7013d1" providerId="LiveId" clId="{294FDEE4-22F5-4BA6-8A7A-6B03A781B212}" dt="2021-10-23T23:12:16.816" v="231"/>
+          <ac:spMkLst>
+            <pc:docMk/>
+            <pc:sldMk cId="1813519119" sldId="256"/>
+            <ac:spMk id="63" creationId="{2C48158F-34BC-4586-BD2E-B89872E962CC}"/>
+          </ac:spMkLst>
+        </pc:spChg>
+        <pc:spChg chg="add mod">
+          <ac:chgData name="Alonso Guerrero Llorente" userId="451d9a1c5f7013d1" providerId="LiveId" clId="{294FDEE4-22F5-4BA6-8A7A-6B03A781B212}" dt="2021-10-23T23:13:29.019" v="299" actId="1076"/>
+          <ac:spMkLst>
+            <pc:docMk/>
+            <pc:sldMk cId="1813519119" sldId="256"/>
+            <ac:spMk id="64" creationId="{424FC165-0856-4482-883E-7D8D1C3555E0}"/>
+          </ac:spMkLst>
+        </pc:spChg>
+        <pc:spChg chg="add mod">
+          <ac:chgData name="Alonso Guerrero Llorente" userId="451d9a1c5f7013d1" providerId="LiveId" clId="{294FDEE4-22F5-4BA6-8A7A-6B03A781B212}" dt="2021-10-23T23:15:07.272" v="346" actId="6549"/>
+          <ac:spMkLst>
+            <pc:docMk/>
+            <pc:sldMk cId="1813519119" sldId="256"/>
+            <ac:spMk id="65" creationId="{494AE5CF-81CF-4503-87E8-B477F8796B90}"/>
+          </ac:spMkLst>
+        </pc:spChg>
+        <pc:spChg chg="add mod">
+          <ac:chgData name="Alonso Guerrero Llorente" userId="451d9a1c5f7013d1" providerId="LiveId" clId="{294FDEE4-22F5-4BA6-8A7A-6B03A781B212}" dt="2021-10-23T23:15:26.002" v="352" actId="20577"/>
+          <ac:spMkLst>
+            <pc:docMk/>
+            <pc:sldMk cId="1813519119" sldId="256"/>
+            <ac:spMk id="66" creationId="{27ED8E56-1907-4821-8909-ADE8E90DBD4C}"/>
+          </ac:spMkLst>
+        </pc:spChg>
+        <pc:spChg chg="add mod">
+          <ac:chgData name="Alonso Guerrero Llorente" userId="451d9a1c5f7013d1" providerId="LiveId" clId="{294FDEE4-22F5-4BA6-8A7A-6B03A781B212}" dt="2021-10-23T23:15:47.410" v="369" actId="1076"/>
+          <ac:spMkLst>
+            <pc:docMk/>
+            <pc:sldMk cId="1813519119" sldId="256"/>
+            <ac:spMk id="67" creationId="{9302551E-202E-44FF-853F-5BD4A3CCF210}"/>
+          </ac:spMkLst>
+        </pc:spChg>
+        <pc:spChg chg="add mod">
+          <ac:chgData name="Alonso Guerrero Llorente" userId="451d9a1c5f7013d1" providerId="LiveId" clId="{294FDEE4-22F5-4BA6-8A7A-6B03A781B212}" dt="2021-10-23T23:15:55.168" v="373" actId="6549"/>
+          <ac:spMkLst>
+            <pc:docMk/>
+            <pc:sldMk cId="1813519119" sldId="256"/>
+            <ac:spMk id="68" creationId="{113102C0-D928-435B-82E2-2ED9585A3432}"/>
+          </ac:spMkLst>
+        </pc:spChg>
+        <pc:spChg chg="add mod">
+          <ac:chgData name="Alonso Guerrero Llorente" userId="451d9a1c5f7013d1" providerId="LiveId" clId="{294FDEE4-22F5-4BA6-8A7A-6B03A781B212}" dt="2021-10-23T23:16:08.324" v="377" actId="6549"/>
+          <ac:spMkLst>
+            <pc:docMk/>
+            <pc:sldMk cId="1813519119" sldId="256"/>
+            <ac:spMk id="69" creationId="{3721574A-FED0-4B9D-9AFC-02F13FE41976}"/>
+          </ac:spMkLst>
+        </pc:spChg>
+        <pc:spChg chg="add mod">
+          <ac:chgData name="Alonso Guerrero Llorente" userId="451d9a1c5f7013d1" providerId="LiveId" clId="{294FDEE4-22F5-4BA6-8A7A-6B03A781B212}" dt="2021-10-23T23:16:44.781" v="427" actId="1076"/>
+          <ac:spMkLst>
+            <pc:docMk/>
+            <pc:sldMk cId="1813519119" sldId="256"/>
+            <ac:spMk id="70" creationId="{B4A76C54-3398-48F7-9862-FB9C01944C8B}"/>
+          </ac:spMkLst>
+        </pc:spChg>
+        <pc:cxnChg chg="add del mod">
+          <ac:chgData name="Alonso Guerrero Llorente" userId="451d9a1c5f7013d1" providerId="LiveId" clId="{294FDEE4-22F5-4BA6-8A7A-6B03A781B212}" dt="2021-10-23T23:11:02.749" v="194"/>
+          <ac:cxnSpMkLst>
+            <pc:docMk/>
+            <pc:sldMk cId="1813519119" sldId="256"/>
+            <ac:cxnSpMk id="41" creationId="{53FEBB83-D6E6-4A67-BC87-60F20E7F945A}"/>
+          </ac:cxnSpMkLst>
+        </pc:cxnChg>
+        <pc:cxnChg chg="add del mod">
+          <ac:chgData name="Alonso Guerrero Llorente" userId="451d9a1c5f7013d1" providerId="LiveId" clId="{294FDEE4-22F5-4BA6-8A7A-6B03A781B212}" dt="2021-10-23T23:11:02.749" v="194"/>
+          <ac:cxnSpMkLst>
+            <pc:docMk/>
+            <pc:sldMk cId="1813519119" sldId="256"/>
+            <ac:cxnSpMk id="42" creationId="{D5215164-E53D-43B9-8022-A984A1D7D2A0}"/>
+          </ac:cxnSpMkLst>
+        </pc:cxnChg>
         <pc:cxnChg chg="del">
-          <ac:chgData name="Alonso Guerrero Llorente" userId="451d9a1c5f7013d1" providerId="LiveId" clId="{294FDEE4-22F5-4BA6-8A7A-6B03A781B212}" dt="2021-10-05T19:31:25.740" v="158" actId="478"/>
+          <ac:chgData name="Alonso Guerrero Llorente" userId="451d9a1c5f7013d1" providerId="LiveId" clId="{294FDEE4-22F5-4BA6-8A7A-6B03A781B212}" dt="2021-10-23T23:11:24.800" v="199" actId="478"/>
           <ac:cxnSpMkLst>
             <pc:docMk/>
             <pc:sldMk cId="1813519119" sldId="256"/>
-            <ac:cxnSpMk id="48" creationId="{45074E4F-B162-4AFD-90CA-BAEB5B6B4BE6}"/>
+            <ac:cxnSpMk id="43" creationId="{F6599189-C264-4D42-8BD6-ED20B3104F95}"/>
+          </ac:cxnSpMkLst>
+        </pc:cxnChg>
+        <pc:cxnChg chg="del">
+          <ac:chgData name="Alonso Guerrero Llorente" userId="451d9a1c5f7013d1" providerId="LiveId" clId="{294FDEE4-22F5-4BA6-8A7A-6B03A781B212}" dt="2021-10-23T23:11:24.800" v="199" actId="478"/>
+          <ac:cxnSpMkLst>
+            <pc:docMk/>
+            <pc:sldMk cId="1813519119" sldId="256"/>
+            <ac:cxnSpMk id="47" creationId="{D476AB6E-1C83-40A6-BE9B-2C9B3821514D}"/>
           </ac:cxnSpMkLst>
         </pc:cxnChg>
         <pc:cxnChg chg="del">
@@ -676,7 +852,15 @@
           <ac:cxnSpMkLst>
             <pc:docMk/>
             <pc:sldMk cId="1813519119" sldId="256"/>
-            <ac:cxnSpMk id="51" creationId="{36C54D4C-5F97-41AD-99CC-953283692C37}"/>
+            <ac:cxnSpMk id="48" creationId="{45074E4F-B162-4AFD-90CA-BAEB5B6B4BE6}"/>
+          </ac:cxnSpMkLst>
+        </pc:cxnChg>
+        <pc:cxnChg chg="add del mod ord">
+          <ac:chgData name="Alonso Guerrero Llorente" userId="451d9a1c5f7013d1" providerId="LiveId" clId="{294FDEE4-22F5-4BA6-8A7A-6B03A781B212}" dt="2021-10-23T23:11:24.800" v="199" actId="478"/>
+          <ac:cxnSpMkLst>
+            <pc:docMk/>
+            <pc:sldMk cId="1813519119" sldId="256"/>
+            <ac:cxnSpMk id="48" creationId="{EB225390-9457-45CF-A438-7303D4B6A582}"/>
           </ac:cxnSpMkLst>
         </pc:cxnChg>
         <pc:cxnChg chg="del">
@@ -684,7 +868,63 @@
           <ac:cxnSpMkLst>
             <pc:docMk/>
             <pc:sldMk cId="1813519119" sldId="256"/>
+            <ac:cxnSpMk id="51" creationId="{36C54D4C-5F97-41AD-99CC-953283692C37}"/>
+          </ac:cxnSpMkLst>
+        </pc:cxnChg>
+        <pc:cxnChg chg="add del mod">
+          <ac:chgData name="Alonso Guerrero Llorente" userId="451d9a1c5f7013d1" providerId="LiveId" clId="{294FDEE4-22F5-4BA6-8A7A-6B03A781B212}" dt="2021-10-23T23:11:53.497" v="205" actId="478"/>
+          <ac:cxnSpMkLst>
+            <pc:docMk/>
+            <pc:sldMk cId="1813519119" sldId="256"/>
+            <ac:cxnSpMk id="54" creationId="{97DD57AF-F8BC-4400-9210-5628FFB5736C}"/>
+          </ac:cxnSpMkLst>
+        </pc:cxnChg>
+        <pc:cxnChg chg="del">
+          <ac:chgData name="Alonso Guerrero Llorente" userId="451d9a1c5f7013d1" providerId="LiveId" clId="{294FDEE4-22F5-4BA6-8A7A-6B03A781B212}" dt="2021-10-05T19:31:25.740" v="158" actId="478"/>
+          <ac:cxnSpMkLst>
+            <pc:docMk/>
+            <pc:sldMk cId="1813519119" sldId="256"/>
             <ac:cxnSpMk id="54" creationId="{D520950A-3B30-47F0-B44B-6A765974E1E4}"/>
+          </ac:cxnSpMkLst>
+        </pc:cxnChg>
+        <pc:cxnChg chg="add del mod">
+          <ac:chgData name="Alonso Guerrero Llorente" userId="451d9a1c5f7013d1" providerId="LiveId" clId="{294FDEE4-22F5-4BA6-8A7A-6B03A781B212}" dt="2021-10-23T23:12:17.145" v="232" actId="478"/>
+          <ac:cxnSpMkLst>
+            <pc:docMk/>
+            <pc:sldMk cId="1813519119" sldId="256"/>
+            <ac:cxnSpMk id="55" creationId="{B93BBA85-CA43-442C-A10B-5306134AB9BF}"/>
+          </ac:cxnSpMkLst>
+        </pc:cxnChg>
+        <pc:cxnChg chg="add mod">
+          <ac:chgData name="Alonso Guerrero Llorente" userId="451d9a1c5f7013d1" providerId="LiveId" clId="{294FDEE4-22F5-4BA6-8A7A-6B03A781B212}" dt="2021-10-23T23:11:42.529" v="204" actId="1076"/>
+          <ac:cxnSpMkLst>
+            <pc:docMk/>
+            <pc:sldMk cId="1813519119" sldId="256"/>
+            <ac:cxnSpMk id="56" creationId="{B92A11CA-4203-4ABC-A647-1BBE25E916FB}"/>
+          </ac:cxnSpMkLst>
+        </pc:cxnChg>
+        <pc:cxnChg chg="add mod">
+          <ac:chgData name="Alonso Guerrero Llorente" userId="451d9a1c5f7013d1" providerId="LiveId" clId="{294FDEE4-22F5-4BA6-8A7A-6B03A781B212}" dt="2021-10-23T23:11:42.529" v="204" actId="1076"/>
+          <ac:cxnSpMkLst>
+            <pc:docMk/>
+            <pc:sldMk cId="1813519119" sldId="256"/>
+            <ac:cxnSpMk id="60" creationId="{D37DB76B-1675-4B99-BBA2-81C78B1BBA43}"/>
+          </ac:cxnSpMkLst>
+        </pc:cxnChg>
+        <pc:cxnChg chg="add mod">
+          <ac:chgData name="Alonso Guerrero Llorente" userId="451d9a1c5f7013d1" providerId="LiveId" clId="{294FDEE4-22F5-4BA6-8A7A-6B03A781B212}" dt="2021-10-23T23:11:42.529" v="204" actId="1076"/>
+          <ac:cxnSpMkLst>
+            <pc:docMk/>
+            <pc:sldMk cId="1813519119" sldId="256"/>
+            <ac:cxnSpMk id="61" creationId="{54E25F8D-4470-4F17-BC34-2DB36F256DC7}"/>
+          </ac:cxnSpMkLst>
+        </pc:cxnChg>
+        <pc:cxnChg chg="add mod">
+          <ac:chgData name="Alonso Guerrero Llorente" userId="451d9a1c5f7013d1" providerId="LiveId" clId="{294FDEE4-22F5-4BA6-8A7A-6B03A781B212}" dt="2021-10-23T23:11:42.529" v="204" actId="1076"/>
+          <ac:cxnSpMkLst>
+            <pc:docMk/>
+            <pc:sldMk cId="1813519119" sldId="256"/>
+            <ac:cxnSpMk id="62" creationId="{4A140185-A0C3-4BE3-94B9-F3DE2D95DACA}"/>
           </ac:cxnSpMkLst>
         </pc:cxnChg>
       </pc:sldChg>
@@ -840,7 +1080,7 @@
           <a:p>
             <a:fld id="{02CD1CC9-5596-4E27-B1CC-DEB413C482D2}" type="datetimeFigureOut">
               <a:rPr lang="es-ES" smtClean="0"/>
-              <a:t>17/10/2021</a:t>
+              <a:t>24/10/2021</a:t>
             </a:fld>
             <a:endParaRPr lang="es-ES"/>
           </a:p>
@@ -1038,7 +1278,7 @@
           <a:p>
             <a:fld id="{02CD1CC9-5596-4E27-B1CC-DEB413C482D2}" type="datetimeFigureOut">
               <a:rPr lang="es-ES" smtClean="0"/>
-              <a:t>17/10/2021</a:t>
+              <a:t>24/10/2021</a:t>
             </a:fld>
             <a:endParaRPr lang="es-ES"/>
           </a:p>
@@ -1246,7 +1486,7 @@
           <a:p>
             <a:fld id="{02CD1CC9-5596-4E27-B1CC-DEB413C482D2}" type="datetimeFigureOut">
               <a:rPr lang="es-ES" smtClean="0"/>
-              <a:t>17/10/2021</a:t>
+              <a:t>24/10/2021</a:t>
             </a:fld>
             <a:endParaRPr lang="es-ES"/>
           </a:p>
@@ -1444,7 +1684,7 @@
           <a:p>
             <a:fld id="{02CD1CC9-5596-4E27-B1CC-DEB413C482D2}" type="datetimeFigureOut">
               <a:rPr lang="es-ES" smtClean="0"/>
-              <a:t>17/10/2021</a:t>
+              <a:t>24/10/2021</a:t>
             </a:fld>
             <a:endParaRPr lang="es-ES"/>
           </a:p>
@@ -1719,7 +1959,7 @@
           <a:p>
             <a:fld id="{02CD1CC9-5596-4E27-B1CC-DEB413C482D2}" type="datetimeFigureOut">
               <a:rPr lang="es-ES" smtClean="0"/>
-              <a:t>17/10/2021</a:t>
+              <a:t>24/10/2021</a:t>
             </a:fld>
             <a:endParaRPr lang="es-ES"/>
           </a:p>
@@ -1984,7 +2224,7 @@
           <a:p>
             <a:fld id="{02CD1CC9-5596-4E27-B1CC-DEB413C482D2}" type="datetimeFigureOut">
               <a:rPr lang="es-ES" smtClean="0"/>
-              <a:t>17/10/2021</a:t>
+              <a:t>24/10/2021</a:t>
             </a:fld>
             <a:endParaRPr lang="es-ES"/>
           </a:p>
@@ -2396,7 +2636,7 @@
           <a:p>
             <a:fld id="{02CD1CC9-5596-4E27-B1CC-DEB413C482D2}" type="datetimeFigureOut">
               <a:rPr lang="es-ES" smtClean="0"/>
-              <a:t>17/10/2021</a:t>
+              <a:t>24/10/2021</a:t>
             </a:fld>
             <a:endParaRPr lang="es-ES"/>
           </a:p>
@@ -2537,7 +2777,7 @@
           <a:p>
             <a:fld id="{02CD1CC9-5596-4E27-B1CC-DEB413C482D2}" type="datetimeFigureOut">
               <a:rPr lang="es-ES" smtClean="0"/>
-              <a:t>17/10/2021</a:t>
+              <a:t>24/10/2021</a:t>
             </a:fld>
             <a:endParaRPr lang="es-ES"/>
           </a:p>
@@ -2650,7 +2890,7 @@
           <a:p>
             <a:fld id="{02CD1CC9-5596-4E27-B1CC-DEB413C482D2}" type="datetimeFigureOut">
               <a:rPr lang="es-ES" smtClean="0"/>
-              <a:t>17/10/2021</a:t>
+              <a:t>24/10/2021</a:t>
             </a:fld>
             <a:endParaRPr lang="es-ES"/>
           </a:p>
@@ -2961,7 +3201,7 @@
           <a:p>
             <a:fld id="{02CD1CC9-5596-4E27-B1CC-DEB413C482D2}" type="datetimeFigureOut">
               <a:rPr lang="es-ES" smtClean="0"/>
-              <a:t>17/10/2021</a:t>
+              <a:t>24/10/2021</a:t>
             </a:fld>
             <a:endParaRPr lang="es-ES"/>
           </a:p>
@@ -3249,7 +3489,7 @@
           <a:p>
             <a:fld id="{02CD1CC9-5596-4E27-B1CC-DEB413C482D2}" type="datetimeFigureOut">
               <a:rPr lang="es-ES" smtClean="0"/>
-              <a:t>17/10/2021</a:t>
+              <a:t>24/10/2021</a:t>
             </a:fld>
             <a:endParaRPr lang="es-ES"/>
           </a:p>
@@ -3490,7 +3730,7 @@
           <a:p>
             <a:fld id="{02CD1CC9-5596-4E27-B1CC-DEB413C482D2}" type="datetimeFigureOut">
               <a:rPr lang="es-ES" smtClean="0"/>
-              <a:t>17/10/2021</a:t>
+              <a:t>24/10/2021</a:t>
             </a:fld>
             <a:endParaRPr lang="es-ES"/>
           </a:p>
@@ -4851,10 +5091,476 @@
       </p:sp>
       <p:sp>
         <p:nvSpPr>
-          <p:cNvPr id="38" name="Flecha: a la derecha 37">
-            <a:extLst>
-              <a:ext uri="{FF2B5EF4-FFF2-40B4-BE49-F238E27FC236}">
-                <a16:creationId xmlns:a16="http://schemas.microsoft.com/office/drawing/2014/main" id="{8B147247-3BF7-4730-B43F-0C8EE53F75C1}"/>
+          <p:cNvPr id="57" name="CuadroTexto 56">
+            <a:extLst>
+              <a:ext uri="{FF2B5EF4-FFF2-40B4-BE49-F238E27FC236}">
+                <a16:creationId xmlns:a16="http://schemas.microsoft.com/office/drawing/2014/main" id="{51DCCDF9-3046-4212-8E50-E5E8272F4C4C}"/>
+              </a:ext>
+            </a:extLst>
+          </p:cNvPr>
+          <p:cNvSpPr txBox="1"/>
+          <p:nvPr/>
+        </p:nvSpPr>
+        <p:spPr>
+          <a:xfrm>
+            <a:off x="3258894" y="2285420"/>
+            <a:ext cx="1109931" cy="461665"/>
+          </a:xfrm>
+          <a:prstGeom prst="rect">
+            <a:avLst/>
+          </a:prstGeom>
+          <a:solidFill>
+            <a:schemeClr val="accent6">
+              <a:lumMod val="20000"/>
+              <a:lumOff val="80000"/>
+            </a:schemeClr>
+          </a:solidFill>
+          <a:ln w="28575">
+            <a:solidFill>
+              <a:schemeClr val="accent6">
+                <a:lumMod val="60000"/>
+                <a:lumOff val="40000"/>
+              </a:schemeClr>
+            </a:solidFill>
+          </a:ln>
+        </p:spPr>
+        <p:txBody>
+          <a:bodyPr wrap="square" rtlCol="0">
+            <a:spAutoFit/>
+          </a:bodyPr>
+          <a:lstStyle/>
+          <a:p>
+            <a:r>
+              <a:rPr lang="es-ES" sz="1200" dirty="0" err="1"/>
+              <a:t>github</a:t>
+            </a:r>
+            <a:r>
+              <a:rPr lang="es-ES" sz="1200" dirty="0"/>
+              <a:t> </a:t>
+            </a:r>
+            <a:r>
+              <a:rPr lang="es-ES" sz="1200" dirty="0" err="1"/>
+              <a:t>secrets</a:t>
+            </a:r>
+            <a:r>
+              <a:rPr lang="es-ES" sz="1200" dirty="0"/>
+              <a:t> #103</a:t>
+            </a:r>
+          </a:p>
+        </p:txBody>
+      </p:sp>
+      <p:sp>
+        <p:nvSpPr>
+          <p:cNvPr id="58" name="CuadroTexto 57">
+            <a:extLst>
+              <a:ext uri="{FF2B5EF4-FFF2-40B4-BE49-F238E27FC236}">
+                <a16:creationId xmlns:a16="http://schemas.microsoft.com/office/drawing/2014/main" id="{E14DE0E9-6875-4F26-9B9C-2A694560EFCE}"/>
+              </a:ext>
+            </a:extLst>
+          </p:cNvPr>
+          <p:cNvSpPr txBox="1"/>
+          <p:nvPr/>
+        </p:nvSpPr>
+        <p:spPr>
+          <a:xfrm>
+            <a:off x="10924902" y="68242"/>
+            <a:ext cx="644340" cy="276999"/>
+          </a:xfrm>
+          <a:prstGeom prst="rect">
+            <a:avLst/>
+          </a:prstGeom>
+          <a:solidFill>
+            <a:schemeClr val="accent6">
+              <a:lumMod val="20000"/>
+              <a:lumOff val="80000"/>
+            </a:schemeClr>
+          </a:solidFill>
+          <a:ln w="28575">
+            <a:solidFill>
+              <a:schemeClr val="accent6">
+                <a:lumMod val="60000"/>
+                <a:lumOff val="40000"/>
+              </a:schemeClr>
+            </a:solidFill>
+          </a:ln>
+        </p:spPr>
+        <p:txBody>
+          <a:bodyPr wrap="square" rtlCol="0">
+            <a:spAutoFit/>
+          </a:bodyPr>
+          <a:lstStyle/>
+          <a:p>
+            <a:pPr algn="ctr"/>
+            <a:r>
+              <a:rPr lang="es-ES" sz="1200" dirty="0"/>
+              <a:t>DONE</a:t>
+            </a:r>
+          </a:p>
+        </p:txBody>
+      </p:sp>
+      <p:sp>
+        <p:nvSpPr>
+          <p:cNvPr id="59" name="CuadroTexto 58">
+            <a:extLst>
+              <a:ext uri="{FF2B5EF4-FFF2-40B4-BE49-F238E27FC236}">
+                <a16:creationId xmlns:a16="http://schemas.microsoft.com/office/drawing/2014/main" id="{CFB0600F-AF7A-46C1-BA36-0EC4575B2C75}"/>
+              </a:ext>
+            </a:extLst>
+          </p:cNvPr>
+          <p:cNvSpPr txBox="1"/>
+          <p:nvPr/>
+        </p:nvSpPr>
+        <p:spPr>
+          <a:xfrm>
+            <a:off x="10857790" y="431467"/>
+            <a:ext cx="856155" cy="276999"/>
+          </a:xfrm>
+          <a:prstGeom prst="rect">
+            <a:avLst/>
+          </a:prstGeom>
+          <a:noFill/>
+          <a:ln w="28575">
+            <a:solidFill>
+              <a:schemeClr val="accent4">
+                <a:lumMod val="60000"/>
+                <a:lumOff val="40000"/>
+              </a:schemeClr>
+            </a:solidFill>
+          </a:ln>
+        </p:spPr>
+        <p:txBody>
+          <a:bodyPr wrap="square" rtlCol="0">
+            <a:spAutoFit/>
+          </a:bodyPr>
+          <a:lstStyle/>
+          <a:p>
+            <a:pPr algn="ctr"/>
+            <a:r>
+              <a:rPr lang="es-ES" sz="1200" dirty="0"/>
+              <a:t>PLANNED</a:t>
+            </a:r>
+          </a:p>
+        </p:txBody>
+      </p:sp>
+      <p:sp>
+        <p:nvSpPr>
+          <p:cNvPr id="40" name="CuadroTexto 39">
+            <a:extLst>
+              <a:ext uri="{FF2B5EF4-FFF2-40B4-BE49-F238E27FC236}">
+                <a16:creationId xmlns:a16="http://schemas.microsoft.com/office/drawing/2014/main" id="{5B8E0F08-24C4-47C4-B963-FBBB6EE1CA84}"/>
+              </a:ext>
+            </a:extLst>
+          </p:cNvPr>
+          <p:cNvSpPr txBox="1"/>
+          <p:nvPr/>
+        </p:nvSpPr>
+        <p:spPr>
+          <a:xfrm>
+            <a:off x="6686532" y="2235891"/>
+            <a:ext cx="1597808" cy="1015663"/>
+          </a:xfrm>
+          <a:prstGeom prst="rect">
+            <a:avLst/>
+          </a:prstGeom>
+          <a:solidFill>
+            <a:schemeClr val="accent6">
+              <a:lumMod val="20000"/>
+              <a:lumOff val="80000"/>
+            </a:schemeClr>
+          </a:solidFill>
+          <a:ln w="28575">
+            <a:solidFill>
+              <a:schemeClr val="accent6">
+                <a:lumMod val="60000"/>
+                <a:lumOff val="40000"/>
+              </a:schemeClr>
+            </a:solidFill>
+          </a:ln>
+        </p:spPr>
+        <p:txBody>
+          <a:bodyPr wrap="square" rtlCol="0">
+            <a:spAutoFit/>
+          </a:bodyPr>
+          <a:lstStyle/>
+          <a:p>
+            <a:r>
+              <a:rPr lang="es-ES" sz="1200" dirty="0"/>
+              <a:t>editor.js </a:t>
+            </a:r>
+            <a:r>
+              <a:rPr lang="es-ES" sz="1200" dirty="0" err="1"/>
+              <a:t>refactor</a:t>
+            </a:r>
+            <a:r>
+              <a:rPr lang="es-ES" sz="1200" dirty="0"/>
+              <a:t> #106</a:t>
+            </a:r>
+          </a:p>
+          <a:p>
+            <a:r>
+              <a:rPr lang="es-ES" sz="1200" dirty="0" err="1"/>
+              <a:t>Refactor</a:t>
+            </a:r>
+            <a:r>
+              <a:rPr lang="es-ES" sz="1200" dirty="0"/>
+              <a:t> links #75</a:t>
+            </a:r>
+          </a:p>
+          <a:p>
+            <a:r>
+              <a:rPr lang="es-ES" sz="1200" dirty="0" err="1"/>
+              <a:t>Fix</a:t>
+            </a:r>
+            <a:r>
+              <a:rPr lang="es-ES" sz="1200" dirty="0"/>
+              <a:t> </a:t>
+            </a:r>
+            <a:r>
+              <a:rPr lang="es-ES" sz="1200" dirty="0" err="1"/>
+              <a:t>distance</a:t>
+            </a:r>
+            <a:r>
+              <a:rPr lang="es-ES" sz="1200" dirty="0"/>
+              <a:t> after </a:t>
+            </a:r>
+            <a:r>
+              <a:rPr lang="es-ES" sz="1200" dirty="0" err="1"/>
+              <a:t>segment</a:t>
+            </a:r>
+            <a:r>
+              <a:rPr lang="es-ES" sz="1200" dirty="0"/>
+              <a:t> </a:t>
+            </a:r>
+            <a:r>
+              <a:rPr lang="es-ES" sz="1200" dirty="0" err="1"/>
+              <a:t>removal</a:t>
+            </a:r>
+            <a:r>
+              <a:rPr lang="es-ES" sz="1200" dirty="0"/>
+              <a:t> #76</a:t>
+            </a:r>
+          </a:p>
+          <a:p>
+            <a:endParaRPr lang="es-ES" sz="1200" dirty="0"/>
+          </a:p>
+        </p:txBody>
+      </p:sp>
+      <p:sp>
+        <p:nvSpPr>
+          <p:cNvPr id="45" name="CuadroTexto 44">
+            <a:extLst>
+              <a:ext uri="{FF2B5EF4-FFF2-40B4-BE49-F238E27FC236}">
+                <a16:creationId xmlns:a16="http://schemas.microsoft.com/office/drawing/2014/main" id="{AE2EDDC6-CEBF-4738-A65C-93AC2F522E5F}"/>
+              </a:ext>
+            </a:extLst>
+          </p:cNvPr>
+          <p:cNvSpPr txBox="1"/>
+          <p:nvPr/>
+        </p:nvSpPr>
+        <p:spPr>
+          <a:xfrm>
+            <a:off x="1500065" y="3786340"/>
+            <a:ext cx="835864" cy="369332"/>
+          </a:xfrm>
+          <a:prstGeom prst="rect">
+            <a:avLst/>
+          </a:prstGeom>
+          <a:noFill/>
+          <a:ln w="38100">
+            <a:solidFill>
+              <a:schemeClr val="accent4">
+                <a:lumMod val="75000"/>
+              </a:schemeClr>
+            </a:solidFill>
+          </a:ln>
+        </p:spPr>
+        <p:txBody>
+          <a:bodyPr wrap="square" rtlCol="0">
+            <a:spAutoFit/>
+          </a:bodyPr>
+          <a:lstStyle/>
+          <a:p>
+            <a:r>
+              <a:rPr lang="es-ES" dirty="0"/>
+              <a:t>V0.2.0</a:t>
+            </a:r>
+          </a:p>
+        </p:txBody>
+      </p:sp>
+      <p:sp>
+        <p:nvSpPr>
+          <p:cNvPr id="34" name="CuadroTexto 33">
+            <a:extLst>
+              <a:ext uri="{FF2B5EF4-FFF2-40B4-BE49-F238E27FC236}">
+                <a16:creationId xmlns:a16="http://schemas.microsoft.com/office/drawing/2014/main" id="{352537BD-5640-47B3-8754-A36354E4772D}"/>
+              </a:ext>
+            </a:extLst>
+          </p:cNvPr>
+          <p:cNvSpPr txBox="1"/>
+          <p:nvPr/>
+        </p:nvSpPr>
+        <p:spPr>
+          <a:xfrm>
+            <a:off x="8706118" y="1146107"/>
+            <a:ext cx="1344418" cy="276999"/>
+          </a:xfrm>
+          <a:prstGeom prst="rect">
+            <a:avLst/>
+          </a:prstGeom>
+          <a:solidFill>
+            <a:schemeClr val="accent6">
+              <a:lumMod val="20000"/>
+              <a:lumOff val="80000"/>
+            </a:schemeClr>
+          </a:solidFill>
+          <a:ln w="28575">
+            <a:solidFill>
+              <a:schemeClr val="accent6">
+                <a:lumMod val="60000"/>
+                <a:lumOff val="40000"/>
+              </a:schemeClr>
+            </a:solidFill>
+          </a:ln>
+        </p:spPr>
+        <p:txBody>
+          <a:bodyPr wrap="square" rtlCol="0">
+            <a:spAutoFit/>
+          </a:bodyPr>
+          <a:lstStyle/>
+          <a:p>
+            <a:pPr algn="ctr"/>
+            <a:r>
+              <a:rPr lang="es-ES" sz="1200" dirty="0" err="1"/>
+              <a:t>split</a:t>
+            </a:r>
+            <a:r>
+              <a:rPr lang="es-ES" sz="1200" dirty="0"/>
+              <a:t> </a:t>
+            </a:r>
+            <a:r>
+              <a:rPr lang="es-ES" sz="1200" dirty="0" err="1"/>
+              <a:t>segment</a:t>
+            </a:r>
+            <a:r>
+              <a:rPr lang="es-ES" sz="1200" dirty="0"/>
+              <a:t> #73</a:t>
+            </a:r>
+          </a:p>
+        </p:txBody>
+      </p:sp>
+      <p:sp>
+        <p:nvSpPr>
+          <p:cNvPr id="35" name="CuadroTexto 34">
+            <a:extLst>
+              <a:ext uri="{FF2B5EF4-FFF2-40B4-BE49-F238E27FC236}">
+                <a16:creationId xmlns:a16="http://schemas.microsoft.com/office/drawing/2014/main" id="{95F394F3-233E-43BB-8516-9BBF3CDA3CFA}"/>
+              </a:ext>
+            </a:extLst>
+          </p:cNvPr>
+          <p:cNvSpPr txBox="1"/>
+          <p:nvPr/>
+        </p:nvSpPr>
+        <p:spPr>
+          <a:xfrm>
+            <a:off x="1386860" y="5039676"/>
+            <a:ext cx="1062273" cy="461665"/>
+          </a:xfrm>
+          <a:prstGeom prst="rect">
+            <a:avLst/>
+          </a:prstGeom>
+          <a:solidFill>
+            <a:schemeClr val="accent6">
+              <a:lumMod val="20000"/>
+              <a:lumOff val="80000"/>
+            </a:schemeClr>
+          </a:solidFill>
+          <a:ln w="28575">
+            <a:solidFill>
+              <a:schemeClr val="accent6">
+                <a:lumMod val="60000"/>
+                <a:lumOff val="40000"/>
+              </a:schemeClr>
+            </a:solidFill>
+          </a:ln>
+        </p:spPr>
+        <p:txBody>
+          <a:bodyPr wrap="square" rtlCol="0">
+            <a:spAutoFit/>
+          </a:bodyPr>
+          <a:lstStyle/>
+          <a:p>
+            <a:r>
+              <a:rPr lang="es-ES" sz="1200" dirty="0" err="1"/>
+              <a:t>First</a:t>
+            </a:r>
+            <a:r>
+              <a:rPr lang="es-ES" sz="1200" dirty="0"/>
+              <a:t> </a:t>
+            </a:r>
+            <a:r>
+              <a:rPr lang="es-ES" sz="1200" dirty="0" err="1"/>
+              <a:t>deployed</a:t>
+            </a:r>
+            <a:r>
+              <a:rPr lang="es-ES" sz="1200" dirty="0"/>
+              <a:t> </a:t>
+            </a:r>
+            <a:r>
+              <a:rPr lang="es-ES" sz="1200" dirty="0" err="1"/>
+              <a:t>version</a:t>
+            </a:r>
+            <a:endParaRPr lang="es-ES" sz="1200" dirty="0"/>
+          </a:p>
+        </p:txBody>
+      </p:sp>
+      <p:sp>
+        <p:nvSpPr>
+          <p:cNvPr id="36" name="CuadroTexto 35">
+            <a:extLst>
+              <a:ext uri="{FF2B5EF4-FFF2-40B4-BE49-F238E27FC236}">
+                <a16:creationId xmlns:a16="http://schemas.microsoft.com/office/drawing/2014/main" id="{F5684C7F-BEE8-4AF1-8BEA-2ECFE4DC2F5C}"/>
+              </a:ext>
+            </a:extLst>
+          </p:cNvPr>
+          <p:cNvSpPr txBox="1"/>
+          <p:nvPr/>
+        </p:nvSpPr>
+        <p:spPr>
+          <a:xfrm>
+            <a:off x="3093353" y="5233933"/>
+            <a:ext cx="835864" cy="369332"/>
+          </a:xfrm>
+          <a:prstGeom prst="rect">
+            <a:avLst/>
+          </a:prstGeom>
+          <a:noFill/>
+          <a:ln w="38100">
+            <a:solidFill>
+              <a:schemeClr val="accent4">
+                <a:lumMod val="75000"/>
+              </a:schemeClr>
+            </a:solidFill>
+          </a:ln>
+        </p:spPr>
+        <p:txBody>
+          <a:bodyPr wrap="square" rtlCol="0">
+            <a:spAutoFit/>
+          </a:bodyPr>
+          <a:lstStyle/>
+          <a:p>
+            <a:r>
+              <a:rPr lang="es-ES" dirty="0"/>
+              <a:t>V0.2.1</a:t>
+            </a:r>
+          </a:p>
+        </p:txBody>
+      </p:sp>
+      <p:sp>
+        <p:nvSpPr>
+          <p:cNvPr id="49" name="Flecha: a la derecha 48">
+            <a:extLst>
+              <a:ext uri="{FF2B5EF4-FFF2-40B4-BE49-F238E27FC236}">
+                <a16:creationId xmlns:a16="http://schemas.microsoft.com/office/drawing/2014/main" id="{5794D025-8B25-4546-9E11-FFF58E1C20B4}"/>
               </a:ext>
             </a:extLst>
           </p:cNvPr>
@@ -4863,7 +5569,175 @@
         </p:nvSpPr>
         <p:spPr>
           <a:xfrm>
-            <a:off x="2491212" y="4216658"/>
+            <a:off x="7179782" y="4231876"/>
+            <a:ext cx="3124796" cy="788432"/>
+          </a:xfrm>
+          <a:prstGeom prst="rightArrow">
+            <a:avLst/>
+          </a:prstGeom>
+          <a:solidFill>
+            <a:srgbClr val="00B0F0"/>
+          </a:solidFill>
+          <a:ln>
+            <a:solidFill>
+              <a:schemeClr val="accent1">
+                <a:lumMod val="75000"/>
+              </a:schemeClr>
+            </a:solidFill>
+          </a:ln>
+        </p:spPr>
+        <p:style>
+          <a:lnRef idx="2">
+            <a:schemeClr val="accent1">
+              <a:shade val="50000"/>
+            </a:schemeClr>
+          </a:lnRef>
+          <a:fillRef idx="1">
+            <a:schemeClr val="accent1"/>
+          </a:fillRef>
+          <a:effectRef idx="0">
+            <a:schemeClr val="accent1"/>
+          </a:effectRef>
+          <a:fontRef idx="minor">
+            <a:schemeClr val="lt1"/>
+          </a:fontRef>
+        </p:style>
+        <p:txBody>
+          <a:bodyPr rtlCol="0" anchor="ctr"/>
+          <a:lstStyle/>
+          <a:p>
+            <a:pPr algn="ctr"/>
+            <a:endParaRPr lang="es-ES"/>
+          </a:p>
+        </p:txBody>
+      </p:sp>
+      <p:sp>
+        <p:nvSpPr>
+          <p:cNvPr id="50" name="Flecha: a la derecha 49">
+            <a:extLst>
+              <a:ext uri="{FF2B5EF4-FFF2-40B4-BE49-F238E27FC236}">
+                <a16:creationId xmlns:a16="http://schemas.microsoft.com/office/drawing/2014/main" id="{4209C9A4-737E-499B-B0DB-34783B30BEF5}"/>
+              </a:ext>
+            </a:extLst>
+          </p:cNvPr>
+          <p:cNvSpPr/>
+          <p:nvPr/>
+        </p:nvSpPr>
+        <p:spPr>
+          <a:xfrm>
+            <a:off x="5245299" y="4229962"/>
+            <a:ext cx="3124796" cy="788432"/>
+          </a:xfrm>
+          <a:prstGeom prst="rightArrow">
+            <a:avLst/>
+          </a:prstGeom>
+          <a:solidFill>
+            <a:srgbClr val="00B0F0"/>
+          </a:solidFill>
+          <a:ln>
+            <a:solidFill>
+              <a:schemeClr val="accent1">
+                <a:lumMod val="75000"/>
+              </a:schemeClr>
+            </a:solidFill>
+          </a:ln>
+        </p:spPr>
+        <p:style>
+          <a:lnRef idx="2">
+            <a:schemeClr val="accent1">
+              <a:shade val="50000"/>
+            </a:schemeClr>
+          </a:lnRef>
+          <a:fillRef idx="1">
+            <a:schemeClr val="accent1"/>
+          </a:fillRef>
+          <a:effectRef idx="0">
+            <a:schemeClr val="accent1"/>
+          </a:effectRef>
+          <a:fontRef idx="minor">
+            <a:schemeClr val="lt1"/>
+          </a:fontRef>
+        </p:style>
+        <p:txBody>
+          <a:bodyPr rtlCol="0" anchor="ctr"/>
+          <a:lstStyle/>
+          <a:p>
+            <a:pPr algn="ctr"/>
+            <a:endParaRPr lang="es-ES"/>
+          </a:p>
+        </p:txBody>
+      </p:sp>
+      <p:sp>
+        <p:nvSpPr>
+          <p:cNvPr id="51" name="Flecha: a la derecha 50">
+            <a:extLst>
+              <a:ext uri="{FF2B5EF4-FFF2-40B4-BE49-F238E27FC236}">
+                <a16:creationId xmlns:a16="http://schemas.microsoft.com/office/drawing/2014/main" id="{2D8DD951-650A-4CC5-9E2A-C925D0D3D8D4}"/>
+              </a:ext>
+            </a:extLst>
+          </p:cNvPr>
+          <p:cNvSpPr/>
+          <p:nvPr/>
+        </p:nvSpPr>
+        <p:spPr>
+          <a:xfrm>
+            <a:off x="3511285" y="4232433"/>
+            <a:ext cx="3124796" cy="788432"/>
+          </a:xfrm>
+          <a:prstGeom prst="rightArrow">
+            <a:avLst/>
+          </a:prstGeom>
+          <a:solidFill>
+            <a:srgbClr val="00B0F0"/>
+          </a:solidFill>
+          <a:ln>
+            <a:solidFill>
+              <a:schemeClr val="accent1">
+                <a:lumMod val="75000"/>
+              </a:schemeClr>
+            </a:solidFill>
+          </a:ln>
+        </p:spPr>
+        <p:style>
+          <a:lnRef idx="2">
+            <a:schemeClr val="accent1">
+              <a:shade val="50000"/>
+            </a:schemeClr>
+          </a:lnRef>
+          <a:fillRef idx="1">
+            <a:schemeClr val="accent1"/>
+          </a:fillRef>
+          <a:effectRef idx="0">
+            <a:schemeClr val="accent1"/>
+          </a:effectRef>
+          <a:fontRef idx="minor">
+            <a:schemeClr val="lt1"/>
+          </a:fontRef>
+        </p:style>
+        <p:txBody>
+          <a:bodyPr rtlCol="0" anchor="ctr"/>
+          <a:lstStyle/>
+          <a:p>
+            <a:pPr algn="ctr"/>
+            <a:endParaRPr lang="es-ES"/>
+          </a:p>
+        </p:txBody>
+      </p:sp>
+      <p:sp>
+        <p:nvSpPr>
+          <p:cNvPr id="52" name="Flecha: a la derecha 51">
+            <a:extLst>
+              <a:ext uri="{FF2B5EF4-FFF2-40B4-BE49-F238E27FC236}">
+                <a16:creationId xmlns:a16="http://schemas.microsoft.com/office/drawing/2014/main" id="{B91CE77F-FF42-4775-8EEF-ACE2453FC4EA}"/>
+              </a:ext>
+            </a:extLst>
+          </p:cNvPr>
+          <p:cNvSpPr/>
+          <p:nvPr/>
+        </p:nvSpPr>
+        <p:spPr>
+          <a:xfrm>
+            <a:off x="2194193" y="4232433"/>
             <a:ext cx="2382646" cy="788432"/>
           </a:xfrm>
           <a:prstGeom prst="rightArrow">
@@ -4907,10 +5781,10 @@
       </p:sp>
       <p:sp>
         <p:nvSpPr>
-          <p:cNvPr id="39" name="Flecha: a la derecha 38">
-            <a:extLst>
-              <a:ext uri="{FF2B5EF4-FFF2-40B4-BE49-F238E27FC236}">
-                <a16:creationId xmlns:a16="http://schemas.microsoft.com/office/drawing/2014/main" id="{6CFE131A-964B-4143-A5B1-72A19AC46C0E}"/>
+          <p:cNvPr id="53" name="Flecha: a la derecha 52">
+            <a:extLst>
+              <a:ext uri="{FF2B5EF4-FFF2-40B4-BE49-F238E27FC236}">
+                <a16:creationId xmlns:a16="http://schemas.microsoft.com/office/drawing/2014/main" id="{991F18BF-A8E9-4D8C-AD7B-EEA70660C8E4}"/>
               </a:ext>
             </a:extLst>
           </p:cNvPr>
@@ -4919,7 +5793,7 @@
         </p:nvSpPr>
         <p:spPr>
           <a:xfrm>
-            <a:off x="881957" y="4218972"/>
+            <a:off x="584938" y="4240006"/>
             <a:ext cx="2382646" cy="788432"/>
           </a:xfrm>
           <a:prstGeom prst="rightArrow">
@@ -4963,10 +5837,10 @@
       </p:sp>
       <p:cxnSp>
         <p:nvCxnSpPr>
-          <p:cNvPr id="43" name="Conector recto 42">
-            <a:extLst>
-              <a:ext uri="{FF2B5EF4-FFF2-40B4-BE49-F238E27FC236}">
-                <a16:creationId xmlns:a16="http://schemas.microsoft.com/office/drawing/2014/main" id="{F6599189-C264-4D42-8BD6-ED20B3104F95}"/>
+          <p:cNvPr id="55" name="Conector recto 54">
+            <a:extLst>
+              <a:ext uri="{FF2B5EF4-FFF2-40B4-BE49-F238E27FC236}">
+                <a16:creationId xmlns:a16="http://schemas.microsoft.com/office/drawing/2014/main" id="{B93BBA85-CA43-442C-A10B-5306134AB9BF}"/>
               </a:ext>
             </a:extLst>
           </p:cNvPr>
@@ -4977,7 +5851,7 @@
         </p:nvCxnSpPr>
         <p:spPr>
           <a:xfrm>
-            <a:off x="1844995" y="4404154"/>
+            <a:off x="1975815" y="4419929"/>
             <a:ext cx="0" cy="412750"/>
           </a:xfrm>
           <a:prstGeom prst="line">
@@ -5008,10 +5882,10 @@
       </p:cxnSp>
       <p:cxnSp>
         <p:nvCxnSpPr>
-          <p:cNvPr id="47" name="Conector recto 46">
-            <a:extLst>
-              <a:ext uri="{FF2B5EF4-FFF2-40B4-BE49-F238E27FC236}">
-                <a16:creationId xmlns:a16="http://schemas.microsoft.com/office/drawing/2014/main" id="{D476AB6E-1C83-40A6-BE9B-2C9B3821514D}"/>
+          <p:cNvPr id="56" name="Conector recto 55">
+            <a:extLst>
+              <a:ext uri="{FF2B5EF4-FFF2-40B4-BE49-F238E27FC236}">
+                <a16:creationId xmlns:a16="http://schemas.microsoft.com/office/drawing/2014/main" id="{B92A11CA-4203-4ABC-A647-1BBE25E916FB}"/>
               </a:ext>
             </a:extLst>
           </p:cNvPr>
@@ -5022,7 +5896,7 @@
         </p:nvCxnSpPr>
         <p:spPr>
           <a:xfrm>
-            <a:off x="3801799" y="4404154"/>
+            <a:off x="3504780" y="4419929"/>
             <a:ext cx="0" cy="412750"/>
           </a:xfrm>
           <a:prstGeom prst="line">
@@ -5051,121 +5925,147 @@
           </a:fontRef>
         </p:style>
       </p:cxnSp>
-      <p:sp>
-        <p:nvSpPr>
-          <p:cNvPr id="57" name="CuadroTexto 56">
-            <a:extLst>
-              <a:ext uri="{FF2B5EF4-FFF2-40B4-BE49-F238E27FC236}">
-                <a16:creationId xmlns:a16="http://schemas.microsoft.com/office/drawing/2014/main" id="{51DCCDF9-3046-4212-8E50-E5E8272F4C4C}"/>
-              </a:ext>
-            </a:extLst>
-          </p:cNvPr>
-          <p:cNvSpPr txBox="1"/>
+      <p:cxnSp>
+        <p:nvCxnSpPr>
+          <p:cNvPr id="60" name="Conector recto 59">
+            <a:extLst>
+              <a:ext uri="{FF2B5EF4-FFF2-40B4-BE49-F238E27FC236}">
+                <a16:creationId xmlns:a16="http://schemas.microsoft.com/office/drawing/2014/main" id="{D37DB76B-1675-4B99-BBA2-81C78B1BBA43}"/>
+              </a:ext>
+            </a:extLst>
+          </p:cNvPr>
+          <p:cNvCxnSpPr>
+            <a:cxnSpLocks/>
+          </p:cNvCxnSpPr>
           <p:nvPr/>
-        </p:nvSpPr>
+        </p:nvCxnSpPr>
         <p:spPr>
           <a:xfrm>
-            <a:off x="3258894" y="2285420"/>
-            <a:ext cx="1109931" cy="461665"/>
+            <a:off x="5207685" y="4419929"/>
+            <a:ext cx="0" cy="412750"/>
           </a:xfrm>
-          <a:prstGeom prst="rect">
+          <a:prstGeom prst="line">
             <a:avLst/>
           </a:prstGeom>
-          <a:solidFill>
-            <a:schemeClr val="accent6">
-              <a:lumMod val="20000"/>
-              <a:lumOff val="80000"/>
-            </a:schemeClr>
-          </a:solidFill>
-          <a:ln w="28575">
+          <a:ln w="38100">
             <a:solidFill>
-              <a:schemeClr val="accent6">
-                <a:lumMod val="60000"/>
-                <a:lumOff val="40000"/>
+              <a:schemeClr val="accent4">
+                <a:lumMod val="75000"/>
               </a:schemeClr>
             </a:solidFill>
           </a:ln>
         </p:spPr>
-        <p:txBody>
-          <a:bodyPr wrap="square" rtlCol="0">
-            <a:spAutoFit/>
-          </a:bodyPr>
-          <a:lstStyle/>
-          <a:p>
-            <a:r>
-              <a:rPr lang="es-ES" sz="1200" dirty="0" err="1"/>
-              <a:t>github</a:t>
-            </a:r>
-            <a:r>
-              <a:rPr lang="es-ES" sz="1200" dirty="0"/>
-              <a:t> </a:t>
-            </a:r>
-            <a:r>
-              <a:rPr lang="es-ES" sz="1200" dirty="0" err="1"/>
-              <a:t>secrets</a:t>
-            </a:r>
-            <a:r>
-              <a:rPr lang="es-ES" sz="1200" dirty="0"/>
-              <a:t> #103</a:t>
-            </a:r>
-          </a:p>
-        </p:txBody>
-      </p:sp>
-      <p:sp>
-        <p:nvSpPr>
-          <p:cNvPr id="58" name="CuadroTexto 57">
-            <a:extLst>
-              <a:ext uri="{FF2B5EF4-FFF2-40B4-BE49-F238E27FC236}">
-                <a16:creationId xmlns:a16="http://schemas.microsoft.com/office/drawing/2014/main" id="{E14DE0E9-6875-4F26-9B9C-2A694560EFCE}"/>
-              </a:ext>
-            </a:extLst>
-          </p:cNvPr>
-          <p:cNvSpPr txBox="1"/>
+        <p:style>
+          <a:lnRef idx="1">
+            <a:schemeClr val="accent1"/>
+          </a:lnRef>
+          <a:fillRef idx="0">
+            <a:schemeClr val="accent1"/>
+          </a:fillRef>
+          <a:effectRef idx="0">
+            <a:schemeClr val="accent1"/>
+          </a:effectRef>
+          <a:fontRef idx="minor">
+            <a:schemeClr val="tx1"/>
+          </a:fontRef>
+        </p:style>
+      </p:cxnSp>
+      <p:cxnSp>
+        <p:nvCxnSpPr>
+          <p:cNvPr id="61" name="Conector recto 60">
+            <a:extLst>
+              <a:ext uri="{FF2B5EF4-FFF2-40B4-BE49-F238E27FC236}">
+                <a16:creationId xmlns:a16="http://schemas.microsoft.com/office/drawing/2014/main" id="{54E25F8D-4470-4F17-BC34-2DB36F256DC7}"/>
+              </a:ext>
+            </a:extLst>
+          </p:cNvPr>
+          <p:cNvCxnSpPr>
+            <a:cxnSpLocks/>
+          </p:cNvCxnSpPr>
           <p:nvPr/>
-        </p:nvSpPr>
+        </p:nvCxnSpPr>
         <p:spPr>
           <a:xfrm>
-            <a:off x="10924902" y="68242"/>
-            <a:ext cx="644340" cy="276999"/>
+            <a:off x="7125275" y="4419929"/>
+            <a:ext cx="0" cy="412750"/>
           </a:xfrm>
-          <a:prstGeom prst="rect">
+          <a:prstGeom prst="line">
             <a:avLst/>
           </a:prstGeom>
-          <a:solidFill>
-            <a:schemeClr val="accent6">
-              <a:lumMod val="20000"/>
-              <a:lumOff val="80000"/>
-            </a:schemeClr>
-          </a:solidFill>
-          <a:ln w="28575">
+          <a:ln w="38100">
             <a:solidFill>
-              <a:schemeClr val="accent6">
-                <a:lumMod val="60000"/>
-                <a:lumOff val="40000"/>
+              <a:schemeClr val="accent4">
+                <a:lumMod val="75000"/>
               </a:schemeClr>
             </a:solidFill>
           </a:ln>
         </p:spPr>
-        <p:txBody>
-          <a:bodyPr wrap="square" rtlCol="0">
-            <a:spAutoFit/>
-          </a:bodyPr>
-          <a:lstStyle/>
-          <a:p>
-            <a:pPr algn="ctr"/>
-            <a:r>
-              <a:rPr lang="es-ES" sz="1200" dirty="0"/>
-              <a:t>DONE</a:t>
-            </a:r>
-          </a:p>
-        </p:txBody>
-      </p:sp>
-      <p:sp>
-        <p:nvSpPr>
-          <p:cNvPr id="59" name="CuadroTexto 58">
-            <a:extLst>
-              <a:ext uri="{FF2B5EF4-FFF2-40B4-BE49-F238E27FC236}">
-                <a16:creationId xmlns:a16="http://schemas.microsoft.com/office/drawing/2014/main" id="{CFB0600F-AF7A-46C1-BA36-0EC4575B2C75}"/>
+        <p:style>
+          <a:lnRef idx="1">
+            <a:schemeClr val="accent1"/>
+          </a:lnRef>
+          <a:fillRef idx="0">
+            <a:schemeClr val="accent1"/>
+          </a:fillRef>
+          <a:effectRef idx="0">
+            <a:schemeClr val="accent1"/>
+          </a:effectRef>
+          <a:fontRef idx="minor">
+            <a:schemeClr val="tx1"/>
+          </a:fontRef>
+        </p:style>
+      </p:cxnSp>
+      <p:cxnSp>
+        <p:nvCxnSpPr>
+          <p:cNvPr id="62" name="Conector recto 61">
+            <a:extLst>
+              <a:ext uri="{FF2B5EF4-FFF2-40B4-BE49-F238E27FC236}">
+                <a16:creationId xmlns:a16="http://schemas.microsoft.com/office/drawing/2014/main" id="{4A140185-A0C3-4BE3-94B9-F3DE2D95DACA}"/>
+              </a:ext>
+            </a:extLst>
+          </p:cNvPr>
+          <p:cNvCxnSpPr>
+            <a:cxnSpLocks/>
+          </p:cNvCxnSpPr>
+          <p:nvPr/>
+        </p:nvCxnSpPr>
+        <p:spPr>
+          <a:xfrm>
+            <a:off x="9081308" y="4419929"/>
+            <a:ext cx="0" cy="412750"/>
+          </a:xfrm>
+          <a:prstGeom prst="line">
+            <a:avLst/>
+          </a:prstGeom>
+          <a:ln w="38100">
+            <a:solidFill>
+              <a:schemeClr val="accent4">
+                <a:lumMod val="75000"/>
+              </a:schemeClr>
+            </a:solidFill>
+          </a:ln>
+        </p:spPr>
+        <p:style>
+          <a:lnRef idx="1">
+            <a:schemeClr val="accent1"/>
+          </a:lnRef>
+          <a:fillRef idx="0">
+            <a:schemeClr val="accent1"/>
+          </a:fillRef>
+          <a:effectRef idx="0">
+            <a:schemeClr val="accent1"/>
+          </a:effectRef>
+          <a:fontRef idx="minor">
+            <a:schemeClr val="tx1"/>
+          </a:fontRef>
+        </p:style>
+      </p:cxnSp>
+      <p:sp>
+        <p:nvSpPr>
+          <p:cNvPr id="64" name="CuadroTexto 63">
+            <a:extLst>
+              <a:ext uri="{FF2B5EF4-FFF2-40B4-BE49-F238E27FC236}">
+                <a16:creationId xmlns:a16="http://schemas.microsoft.com/office/drawing/2014/main" id="{424FC165-0856-4482-883E-7D8D1C3555E0}"/>
               </a:ext>
             </a:extLst>
           </p:cNvPr>
@@ -5174,8 +6074,8 @@
         </p:nvSpPr>
         <p:spPr>
           <a:xfrm>
-            <a:off x="10857790" y="431467"/>
-            <a:ext cx="856155" cy="276999"/>
+            <a:off x="2603202" y="3612652"/>
+            <a:ext cx="1816166" cy="461665"/>
           </a:xfrm>
           <a:prstGeom prst="rect">
             <a:avLst/>
@@ -5196,20 +6096,45 @@
           </a:bodyPr>
           <a:lstStyle/>
           <a:p>
-            <a:pPr algn="ctr"/>
+            <a:r>
+              <a:rPr lang="es-ES" sz="1200" dirty="0" err="1"/>
+              <a:t>Unify</a:t>
+            </a:r>
             <a:r>
               <a:rPr lang="es-ES" sz="1200" dirty="0"/>
-              <a:t>PLANNED</a:t>
-            </a:r>
-          </a:p>
-        </p:txBody>
-      </p:sp>
-      <p:sp>
-        <p:nvSpPr>
-          <p:cNvPr id="40" name="CuadroTexto 39">
-            <a:extLst>
-              <a:ext uri="{FF2B5EF4-FFF2-40B4-BE49-F238E27FC236}">
-                <a16:creationId xmlns:a16="http://schemas.microsoft.com/office/drawing/2014/main" id="{5B8E0F08-24C4-47C4-B963-FBBB6EE1CA84}"/>
+              <a:t> </a:t>
+            </a:r>
+            <a:r>
+              <a:rPr lang="es-ES" sz="1200" dirty="0" err="1"/>
+              <a:t>map</a:t>
+            </a:r>
+            <a:r>
+              <a:rPr lang="es-ES" sz="1200" dirty="0"/>
+              <a:t> </a:t>
+            </a:r>
+            <a:r>
+              <a:rPr lang="es-ES" sz="1200" dirty="0" err="1"/>
+              <a:t>related</a:t>
+            </a:r>
+            <a:r>
+              <a:rPr lang="es-ES" sz="1200" dirty="0"/>
+              <a:t> JS #120</a:t>
+            </a:r>
+          </a:p>
+          <a:p>
+            <a:r>
+              <a:rPr lang="es-ES" sz="1200" dirty="0"/>
+              <a:t>Bug #100</a:t>
+            </a:r>
+          </a:p>
+        </p:txBody>
+      </p:sp>
+      <p:sp>
+        <p:nvSpPr>
+          <p:cNvPr id="65" name="CuadroTexto 64">
+            <a:extLst>
+              <a:ext uri="{FF2B5EF4-FFF2-40B4-BE49-F238E27FC236}">
+                <a16:creationId xmlns:a16="http://schemas.microsoft.com/office/drawing/2014/main" id="{494AE5CF-81CF-4503-87E8-B477F8796B90}"/>
               </a:ext>
             </a:extLst>
           </p:cNvPr>
@@ -5218,21 +6143,16 @@
         </p:nvSpPr>
         <p:spPr>
           <a:xfrm>
-            <a:off x="6686532" y="2235891"/>
-            <a:ext cx="1597808" cy="1015663"/>
+            <a:off x="4419368" y="5264659"/>
+            <a:ext cx="1816166" cy="646331"/>
           </a:xfrm>
           <a:prstGeom prst="rect">
             <a:avLst/>
           </a:prstGeom>
-          <a:solidFill>
-            <a:schemeClr val="accent6">
-              <a:lumMod val="20000"/>
-              <a:lumOff val="80000"/>
-            </a:schemeClr>
-          </a:solidFill>
+          <a:noFill/>
           <a:ln w="28575">
             <a:solidFill>
-              <a:schemeClr val="accent6">
+              <a:schemeClr val="accent4">
                 <a:lumMod val="60000"/>
                 <a:lumOff val="40000"/>
               </a:schemeClr>
@@ -5246,73 +6166,39 @@
           <a:lstStyle/>
           <a:p>
             <a:r>
+              <a:rPr lang="es-ES" sz="1200" dirty="0" err="1"/>
+              <a:t>Major</a:t>
+            </a:r>
+            <a:r>
               <a:rPr lang="es-ES" sz="1200" dirty="0"/>
-              <a:t>editor.js </a:t>
+              <a:t> bugs </a:t>
             </a:r>
             <a:r>
               <a:rPr lang="es-ES" sz="1200" dirty="0" err="1"/>
-              <a:t>refactor</a:t>
-            </a:r>
+              <a:t>correction</a:t>
+            </a:r>
+            <a:endParaRPr lang="es-ES" sz="1200" dirty="0"/>
+          </a:p>
+          <a:p>
             <a:r>
               <a:rPr lang="es-ES" sz="1200" dirty="0"/>
-              <a:t> #106</a:t>
-            </a:r>
-          </a:p>
-          <a:p>
-            <a:r>
-              <a:rPr lang="es-ES" sz="1200" dirty="0" err="1"/>
-              <a:t>Refactor</a:t>
-            </a:r>
+              <a:t>#121</a:t>
+            </a:r>
+          </a:p>
+          <a:p>
             <a:r>
               <a:rPr lang="es-ES" sz="1200" dirty="0"/>
-              <a:t> links #75</a:t>
-            </a:r>
-          </a:p>
-          <a:p>
-            <a:r>
-              <a:rPr lang="es-ES" sz="1200" dirty="0" err="1"/>
-              <a:t>Fix</a:t>
-            </a:r>
-            <a:r>
-              <a:rPr lang="es-ES" sz="1200" dirty="0"/>
-              <a:t> </a:t>
-            </a:r>
-            <a:r>
-              <a:rPr lang="es-ES" sz="1200" dirty="0" err="1"/>
-              <a:t>distance</a:t>
-            </a:r>
-            <a:r>
-              <a:rPr lang="es-ES" sz="1200" dirty="0"/>
-              <a:t> after </a:t>
-            </a:r>
-            <a:r>
-              <a:rPr lang="es-ES" sz="1200" dirty="0" err="1"/>
-              <a:t>segment</a:t>
-            </a:r>
-            <a:r>
-              <a:rPr lang="es-ES" sz="1200" dirty="0"/>
-              <a:t> </a:t>
-            </a:r>
-            <a:r>
-              <a:rPr lang="es-ES" sz="1200" dirty="0" err="1"/>
-              <a:t>removal</a:t>
-            </a:r>
-            <a:r>
-              <a:rPr lang="es-ES" sz="1200" dirty="0"/>
-              <a:t> #76</a:t>
-            </a:r>
-          </a:p>
-          <a:p>
-            <a:endParaRPr lang="es-ES" sz="1200" dirty="0"/>
-          </a:p>
-        </p:txBody>
-      </p:sp>
-      <p:sp>
-        <p:nvSpPr>
-          <p:cNvPr id="45" name="CuadroTexto 44">
-            <a:extLst>
-              <a:ext uri="{FF2B5EF4-FFF2-40B4-BE49-F238E27FC236}">
-                <a16:creationId xmlns:a16="http://schemas.microsoft.com/office/drawing/2014/main" id="{AE2EDDC6-CEBF-4738-A65C-93AC2F522E5F}"/>
+              <a:t>#125</a:t>
+            </a:r>
+          </a:p>
+        </p:txBody>
+      </p:sp>
+      <p:sp>
+        <p:nvSpPr>
+          <p:cNvPr id="66" name="CuadroTexto 65">
+            <a:extLst>
+              <a:ext uri="{FF2B5EF4-FFF2-40B4-BE49-F238E27FC236}">
+                <a16:creationId xmlns:a16="http://schemas.microsoft.com/office/drawing/2014/main" id="{27ED8E56-1907-4821-8909-ADE8E90DBD4C}"/>
               </a:ext>
             </a:extLst>
           </p:cNvPr>
@@ -5321,7 +6207,7 @@
         </p:nvSpPr>
         <p:spPr>
           <a:xfrm>
-            <a:off x="1500065" y="3786340"/>
+            <a:off x="4844112" y="3877922"/>
             <a:ext cx="835864" cy="369332"/>
           </a:xfrm>
           <a:prstGeom prst="rect">
@@ -5344,17 +6230,17 @@
           <a:p>
             <a:r>
               <a:rPr lang="es-ES" dirty="0"/>
-              <a:t>V0.2.0</a:t>
-            </a:r>
-          </a:p>
-        </p:txBody>
-      </p:sp>
-      <p:sp>
-        <p:nvSpPr>
-          <p:cNvPr id="46" name="CuadroTexto 45">
-            <a:extLst>
-              <a:ext uri="{FF2B5EF4-FFF2-40B4-BE49-F238E27FC236}">
-                <a16:creationId xmlns:a16="http://schemas.microsoft.com/office/drawing/2014/main" id="{C9529B70-423C-431D-9460-BC47659DD43F}"/>
+              <a:t>V0.2.2</a:t>
+            </a:r>
+          </a:p>
+        </p:txBody>
+      </p:sp>
+      <p:sp>
+        <p:nvSpPr>
+          <p:cNvPr id="67" name="CuadroTexto 66">
+            <a:extLst>
+              <a:ext uri="{FF2B5EF4-FFF2-40B4-BE49-F238E27FC236}">
+                <a16:creationId xmlns:a16="http://schemas.microsoft.com/office/drawing/2014/main" id="{9302551E-202E-44FF-853F-5BD4A3CCF210}"/>
               </a:ext>
             </a:extLst>
           </p:cNvPr>
@@ -5363,8 +6249,8 @@
         </p:nvSpPr>
         <p:spPr>
           <a:xfrm>
-            <a:off x="1272822" y="5070704"/>
-            <a:ext cx="1144346" cy="461665"/>
+            <a:off x="8418764" y="5260053"/>
+            <a:ext cx="1325088" cy="276999"/>
           </a:xfrm>
           <a:prstGeom prst="rect">
             <a:avLst/>
@@ -5386,24 +6272,12 @@
           <a:lstStyle/>
           <a:p>
             <a:r>
+              <a:rPr lang="es-ES" sz="1200" dirty="0"/>
+              <a:t>Test </a:t>
+            </a:r>
+            <a:r>
               <a:rPr lang="es-ES" sz="1200" dirty="0" err="1"/>
-              <a:t>First</a:t>
-            </a:r>
-            <a:r>
-              <a:rPr lang="es-ES" sz="1200" dirty="0"/>
-              <a:t> </a:t>
-            </a:r>
-            <a:r>
-              <a:rPr lang="es-ES" sz="1200" dirty="0" err="1"/>
-              <a:t>deployed</a:t>
-            </a:r>
-            <a:r>
-              <a:rPr lang="es-ES" sz="1200" dirty="0"/>
-              <a:t> </a:t>
-            </a:r>
-            <a:r>
-              <a:rPr lang="es-ES" sz="1200" dirty="0" err="1"/>
-              <a:t>version</a:t>
+              <a:t>planning</a:t>
             </a:r>
             <a:endParaRPr lang="es-ES" sz="1200" dirty="0"/>
           </a:p>
@@ -5411,10 +6285,10 @@
       </p:sp>
       <p:sp>
         <p:nvSpPr>
-          <p:cNvPr id="34" name="CuadroTexto 33">
-            <a:extLst>
-              <a:ext uri="{FF2B5EF4-FFF2-40B4-BE49-F238E27FC236}">
-                <a16:creationId xmlns:a16="http://schemas.microsoft.com/office/drawing/2014/main" id="{352537BD-5640-47B3-8754-A36354E4772D}"/>
+          <p:cNvPr id="68" name="CuadroTexto 67">
+            <a:extLst>
+              <a:ext uri="{FF2B5EF4-FFF2-40B4-BE49-F238E27FC236}">
+                <a16:creationId xmlns:a16="http://schemas.microsoft.com/office/drawing/2014/main" id="{113102C0-D928-435B-82E2-2ED9585A3432}"/>
               </a:ext>
             </a:extLst>
           </p:cNvPr>
@@ -5423,21 +6297,100 @@
         </p:nvSpPr>
         <p:spPr>
           <a:xfrm>
-            <a:off x="8706118" y="1146107"/>
-            <a:ext cx="1344418" cy="276999"/>
+            <a:off x="8663376" y="3786340"/>
+            <a:ext cx="835864" cy="369332"/>
           </a:xfrm>
           <a:prstGeom prst="rect">
             <a:avLst/>
           </a:prstGeom>
-          <a:solidFill>
-            <a:schemeClr val="accent6">
-              <a:lumMod val="20000"/>
-              <a:lumOff val="80000"/>
-            </a:schemeClr>
-          </a:solidFill>
+          <a:noFill/>
+          <a:ln w="38100">
+            <a:solidFill>
+              <a:schemeClr val="accent4">
+                <a:lumMod val="75000"/>
+              </a:schemeClr>
+            </a:solidFill>
+          </a:ln>
+        </p:spPr>
+        <p:txBody>
+          <a:bodyPr wrap="square" rtlCol="0">
+            <a:spAutoFit/>
+          </a:bodyPr>
+          <a:lstStyle/>
+          <a:p>
+            <a:r>
+              <a:rPr lang="es-ES" dirty="0"/>
+              <a:t>V0.2.4</a:t>
+            </a:r>
+          </a:p>
+        </p:txBody>
+      </p:sp>
+      <p:sp>
+        <p:nvSpPr>
+          <p:cNvPr id="69" name="CuadroTexto 68">
+            <a:extLst>
+              <a:ext uri="{FF2B5EF4-FFF2-40B4-BE49-F238E27FC236}">
+                <a16:creationId xmlns:a16="http://schemas.microsoft.com/office/drawing/2014/main" id="{3721574A-FED0-4B9D-9AFC-02F13FE41976}"/>
+              </a:ext>
+            </a:extLst>
+          </p:cNvPr>
+          <p:cNvSpPr txBox="1"/>
+          <p:nvPr/>
+        </p:nvSpPr>
+        <p:spPr>
+          <a:xfrm>
+            <a:off x="6807697" y="5229927"/>
+            <a:ext cx="835864" cy="369332"/>
+          </a:xfrm>
+          <a:prstGeom prst="rect">
+            <a:avLst/>
+          </a:prstGeom>
+          <a:noFill/>
+          <a:ln w="38100">
+            <a:solidFill>
+              <a:schemeClr val="accent4">
+                <a:lumMod val="75000"/>
+              </a:schemeClr>
+            </a:solidFill>
+          </a:ln>
+        </p:spPr>
+        <p:txBody>
+          <a:bodyPr wrap="square" rtlCol="0">
+            <a:spAutoFit/>
+          </a:bodyPr>
+          <a:lstStyle/>
+          <a:p>
+            <a:r>
+              <a:rPr lang="es-ES" dirty="0"/>
+              <a:t>V0.2.3</a:t>
+            </a:r>
+          </a:p>
+        </p:txBody>
+      </p:sp>
+      <p:sp>
+        <p:nvSpPr>
+          <p:cNvPr id="70" name="CuadroTexto 69">
+            <a:extLst>
+              <a:ext uri="{FF2B5EF4-FFF2-40B4-BE49-F238E27FC236}">
+                <a16:creationId xmlns:a16="http://schemas.microsoft.com/office/drawing/2014/main" id="{B4A76C54-3398-48F7-9862-FB9C01944C8B}"/>
+              </a:ext>
+            </a:extLst>
+          </p:cNvPr>
+          <p:cNvSpPr txBox="1"/>
+          <p:nvPr/>
+        </p:nvSpPr>
+        <p:spPr>
+          <a:xfrm>
+            <a:off x="6477015" y="3810943"/>
+            <a:ext cx="1469153" cy="461665"/>
+          </a:xfrm>
+          <a:prstGeom prst="rect">
+            <a:avLst/>
+          </a:prstGeom>
+          <a:noFill/>
           <a:ln w="28575">
             <a:solidFill>
-              <a:schemeClr val="accent6">
+              <a:schemeClr val="accent4">
                 <a:lumMod val="60000"/>
                 <a:lumOff val="40000"/>
               </a:schemeClr>
@@ -5450,10 +6403,9 @@
           </a:bodyPr>
           <a:lstStyle/>
           <a:p>
-            <a:pPr algn="ctr"/>
             <a:r>
               <a:rPr lang="es-ES" sz="1200" dirty="0" err="1"/>
-              <a:t>split</a:t>
+              <a:t>Exploratory</a:t>
             </a:r>
             <a:r>
               <a:rPr lang="es-ES" sz="1200" dirty="0"/>
@@ -5461,12 +6413,20 @@
             </a:r>
             <a:r>
               <a:rPr lang="es-ES" sz="1200" dirty="0" err="1"/>
-              <a:t>segment</a:t>
-            </a:r>
+              <a:t>testing</a:t>
+            </a:r>
+            <a:endParaRPr lang="es-ES" sz="1200" dirty="0"/>
+          </a:p>
+          <a:p>
             <a:r>
               <a:rPr lang="es-ES" sz="1200" dirty="0"/>
-              <a:t> #73</a:t>
-            </a:r>
+              <a:t>Bug </a:t>
+            </a:r>
+            <a:r>
+              <a:rPr lang="es-ES" sz="1200" dirty="0" err="1"/>
+              <a:t>correction</a:t>
+            </a:r>
+            <a:endParaRPr lang="es-ES" sz="1200" dirty="0"/>
           </a:p>
         </p:txBody>
       </p:sp>

</xml_diff>